<commit_message>
correcoes pequenas no techreport e feitas secoes introducao, motivacao, outline e geometry contraction da apresentacao
</commit_message>
<xml_diff>
--- a/Docs/Presentation.pptx
+++ b/Docs/Presentation.pptx
@@ -5,12 +5,24 @@
     <p:sldMasterId id="2147483960" r:id="rId1"/>
   </p:sldMasterIdLst>
   <p:notesMasterIdLst>
-    <p:notesMasterId r:id="rId5"/>
+    <p:notesMasterId r:id="rId17"/>
   </p:notesMasterIdLst>
   <p:sldIdLst>
     <p:sldId id="256" r:id="rId2"/>
     <p:sldId id="257" r:id="rId3"/>
-    <p:sldId id="258" r:id="rId4"/>
+    <p:sldId id="259" r:id="rId4"/>
+    <p:sldId id="260" r:id="rId5"/>
+    <p:sldId id="261" r:id="rId6"/>
+    <p:sldId id="266" r:id="rId7"/>
+    <p:sldId id="267" r:id="rId8"/>
+    <p:sldId id="268" r:id="rId9"/>
+    <p:sldId id="269" r:id="rId10"/>
+    <p:sldId id="270" r:id="rId11"/>
+    <p:sldId id="263" r:id="rId12"/>
+    <p:sldId id="262" r:id="rId13"/>
+    <p:sldId id="264" r:id="rId14"/>
+    <p:sldId id="265" r:id="rId15"/>
+    <p:sldId id="258" r:id="rId16"/>
   </p:sldIdLst>
   <p:sldSz cx="9144000" cy="6858000" type="screen4x3"/>
   <p:notesSz cx="6858000" cy="9144000"/>
@@ -195,7 +207,7 @@
             <a:fld id="{3847F962-7C4E-4084-8C16-1ABF8311BE45}" type="datetimeFigureOut">
               <a:rPr lang="en-US" smtClean="0"/>
               <a:pPr/>
-              <a:t>7/3/2011</a:t>
+              <a:t>7/4/2011</a:t>
             </a:fld>
             <a:endParaRPr lang="en-US"/>
           </a:p>
@@ -807,7 +819,7 @@
             <a:fld id="{1D8BD707-D9CF-40AE-B4C6-C98DA3205C09}" type="datetimeFigureOut">
               <a:rPr lang="en-US" smtClean="0"/>
               <a:pPr/>
-              <a:t>7/3/2011</a:t>
+              <a:t>7/4/2011</a:t>
             </a:fld>
             <a:endParaRPr lang="en-US"/>
           </a:p>
@@ -1032,7 +1044,7 @@
             <a:fld id="{1D8BD707-D9CF-40AE-B4C6-C98DA3205C09}" type="datetimeFigureOut">
               <a:rPr lang="en-US" smtClean="0"/>
               <a:pPr/>
-              <a:t>7/3/2011</a:t>
+              <a:t>7/4/2011</a:t>
             </a:fld>
             <a:endParaRPr lang="en-US"/>
           </a:p>
@@ -1314,7 +1326,7 @@
             <a:fld id="{1D8BD707-D9CF-40AE-B4C6-C98DA3205C09}" type="datetimeFigureOut">
               <a:rPr lang="en-US" smtClean="0"/>
               <a:pPr/>
-              <a:t>7/3/2011</a:t>
+              <a:t>7/4/2011</a:t>
             </a:fld>
             <a:endParaRPr lang="en-US"/>
           </a:p>
@@ -1515,7 +1527,7 @@
             <a:fld id="{1D8BD707-D9CF-40AE-B4C6-C98DA3205C09}" type="datetimeFigureOut">
               <a:rPr lang="en-US" smtClean="0"/>
               <a:pPr/>
-              <a:t>7/3/2011</a:t>
+              <a:t>7/4/2011</a:t>
             </a:fld>
             <a:endParaRPr lang="en-US"/>
           </a:p>
@@ -1870,7 +1882,7 @@
             <a:fld id="{1D8BD707-D9CF-40AE-B4C6-C98DA3205C09}" type="datetimeFigureOut">
               <a:rPr lang="en-US" smtClean="0"/>
               <a:pPr/>
-              <a:t>7/3/2011</a:t>
+              <a:t>7/4/2011</a:t>
             </a:fld>
             <a:endParaRPr lang="en-US"/>
           </a:p>
@@ -2159,7 +2171,7 @@
             <a:fld id="{1D8BD707-D9CF-40AE-B4C6-C98DA3205C09}" type="datetimeFigureOut">
               <a:rPr lang="en-US" smtClean="0"/>
               <a:pPr/>
-              <a:t>7/3/2011</a:t>
+              <a:t>7/4/2011</a:t>
             </a:fld>
             <a:endParaRPr lang="en-US"/>
           </a:p>
@@ -2583,7 +2595,7 @@
             <a:fld id="{1D8BD707-D9CF-40AE-B4C6-C98DA3205C09}" type="datetimeFigureOut">
               <a:rPr lang="en-US" smtClean="0"/>
               <a:pPr/>
-              <a:t>7/3/2011</a:t>
+              <a:t>7/4/2011</a:t>
             </a:fld>
             <a:endParaRPr lang="en-US"/>
           </a:p>
@@ -2700,7 +2712,7 @@
             <a:fld id="{1D8BD707-D9CF-40AE-B4C6-C98DA3205C09}" type="datetimeFigureOut">
               <a:rPr lang="en-US" smtClean="0"/>
               <a:pPr/>
-              <a:t>7/3/2011</a:t>
+              <a:t>7/4/2011</a:t>
             </a:fld>
             <a:endParaRPr lang="en-US"/>
           </a:p>
@@ -2792,7 +2804,7 @@
             <a:fld id="{1D8BD707-D9CF-40AE-B4C6-C98DA3205C09}" type="datetimeFigureOut">
               <a:rPr lang="en-US" smtClean="0"/>
               <a:pPr/>
-              <a:t>7/3/2011</a:t>
+              <a:t>7/4/2011</a:t>
             </a:fld>
             <a:endParaRPr lang="en-US"/>
           </a:p>
@@ -3072,7 +3084,7 @@
             <a:fld id="{1D8BD707-D9CF-40AE-B4C6-C98DA3205C09}" type="datetimeFigureOut">
               <a:rPr lang="en-US" smtClean="0"/>
               <a:pPr/>
-              <a:t>7/3/2011</a:t>
+              <a:t>7/4/2011</a:t>
             </a:fld>
             <a:endParaRPr lang="en-US"/>
           </a:p>
@@ -3435,7 +3447,7 @@
             <a:fld id="{1D8BD707-D9CF-40AE-B4C6-C98DA3205C09}" type="datetimeFigureOut">
               <a:rPr lang="en-US" smtClean="0"/>
               <a:pPr/>
-              <a:t>7/3/2011</a:t>
+              <a:t>7/4/2011</a:t>
             </a:fld>
             <a:endParaRPr lang="en-US"/>
           </a:p>
@@ -3902,7 +3914,7 @@
             <a:fld id="{1D8BD707-D9CF-40AE-B4C6-C98DA3205C09}" type="datetimeFigureOut">
               <a:rPr lang="en-US" smtClean="0"/>
               <a:pPr/>
-              <a:t>7/3/2011</a:t>
+              <a:t>7/4/2011</a:t>
             </a:fld>
             <a:endParaRPr lang="en-US"/>
           </a:p>
@@ -4371,7 +4383,6 @@
               <a:rPr lang="en-US" b="1" dirty="0" smtClean="0"/>
               <a:t> N. Oliveira</a:t>
             </a:r>
-            <a:endParaRPr lang="en-US" b="1" dirty="0" smtClean="0"/>
           </a:p>
           <a:p>
             <a:r>
@@ -4437,6 +4448,1217 @@
           <a:effectLst/>
         </p:spPr>
       </p:pic>
+    </p:spTree>
+  </p:cSld>
+  <p:clrMapOvr>
+    <a:masterClrMapping/>
+  </p:clrMapOvr>
+</p:sld>
+</file>
+
+<file path=ppt/slides/slide10.xml><?xml version="1.0" encoding="utf-8"?>
+<p:sld xmlns:a="http://schemas.openxmlformats.org/drawingml/2006/main" xmlns:r="http://schemas.openxmlformats.org/officeDocument/2006/relationships" xmlns:p="http://schemas.openxmlformats.org/presentationml/2006/main">
+  <p:cSld>
+    <p:spTree>
+      <p:nvGrpSpPr>
+        <p:cNvPr id="1" name=""/>
+        <p:cNvGrpSpPr/>
+        <p:nvPr/>
+      </p:nvGrpSpPr>
+      <p:grpSpPr>
+        <a:xfrm>
+          <a:off x="0" y="0"/>
+          <a:ext cx="0" cy="0"/>
+          <a:chOff x="0" y="0"/>
+          <a:chExt cx="0" cy="0"/>
+        </a:xfrm>
+      </p:grpSpPr>
+      <p:sp>
+        <p:nvSpPr>
+          <p:cNvPr id="2" name="Title 1"/>
+          <p:cNvSpPr>
+            <a:spLocks noGrp="1"/>
+          </p:cNvSpPr>
+          <p:nvPr>
+            <p:ph type="title"/>
+          </p:nvPr>
+        </p:nvSpPr>
+        <p:spPr/>
+        <p:txBody>
+          <a:bodyPr>
+            <a:normAutofit fontScale="90000"/>
+          </a:bodyPr>
+          <a:lstStyle/>
+          <a:p>
+            <a:r>
+              <a:rPr lang="en-US" dirty="0" smtClean="0"/>
+              <a:t>Geometry Contraction - Algorithm</a:t>
+            </a:r>
+            <a:endParaRPr lang="en-US" dirty="0"/>
+          </a:p>
+        </p:txBody>
+      </p:sp>
+      <p:sp>
+        <p:nvSpPr>
+          <p:cNvPr id="25602" name="Rectangle 2"/>
+          <p:cNvSpPr>
+            <a:spLocks noChangeArrowheads="1"/>
+          </p:cNvSpPr>
+          <p:nvPr/>
+        </p:nvSpPr>
+        <p:spPr bwMode="auto">
+          <a:xfrm>
+            <a:off x="0" y="0"/>
+            <a:ext cx="9144000" cy="457200"/>
+          </a:xfrm>
+          <a:prstGeom prst="rect">
+            <a:avLst/>
+          </a:prstGeom>
+          <a:noFill/>
+          <a:ln w="9525">
+            <a:noFill/>
+            <a:miter lim="800000"/>
+            <a:headEnd/>
+            <a:tailEnd/>
+          </a:ln>
+          <a:effectLst/>
+        </p:spPr>
+        <p:txBody>
+          <a:bodyPr vert="horz" wrap="none" lIns="91440" tIns="45720" rIns="91440" bIns="45720" numCol="1" anchor="ctr" anchorCtr="0" compatLnSpc="1">
+            <a:prstTxWarp prst="textNoShape">
+              <a:avLst/>
+            </a:prstTxWarp>
+            <a:spAutoFit/>
+          </a:bodyPr>
+          <a:lstStyle/>
+          <a:p>
+            <a:endParaRPr lang="pt-BR"/>
+          </a:p>
+        </p:txBody>
+      </p:sp>
+      <p:sp>
+        <p:nvSpPr>
+          <p:cNvPr id="25605" name="Rectangle 5"/>
+          <p:cNvSpPr>
+            <a:spLocks noChangeArrowheads="1"/>
+          </p:cNvSpPr>
+          <p:nvPr/>
+        </p:nvSpPr>
+        <p:spPr bwMode="auto">
+          <a:xfrm>
+            <a:off x="0" y="0"/>
+            <a:ext cx="9144000" cy="457200"/>
+          </a:xfrm>
+          <a:prstGeom prst="rect">
+            <a:avLst/>
+          </a:prstGeom>
+          <a:noFill/>
+          <a:ln w="9525">
+            <a:noFill/>
+            <a:miter lim="800000"/>
+            <a:headEnd/>
+            <a:tailEnd/>
+          </a:ln>
+          <a:effectLst/>
+        </p:spPr>
+        <p:txBody>
+          <a:bodyPr vert="horz" wrap="none" lIns="91440" tIns="45720" rIns="91440" bIns="45720" numCol="1" anchor="ctr" anchorCtr="0" compatLnSpc="1">
+            <a:prstTxWarp prst="textNoShape">
+              <a:avLst/>
+            </a:prstTxWarp>
+            <a:spAutoFit/>
+          </a:bodyPr>
+          <a:lstStyle/>
+          <a:p>
+            <a:endParaRPr lang="pt-BR"/>
+          </a:p>
+        </p:txBody>
+      </p:sp>
+      <p:sp>
+        <p:nvSpPr>
+          <p:cNvPr id="27650" name="Rectangle 2"/>
+          <p:cNvSpPr>
+            <a:spLocks noChangeArrowheads="1"/>
+          </p:cNvSpPr>
+          <p:nvPr/>
+        </p:nvSpPr>
+        <p:spPr bwMode="auto">
+          <a:xfrm>
+            <a:off x="0" y="0"/>
+            <a:ext cx="9144000" cy="457200"/>
+          </a:xfrm>
+          <a:prstGeom prst="rect">
+            <a:avLst/>
+          </a:prstGeom>
+          <a:noFill/>
+          <a:ln w="9525">
+            <a:noFill/>
+            <a:miter lim="800000"/>
+            <a:headEnd/>
+            <a:tailEnd/>
+          </a:ln>
+          <a:effectLst/>
+        </p:spPr>
+        <p:txBody>
+          <a:bodyPr vert="horz" wrap="none" lIns="91440" tIns="45720" rIns="91440" bIns="45720" numCol="1" anchor="ctr" anchorCtr="0" compatLnSpc="1">
+            <a:prstTxWarp prst="textNoShape">
+              <a:avLst/>
+            </a:prstTxWarp>
+            <a:spAutoFit/>
+          </a:bodyPr>
+          <a:lstStyle/>
+          <a:p>
+            <a:endParaRPr lang="pt-BR"/>
+          </a:p>
+        </p:txBody>
+      </p:sp>
+      <p:sp>
+        <p:nvSpPr>
+          <p:cNvPr id="28674" name="Rectangle 2"/>
+          <p:cNvSpPr>
+            <a:spLocks noChangeArrowheads="1"/>
+          </p:cNvSpPr>
+          <p:nvPr/>
+        </p:nvSpPr>
+        <p:spPr bwMode="auto">
+          <a:xfrm>
+            <a:off x="0" y="0"/>
+            <a:ext cx="9144000" cy="0"/>
+          </a:xfrm>
+          <a:prstGeom prst="rect">
+            <a:avLst/>
+          </a:prstGeom>
+          <a:noFill/>
+          <a:ln w="9525">
+            <a:noFill/>
+            <a:miter lim="800000"/>
+            <a:headEnd/>
+            <a:tailEnd/>
+          </a:ln>
+          <a:effectLst/>
+        </p:spPr>
+        <p:txBody>
+          <a:bodyPr vert="horz" wrap="none" lIns="91440" tIns="45720" rIns="91440" bIns="45720" numCol="1" anchor="ctr" anchorCtr="0" compatLnSpc="1">
+            <a:prstTxWarp prst="textNoShape">
+              <a:avLst/>
+            </a:prstTxWarp>
+            <a:spAutoFit/>
+          </a:bodyPr>
+          <a:lstStyle/>
+          <a:p>
+            <a:endParaRPr lang="pt-BR"/>
+          </a:p>
+        </p:txBody>
+      </p:sp>
+      <p:sp>
+        <p:nvSpPr>
+          <p:cNvPr id="28676" name="Rectangle 4"/>
+          <p:cNvSpPr>
+            <a:spLocks noChangeArrowheads="1"/>
+          </p:cNvSpPr>
+          <p:nvPr/>
+        </p:nvSpPr>
+        <p:spPr bwMode="auto">
+          <a:xfrm>
+            <a:off x="0" y="0"/>
+            <a:ext cx="9144000" cy="0"/>
+          </a:xfrm>
+          <a:prstGeom prst="rect">
+            <a:avLst/>
+          </a:prstGeom>
+          <a:noFill/>
+          <a:ln w="9525">
+            <a:noFill/>
+            <a:miter lim="800000"/>
+            <a:headEnd/>
+            <a:tailEnd/>
+          </a:ln>
+          <a:effectLst/>
+        </p:spPr>
+        <p:txBody>
+          <a:bodyPr vert="horz" wrap="none" lIns="91440" tIns="45720" rIns="91440" bIns="45720" numCol="1" anchor="ctr" anchorCtr="0" compatLnSpc="1">
+            <a:prstTxWarp prst="textNoShape">
+              <a:avLst/>
+            </a:prstTxWarp>
+            <a:spAutoFit/>
+          </a:bodyPr>
+          <a:lstStyle/>
+          <a:p>
+            <a:endParaRPr lang="pt-BR"/>
+          </a:p>
+        </p:txBody>
+      </p:sp>
+      <p:sp>
+        <p:nvSpPr>
+          <p:cNvPr id="28678" name="Rectangle 6"/>
+          <p:cNvSpPr>
+            <a:spLocks noChangeArrowheads="1"/>
+          </p:cNvSpPr>
+          <p:nvPr/>
+        </p:nvSpPr>
+        <p:spPr bwMode="auto">
+          <a:xfrm>
+            <a:off x="0" y="0"/>
+            <a:ext cx="9144000" cy="0"/>
+          </a:xfrm>
+          <a:prstGeom prst="rect">
+            <a:avLst/>
+          </a:prstGeom>
+          <a:noFill/>
+          <a:ln w="9525">
+            <a:noFill/>
+            <a:miter lim="800000"/>
+            <a:headEnd/>
+            <a:tailEnd/>
+          </a:ln>
+          <a:effectLst/>
+        </p:spPr>
+        <p:txBody>
+          <a:bodyPr vert="horz" wrap="none" lIns="91440" tIns="45720" rIns="91440" bIns="45720" numCol="1" anchor="ctr" anchorCtr="0" compatLnSpc="1">
+            <a:prstTxWarp prst="textNoShape">
+              <a:avLst/>
+            </a:prstTxWarp>
+            <a:spAutoFit/>
+          </a:bodyPr>
+          <a:lstStyle/>
+          <a:p>
+            <a:endParaRPr lang="pt-BR"/>
+          </a:p>
+        </p:txBody>
+      </p:sp>
+      <p:sp>
+        <p:nvSpPr>
+          <p:cNvPr id="28680" name="Rectangle 8"/>
+          <p:cNvSpPr>
+            <a:spLocks noChangeArrowheads="1"/>
+          </p:cNvSpPr>
+          <p:nvPr/>
+        </p:nvSpPr>
+        <p:spPr bwMode="auto">
+          <a:xfrm>
+            <a:off x="0" y="0"/>
+            <a:ext cx="9144000" cy="0"/>
+          </a:xfrm>
+          <a:prstGeom prst="rect">
+            <a:avLst/>
+          </a:prstGeom>
+          <a:noFill/>
+          <a:ln w="9525">
+            <a:noFill/>
+            <a:miter lim="800000"/>
+            <a:headEnd/>
+            <a:tailEnd/>
+          </a:ln>
+          <a:effectLst/>
+        </p:spPr>
+        <p:txBody>
+          <a:bodyPr vert="horz" wrap="none" lIns="91440" tIns="45720" rIns="91440" bIns="45720" numCol="1" anchor="ctr" anchorCtr="0" compatLnSpc="1">
+            <a:prstTxWarp prst="textNoShape">
+              <a:avLst/>
+            </a:prstTxWarp>
+            <a:spAutoFit/>
+          </a:bodyPr>
+          <a:lstStyle/>
+          <a:p>
+            <a:endParaRPr lang="pt-BR"/>
+          </a:p>
+        </p:txBody>
+      </p:sp>
+      <p:sp>
+        <p:nvSpPr>
+          <p:cNvPr id="28682" name="Rectangle 10"/>
+          <p:cNvSpPr>
+            <a:spLocks noChangeArrowheads="1"/>
+          </p:cNvSpPr>
+          <p:nvPr/>
+        </p:nvSpPr>
+        <p:spPr bwMode="auto">
+          <a:xfrm>
+            <a:off x="0" y="0"/>
+            <a:ext cx="9144000" cy="0"/>
+          </a:xfrm>
+          <a:prstGeom prst="rect">
+            <a:avLst/>
+          </a:prstGeom>
+          <a:noFill/>
+          <a:ln w="9525">
+            <a:noFill/>
+            <a:miter lim="800000"/>
+            <a:headEnd/>
+            <a:tailEnd/>
+          </a:ln>
+          <a:effectLst/>
+        </p:spPr>
+        <p:txBody>
+          <a:bodyPr vert="horz" wrap="none" lIns="91440" tIns="45720" rIns="91440" bIns="45720" numCol="1" anchor="ctr" anchorCtr="0" compatLnSpc="1">
+            <a:prstTxWarp prst="textNoShape">
+              <a:avLst/>
+            </a:prstTxWarp>
+            <a:spAutoFit/>
+          </a:bodyPr>
+          <a:lstStyle/>
+          <a:p>
+            <a:endParaRPr lang="pt-BR"/>
+          </a:p>
+        </p:txBody>
+      </p:sp>
+      <p:sp>
+        <p:nvSpPr>
+          <p:cNvPr id="28684" name="Rectangle 12"/>
+          <p:cNvSpPr>
+            <a:spLocks noChangeArrowheads="1"/>
+          </p:cNvSpPr>
+          <p:nvPr/>
+        </p:nvSpPr>
+        <p:spPr bwMode="auto">
+          <a:xfrm>
+            <a:off x="0" y="0"/>
+            <a:ext cx="9144000" cy="0"/>
+          </a:xfrm>
+          <a:prstGeom prst="rect">
+            <a:avLst/>
+          </a:prstGeom>
+          <a:noFill/>
+          <a:ln w="9525">
+            <a:noFill/>
+            <a:miter lim="800000"/>
+            <a:headEnd/>
+            <a:tailEnd/>
+          </a:ln>
+          <a:effectLst/>
+        </p:spPr>
+        <p:txBody>
+          <a:bodyPr vert="horz" wrap="none" lIns="91440" tIns="45720" rIns="91440" bIns="45720" numCol="1" anchor="ctr" anchorCtr="0" compatLnSpc="1">
+            <a:prstTxWarp prst="textNoShape">
+              <a:avLst/>
+            </a:prstTxWarp>
+            <a:spAutoFit/>
+          </a:bodyPr>
+          <a:lstStyle/>
+          <a:p>
+            <a:endParaRPr lang="pt-BR"/>
+          </a:p>
+        </p:txBody>
+      </p:sp>
+      <p:sp>
+        <p:nvSpPr>
+          <p:cNvPr id="28686" name="Rectangle 14"/>
+          <p:cNvSpPr>
+            <a:spLocks noChangeArrowheads="1"/>
+          </p:cNvSpPr>
+          <p:nvPr/>
+        </p:nvSpPr>
+        <p:spPr bwMode="auto">
+          <a:xfrm>
+            <a:off x="0" y="0"/>
+            <a:ext cx="9144000" cy="0"/>
+          </a:xfrm>
+          <a:prstGeom prst="rect">
+            <a:avLst/>
+          </a:prstGeom>
+          <a:noFill/>
+          <a:ln w="9525">
+            <a:noFill/>
+            <a:miter lim="800000"/>
+            <a:headEnd/>
+            <a:tailEnd/>
+          </a:ln>
+          <a:effectLst/>
+        </p:spPr>
+        <p:txBody>
+          <a:bodyPr vert="horz" wrap="none" lIns="91440" tIns="45720" rIns="91440" bIns="45720" numCol="1" anchor="ctr" anchorCtr="0" compatLnSpc="1">
+            <a:prstTxWarp prst="textNoShape">
+              <a:avLst/>
+            </a:prstTxWarp>
+            <a:spAutoFit/>
+          </a:bodyPr>
+          <a:lstStyle/>
+          <a:p>
+            <a:endParaRPr lang="pt-BR"/>
+          </a:p>
+        </p:txBody>
+      </p:sp>
+      <p:sp>
+        <p:nvSpPr>
+          <p:cNvPr id="28688" name="Rectangle 16"/>
+          <p:cNvSpPr>
+            <a:spLocks noChangeArrowheads="1"/>
+          </p:cNvSpPr>
+          <p:nvPr/>
+        </p:nvSpPr>
+        <p:spPr bwMode="auto">
+          <a:xfrm>
+            <a:off x="0" y="0"/>
+            <a:ext cx="9144000" cy="0"/>
+          </a:xfrm>
+          <a:prstGeom prst="rect">
+            <a:avLst/>
+          </a:prstGeom>
+          <a:noFill/>
+          <a:ln w="9525">
+            <a:noFill/>
+            <a:miter lim="800000"/>
+            <a:headEnd/>
+            <a:tailEnd/>
+          </a:ln>
+          <a:effectLst/>
+        </p:spPr>
+        <p:txBody>
+          <a:bodyPr vert="horz" wrap="none" lIns="91440" tIns="45720" rIns="91440" bIns="45720" numCol="1" anchor="ctr" anchorCtr="0" compatLnSpc="1">
+            <a:prstTxWarp prst="textNoShape">
+              <a:avLst/>
+            </a:prstTxWarp>
+            <a:spAutoFit/>
+          </a:bodyPr>
+          <a:lstStyle/>
+          <a:p>
+            <a:endParaRPr lang="pt-BR"/>
+          </a:p>
+        </p:txBody>
+      </p:sp>
+      <p:sp>
+        <p:nvSpPr>
+          <p:cNvPr id="28690" name="Rectangle 18"/>
+          <p:cNvSpPr>
+            <a:spLocks noChangeArrowheads="1"/>
+          </p:cNvSpPr>
+          <p:nvPr/>
+        </p:nvSpPr>
+        <p:spPr bwMode="auto">
+          <a:xfrm>
+            <a:off x="0" y="0"/>
+            <a:ext cx="9144000" cy="0"/>
+          </a:xfrm>
+          <a:prstGeom prst="rect">
+            <a:avLst/>
+          </a:prstGeom>
+          <a:noFill/>
+          <a:ln w="9525">
+            <a:noFill/>
+            <a:miter lim="800000"/>
+            <a:headEnd/>
+            <a:tailEnd/>
+          </a:ln>
+          <a:effectLst/>
+        </p:spPr>
+        <p:txBody>
+          <a:bodyPr vert="horz" wrap="none" lIns="91440" tIns="45720" rIns="91440" bIns="45720" numCol="1" anchor="ctr" anchorCtr="0" compatLnSpc="1">
+            <a:prstTxWarp prst="textNoShape">
+              <a:avLst/>
+            </a:prstTxWarp>
+            <a:spAutoFit/>
+          </a:bodyPr>
+          <a:lstStyle/>
+          <a:p>
+            <a:endParaRPr lang="pt-BR"/>
+          </a:p>
+        </p:txBody>
+      </p:sp>
+      <p:sp>
+        <p:nvSpPr>
+          <p:cNvPr id="1026" name="Rectangle 2"/>
+          <p:cNvSpPr>
+            <a:spLocks noChangeArrowheads="1"/>
+          </p:cNvSpPr>
+          <p:nvPr/>
+        </p:nvSpPr>
+        <p:spPr bwMode="auto">
+          <a:xfrm>
+            <a:off x="0" y="0"/>
+            <a:ext cx="9144000" cy="0"/>
+          </a:xfrm>
+          <a:prstGeom prst="rect">
+            <a:avLst/>
+          </a:prstGeom>
+          <a:noFill/>
+          <a:ln w="9525">
+            <a:noFill/>
+            <a:miter lim="800000"/>
+            <a:headEnd/>
+            <a:tailEnd/>
+          </a:ln>
+          <a:effectLst/>
+        </p:spPr>
+        <p:txBody>
+          <a:bodyPr vert="horz" wrap="none" lIns="91440" tIns="45720" rIns="91440" bIns="45720" numCol="1" anchor="ctr" anchorCtr="0" compatLnSpc="1">
+            <a:prstTxWarp prst="textNoShape">
+              <a:avLst/>
+            </a:prstTxWarp>
+            <a:spAutoFit/>
+          </a:bodyPr>
+          <a:lstStyle/>
+          <a:p>
+            <a:endParaRPr lang="pt-BR"/>
+          </a:p>
+        </p:txBody>
+      </p:sp>
+      <p:pic>
+        <p:nvPicPr>
+          <p:cNvPr id="1025" name="Picture 1"/>
+          <p:cNvPicPr>
+            <a:picLocks noChangeAspect="1" noChangeArrowheads="1"/>
+          </p:cNvPicPr>
+          <p:nvPr/>
+        </p:nvPicPr>
+        <p:blipFill>
+          <a:blip r:embed="rId2">
+            <a:clrChange>
+              <a:clrFrom>
+                <a:srgbClr val="FFFFFF"/>
+              </a:clrFrom>
+              <a:clrTo>
+                <a:srgbClr val="FFFFFF">
+                  <a:alpha val="0"/>
+                </a:srgbClr>
+              </a:clrTo>
+            </a:clrChange>
+          </a:blip>
+          <a:srcRect/>
+          <a:stretch>
+            <a:fillRect/>
+          </a:stretch>
+        </p:blipFill>
+        <p:spPr bwMode="auto">
+          <a:xfrm>
+            <a:off x="762000" y="2057400"/>
+            <a:ext cx="1066800" cy="370417"/>
+          </a:xfrm>
+          <a:prstGeom prst="rect">
+            <a:avLst/>
+          </a:prstGeom>
+          <a:noFill/>
+        </p:spPr>
+      </p:pic>
+      <p:sp>
+        <p:nvSpPr>
+          <p:cNvPr id="1028" name="Rectangle 4"/>
+          <p:cNvSpPr>
+            <a:spLocks noChangeArrowheads="1"/>
+          </p:cNvSpPr>
+          <p:nvPr/>
+        </p:nvSpPr>
+        <p:spPr bwMode="auto">
+          <a:xfrm>
+            <a:off x="0" y="0"/>
+            <a:ext cx="9144000" cy="0"/>
+          </a:xfrm>
+          <a:prstGeom prst="rect">
+            <a:avLst/>
+          </a:prstGeom>
+          <a:noFill/>
+          <a:ln w="9525">
+            <a:noFill/>
+            <a:miter lim="800000"/>
+            <a:headEnd/>
+            <a:tailEnd/>
+          </a:ln>
+          <a:effectLst/>
+        </p:spPr>
+        <p:txBody>
+          <a:bodyPr vert="horz" wrap="none" lIns="91440" tIns="45720" rIns="91440" bIns="45720" numCol="1" anchor="ctr" anchorCtr="0" compatLnSpc="1">
+            <a:prstTxWarp prst="textNoShape">
+              <a:avLst/>
+            </a:prstTxWarp>
+            <a:spAutoFit/>
+          </a:bodyPr>
+          <a:lstStyle/>
+          <a:p>
+            <a:endParaRPr lang="pt-BR"/>
+          </a:p>
+        </p:txBody>
+      </p:sp>
+      <p:pic>
+        <p:nvPicPr>
+          <p:cNvPr id="1027" name="Picture 3"/>
+          <p:cNvPicPr>
+            <a:picLocks noChangeAspect="1" noChangeArrowheads="1"/>
+          </p:cNvPicPr>
+          <p:nvPr/>
+        </p:nvPicPr>
+        <p:blipFill>
+          <a:blip r:embed="rId3">
+            <a:clrChange>
+              <a:clrFrom>
+                <a:srgbClr val="FFFFFF"/>
+              </a:clrFrom>
+              <a:clrTo>
+                <a:srgbClr val="FFFFFF">
+                  <a:alpha val="0"/>
+                </a:srgbClr>
+              </a:clrTo>
+            </a:clrChange>
+          </a:blip>
+          <a:srcRect/>
+          <a:stretch>
+            <a:fillRect/>
+          </a:stretch>
+        </p:blipFill>
+        <p:spPr bwMode="auto">
+          <a:xfrm>
+            <a:off x="762001" y="2514600"/>
+            <a:ext cx="1295400" cy="376084"/>
+          </a:xfrm>
+          <a:prstGeom prst="rect">
+            <a:avLst/>
+          </a:prstGeom>
+          <a:noFill/>
+        </p:spPr>
+      </p:pic>
+      <p:sp>
+        <p:nvSpPr>
+          <p:cNvPr id="1030" name="Rectangle 6"/>
+          <p:cNvSpPr>
+            <a:spLocks noChangeArrowheads="1"/>
+          </p:cNvSpPr>
+          <p:nvPr/>
+        </p:nvSpPr>
+        <p:spPr bwMode="auto">
+          <a:xfrm>
+            <a:off x="0" y="0"/>
+            <a:ext cx="9144000" cy="0"/>
+          </a:xfrm>
+          <a:prstGeom prst="rect">
+            <a:avLst/>
+          </a:prstGeom>
+          <a:noFill/>
+          <a:ln w="9525">
+            <a:noFill/>
+            <a:miter lim="800000"/>
+            <a:headEnd/>
+            <a:tailEnd/>
+          </a:ln>
+          <a:effectLst/>
+        </p:spPr>
+        <p:txBody>
+          <a:bodyPr vert="horz" wrap="none" lIns="91440" tIns="45720" rIns="91440" bIns="45720" numCol="1" anchor="ctr" anchorCtr="0" compatLnSpc="1">
+            <a:prstTxWarp prst="textNoShape">
+              <a:avLst/>
+            </a:prstTxWarp>
+            <a:spAutoFit/>
+          </a:bodyPr>
+          <a:lstStyle/>
+          <a:p>
+            <a:endParaRPr lang="pt-BR"/>
+          </a:p>
+        </p:txBody>
+      </p:sp>
+      <p:pic>
+        <p:nvPicPr>
+          <p:cNvPr id="1029" name="Picture 5"/>
+          <p:cNvPicPr>
+            <a:picLocks noChangeAspect="1" noChangeArrowheads="1"/>
+          </p:cNvPicPr>
+          <p:nvPr/>
+        </p:nvPicPr>
+        <p:blipFill>
+          <a:blip r:embed="rId4">
+            <a:clrChange>
+              <a:clrFrom>
+                <a:srgbClr val="FFFFFF"/>
+              </a:clrFrom>
+              <a:clrTo>
+                <a:srgbClr val="FFFFFF">
+                  <a:alpha val="0"/>
+                </a:srgbClr>
+              </a:clrTo>
+            </a:clrChange>
+          </a:blip>
+          <a:srcRect/>
+          <a:stretch>
+            <a:fillRect/>
+          </a:stretch>
+        </p:blipFill>
+        <p:spPr bwMode="auto">
+          <a:xfrm>
+            <a:off x="762000" y="2895600"/>
+            <a:ext cx="1700893" cy="381000"/>
+          </a:xfrm>
+          <a:prstGeom prst="rect">
+            <a:avLst/>
+          </a:prstGeom>
+          <a:noFill/>
+        </p:spPr>
+      </p:pic>
+      <p:sp>
+        <p:nvSpPr>
+          <p:cNvPr id="34" name="Rectangle 33"/>
+          <p:cNvSpPr/>
+          <p:nvPr/>
+        </p:nvSpPr>
+        <p:spPr>
+          <a:xfrm>
+            <a:off x="685800" y="3352800"/>
+            <a:ext cx="6680290" cy="523220"/>
+          </a:xfrm>
+          <a:prstGeom prst="rect">
+            <a:avLst/>
+          </a:prstGeom>
+        </p:spPr>
+        <p:txBody>
+          <a:bodyPr wrap="none">
+            <a:spAutoFit/>
+          </a:bodyPr>
+          <a:lstStyle/>
+          <a:p>
+            <a:r>
+              <a:rPr lang="en-US" sz="2800" dirty="0" smtClean="0"/>
+              <a:t>where A is the average face are of the mesh.</a:t>
+            </a:r>
+            <a:endParaRPr lang="pt-BR" sz="2800" dirty="0"/>
+          </a:p>
+        </p:txBody>
+      </p:sp>
+    </p:spTree>
+  </p:cSld>
+  <p:clrMapOvr>
+    <a:masterClrMapping/>
+  </p:clrMapOvr>
+</p:sld>
+</file>
+
+<file path=ppt/slides/slide11.xml><?xml version="1.0" encoding="utf-8"?>
+<p:sld xmlns:a="http://schemas.openxmlformats.org/drawingml/2006/main" xmlns:r="http://schemas.openxmlformats.org/officeDocument/2006/relationships" xmlns:p="http://schemas.openxmlformats.org/presentationml/2006/main">
+  <p:cSld>
+    <p:spTree>
+      <p:nvGrpSpPr>
+        <p:cNvPr id="1" name=""/>
+        <p:cNvGrpSpPr/>
+        <p:nvPr/>
+      </p:nvGrpSpPr>
+      <p:grpSpPr>
+        <a:xfrm>
+          <a:off x="0" y="0"/>
+          <a:ext cx="0" cy="0"/>
+          <a:chOff x="0" y="0"/>
+          <a:chExt cx="0" cy="0"/>
+        </a:xfrm>
+      </p:grpSpPr>
+      <p:sp>
+        <p:nvSpPr>
+          <p:cNvPr id="2" name="Title 1"/>
+          <p:cNvSpPr>
+            <a:spLocks noGrp="1"/>
+          </p:cNvSpPr>
+          <p:nvPr>
+            <p:ph type="title"/>
+          </p:nvPr>
+        </p:nvSpPr>
+        <p:spPr/>
+        <p:txBody>
+          <a:bodyPr/>
+          <a:lstStyle/>
+          <a:p>
+            <a:r>
+              <a:rPr lang="en-US" dirty="0" smtClean="0"/>
+              <a:t>Connectivity Surgery</a:t>
+            </a:r>
+            <a:endParaRPr lang="en-US" dirty="0"/>
+          </a:p>
+        </p:txBody>
+      </p:sp>
+      <p:sp>
+        <p:nvSpPr>
+          <p:cNvPr id="3" name="Content Placeholder 2"/>
+          <p:cNvSpPr>
+            <a:spLocks noGrp="1"/>
+          </p:cNvSpPr>
+          <p:nvPr>
+            <p:ph idx="1"/>
+          </p:nvPr>
+        </p:nvSpPr>
+        <p:spPr/>
+        <p:txBody>
+          <a:bodyPr/>
+          <a:lstStyle/>
+          <a:p>
+            <a:endParaRPr lang="en-US" dirty="0" smtClean="0"/>
+          </a:p>
+          <a:p>
+            <a:endParaRPr lang="en-US" dirty="0" smtClean="0"/>
+          </a:p>
+          <a:p>
+            <a:endParaRPr lang="en-US" dirty="0" smtClean="0"/>
+          </a:p>
+          <a:p>
+            <a:endParaRPr lang="en-US" dirty="0"/>
+          </a:p>
+        </p:txBody>
+      </p:sp>
+      <p:sp>
+        <p:nvSpPr>
+          <p:cNvPr id="4098" name="Rectangle 2"/>
+          <p:cNvSpPr>
+            <a:spLocks noChangeArrowheads="1"/>
+          </p:cNvSpPr>
+          <p:nvPr/>
+        </p:nvSpPr>
+        <p:spPr bwMode="auto">
+          <a:xfrm>
+            <a:off x="0" y="0"/>
+            <a:ext cx="9144000" cy="0"/>
+          </a:xfrm>
+          <a:prstGeom prst="rect">
+            <a:avLst/>
+          </a:prstGeom>
+          <a:noFill/>
+          <a:ln w="9525">
+            <a:noFill/>
+            <a:miter lim="800000"/>
+            <a:headEnd/>
+            <a:tailEnd/>
+          </a:ln>
+          <a:effectLst/>
+        </p:spPr>
+        <p:txBody>
+          <a:bodyPr vert="horz" wrap="none" lIns="91440" tIns="45720" rIns="91440" bIns="45720" numCol="1" anchor="ctr" anchorCtr="0" compatLnSpc="1">
+            <a:prstTxWarp prst="textNoShape">
+              <a:avLst/>
+            </a:prstTxWarp>
+            <a:spAutoFit/>
+          </a:bodyPr>
+          <a:lstStyle/>
+          <a:p>
+            <a:endParaRPr lang="pt-BR"/>
+          </a:p>
+        </p:txBody>
+      </p:sp>
+      <p:pic>
+        <p:nvPicPr>
+          <p:cNvPr id="4097" name="Picture 1"/>
+          <p:cNvPicPr>
+            <a:picLocks noChangeAspect="1" noChangeArrowheads="1"/>
+          </p:cNvPicPr>
+          <p:nvPr/>
+        </p:nvPicPr>
+        <p:blipFill>
+          <a:blip r:embed="rId2">
+            <a:clrChange>
+              <a:clrFrom>
+                <a:srgbClr val="FFFFFF"/>
+              </a:clrFrom>
+              <a:clrTo>
+                <a:srgbClr val="FFFFFF">
+                  <a:alpha val="0"/>
+                </a:srgbClr>
+              </a:clrTo>
+            </a:clrChange>
+          </a:blip>
+          <a:srcRect/>
+          <a:stretch>
+            <a:fillRect/>
+          </a:stretch>
+        </p:blipFill>
+        <p:spPr bwMode="auto">
+          <a:xfrm>
+            <a:off x="0" y="0"/>
+            <a:ext cx="95250" cy="238125"/>
+          </a:xfrm>
+          <a:prstGeom prst="rect">
+            <a:avLst/>
+          </a:prstGeom>
+          <a:noFill/>
+        </p:spPr>
+      </p:pic>
+    </p:spTree>
+  </p:cSld>
+  <p:clrMapOvr>
+    <a:masterClrMapping/>
+  </p:clrMapOvr>
+</p:sld>
+</file>
+
+<file path=ppt/slides/slide12.xml><?xml version="1.0" encoding="utf-8"?>
+<p:sld xmlns:a="http://schemas.openxmlformats.org/drawingml/2006/main" xmlns:r="http://schemas.openxmlformats.org/officeDocument/2006/relationships" xmlns:p="http://schemas.openxmlformats.org/presentationml/2006/main">
+  <p:cSld>
+    <p:spTree>
+      <p:nvGrpSpPr>
+        <p:cNvPr id="1" name=""/>
+        <p:cNvGrpSpPr/>
+        <p:nvPr/>
+      </p:nvGrpSpPr>
+      <p:grpSpPr>
+        <a:xfrm>
+          <a:off x="0" y="0"/>
+          <a:ext cx="0" cy="0"/>
+          <a:chOff x="0" y="0"/>
+          <a:chExt cx="0" cy="0"/>
+        </a:xfrm>
+      </p:grpSpPr>
+      <p:sp>
+        <p:nvSpPr>
+          <p:cNvPr id="2" name="Title 1"/>
+          <p:cNvSpPr>
+            <a:spLocks noGrp="1"/>
+          </p:cNvSpPr>
+          <p:nvPr>
+            <p:ph type="title"/>
+          </p:nvPr>
+        </p:nvSpPr>
+        <p:spPr/>
+        <p:txBody>
+          <a:bodyPr/>
+          <a:lstStyle/>
+          <a:p>
+            <a:r>
+              <a:rPr lang="en-US" dirty="0" smtClean="0"/>
+              <a:t>Embedding Refinement</a:t>
+            </a:r>
+            <a:endParaRPr lang="en-US" dirty="0"/>
+          </a:p>
+        </p:txBody>
+      </p:sp>
+      <p:sp>
+        <p:nvSpPr>
+          <p:cNvPr id="3" name="Content Placeholder 2"/>
+          <p:cNvSpPr>
+            <a:spLocks noGrp="1"/>
+          </p:cNvSpPr>
+          <p:nvPr>
+            <p:ph idx="1"/>
+          </p:nvPr>
+        </p:nvSpPr>
+        <p:spPr/>
+        <p:txBody>
+          <a:bodyPr/>
+          <a:lstStyle/>
+          <a:p>
+            <a:r>
+              <a:rPr lang="en-US" dirty="0" smtClean="0"/>
+              <a:t>=P</a:t>
+            </a:r>
+          </a:p>
+          <a:p>
+            <a:endParaRPr lang="en-US" dirty="0" smtClean="0"/>
+          </a:p>
+          <a:p>
+            <a:endParaRPr lang="en-US" dirty="0" smtClean="0"/>
+          </a:p>
+          <a:p>
+            <a:endParaRPr lang="en-US" dirty="0" smtClean="0"/>
+          </a:p>
+          <a:p>
+            <a:endParaRPr lang="en-US" dirty="0"/>
+          </a:p>
+        </p:txBody>
+      </p:sp>
+    </p:spTree>
+  </p:cSld>
+  <p:clrMapOvr>
+    <a:masterClrMapping/>
+  </p:clrMapOvr>
+</p:sld>
+</file>
+
+<file path=ppt/slides/slide13.xml><?xml version="1.0" encoding="utf-8"?>
+<p:sld xmlns:a="http://schemas.openxmlformats.org/drawingml/2006/main" xmlns:r="http://schemas.openxmlformats.org/officeDocument/2006/relationships" xmlns:p="http://schemas.openxmlformats.org/presentationml/2006/main">
+  <p:cSld>
+    <p:spTree>
+      <p:nvGrpSpPr>
+        <p:cNvPr id="1" name=""/>
+        <p:cNvGrpSpPr/>
+        <p:nvPr/>
+      </p:nvGrpSpPr>
+      <p:grpSpPr>
+        <a:xfrm>
+          <a:off x="0" y="0"/>
+          <a:ext cx="0" cy="0"/>
+          <a:chOff x="0" y="0"/>
+          <a:chExt cx="0" cy="0"/>
+        </a:xfrm>
+      </p:grpSpPr>
+      <p:sp>
+        <p:nvSpPr>
+          <p:cNvPr id="2" name="Title 1"/>
+          <p:cNvSpPr>
+            <a:spLocks noGrp="1"/>
+          </p:cNvSpPr>
+          <p:nvPr>
+            <p:ph type="title"/>
+          </p:nvPr>
+        </p:nvSpPr>
+        <p:spPr/>
+        <p:txBody>
+          <a:bodyPr/>
+          <a:lstStyle/>
+          <a:p>
+            <a:r>
+              <a:rPr lang="en-US" dirty="0" smtClean="0"/>
+              <a:t>Results</a:t>
+            </a:r>
+            <a:endParaRPr lang="en-US" dirty="0"/>
+          </a:p>
+        </p:txBody>
+      </p:sp>
+      <p:sp>
+        <p:nvSpPr>
+          <p:cNvPr id="3" name="Content Placeholder 2"/>
+          <p:cNvSpPr>
+            <a:spLocks noGrp="1"/>
+          </p:cNvSpPr>
+          <p:nvPr>
+            <p:ph idx="1"/>
+          </p:nvPr>
+        </p:nvSpPr>
+        <p:spPr/>
+        <p:txBody>
+          <a:bodyPr/>
+          <a:lstStyle/>
+          <a:p>
+            <a:r>
+              <a:rPr lang="en-US" dirty="0" smtClean="0"/>
+              <a:t>=P</a:t>
+            </a:r>
+          </a:p>
+          <a:p>
+            <a:endParaRPr lang="en-US" dirty="0" smtClean="0"/>
+          </a:p>
+          <a:p>
+            <a:endParaRPr lang="en-US" dirty="0" smtClean="0"/>
+          </a:p>
+          <a:p>
+            <a:endParaRPr lang="en-US" dirty="0" smtClean="0"/>
+          </a:p>
+          <a:p>
+            <a:endParaRPr lang="en-US" dirty="0"/>
+          </a:p>
+        </p:txBody>
+      </p:sp>
+    </p:spTree>
+  </p:cSld>
+  <p:clrMapOvr>
+    <a:masterClrMapping/>
+  </p:clrMapOvr>
+</p:sld>
+</file>
+
+<file path=ppt/slides/slide14.xml><?xml version="1.0" encoding="utf-8"?>
+<p:sld xmlns:a="http://schemas.openxmlformats.org/drawingml/2006/main" xmlns:r="http://schemas.openxmlformats.org/officeDocument/2006/relationships" xmlns:p="http://schemas.openxmlformats.org/presentationml/2006/main">
+  <p:cSld>
+    <p:spTree>
+      <p:nvGrpSpPr>
+        <p:cNvPr id="1" name=""/>
+        <p:cNvGrpSpPr/>
+        <p:nvPr/>
+      </p:nvGrpSpPr>
+      <p:grpSpPr>
+        <a:xfrm>
+          <a:off x="0" y="0"/>
+          <a:ext cx="0" cy="0"/>
+          <a:chOff x="0" y="0"/>
+          <a:chExt cx="0" cy="0"/>
+        </a:xfrm>
+      </p:grpSpPr>
+      <p:sp>
+        <p:nvSpPr>
+          <p:cNvPr id="2" name="Title 1"/>
+          <p:cNvSpPr>
+            <a:spLocks noGrp="1"/>
+          </p:cNvSpPr>
+          <p:nvPr>
+            <p:ph type="title"/>
+          </p:nvPr>
+        </p:nvSpPr>
+        <p:spPr/>
+        <p:txBody>
+          <a:bodyPr/>
+          <a:lstStyle/>
+          <a:p>
+            <a:r>
+              <a:rPr lang="en-US" dirty="0" smtClean="0"/>
+              <a:t>Conclusion</a:t>
+            </a:r>
+            <a:endParaRPr lang="en-US" dirty="0"/>
+          </a:p>
+        </p:txBody>
+      </p:sp>
+      <p:sp>
+        <p:nvSpPr>
+          <p:cNvPr id="3" name="Content Placeholder 2"/>
+          <p:cNvSpPr>
+            <a:spLocks noGrp="1"/>
+          </p:cNvSpPr>
+          <p:nvPr>
+            <p:ph idx="1"/>
+          </p:nvPr>
+        </p:nvSpPr>
+        <p:spPr/>
+        <p:txBody>
+          <a:bodyPr/>
+          <a:lstStyle/>
+          <a:p>
+            <a:r>
+              <a:rPr lang="en-US" dirty="0" smtClean="0"/>
+              <a:t>=P</a:t>
+            </a:r>
+          </a:p>
+          <a:p>
+            <a:endParaRPr lang="en-US" dirty="0" smtClean="0"/>
+          </a:p>
+          <a:p>
+            <a:endParaRPr lang="en-US" dirty="0" smtClean="0"/>
+          </a:p>
+          <a:p>
+            <a:endParaRPr lang="en-US" dirty="0" smtClean="0"/>
+          </a:p>
+          <a:p>
+            <a:endParaRPr lang="en-US" dirty="0"/>
+          </a:p>
+        </p:txBody>
+      </p:sp>
+    </p:spTree>
+  </p:cSld>
+  <p:clrMapOvr>
+    <a:masterClrMapping/>
+  </p:clrMapOvr>
+</p:sld>
+</file>
+
+<file path=ppt/slides/slide15.xml><?xml version="1.0" encoding="utf-8"?>
+<p:sld xmlns:a="http://schemas.openxmlformats.org/drawingml/2006/main" xmlns:r="http://schemas.openxmlformats.org/officeDocument/2006/relationships" xmlns:p="http://schemas.openxmlformats.org/presentationml/2006/main" showMasterSp="0">
+  <p:cSld>
+    <p:spTree>
+      <p:nvGrpSpPr>
+        <p:cNvPr id="1" name=""/>
+        <p:cNvGrpSpPr/>
+        <p:nvPr/>
+      </p:nvGrpSpPr>
+      <p:grpSpPr>
+        <a:xfrm>
+          <a:off x="0" y="0"/>
+          <a:ext cx="0" cy="0"/>
+          <a:chOff x="0" y="0"/>
+          <a:chExt cx="0" cy="0"/>
+        </a:xfrm>
+      </p:grpSpPr>
+      <p:sp>
+        <p:nvSpPr>
+          <p:cNvPr id="2" name="Title 1"/>
+          <p:cNvSpPr>
+            <a:spLocks noGrp="1"/>
+          </p:cNvSpPr>
+          <p:nvPr>
+            <p:ph type="title"/>
+          </p:nvPr>
+        </p:nvSpPr>
+        <p:spPr>
+          <a:xfrm>
+            <a:off x="0" y="2590800"/>
+            <a:ext cx="9144000" cy="1557528"/>
+          </a:xfrm>
+        </p:spPr>
+        <p:txBody>
+          <a:bodyPr/>
+          <a:lstStyle/>
+          <a:p>
+            <a:pPr algn="ctr"/>
+            <a:r>
+              <a:rPr lang="en-US" dirty="0" smtClean="0"/>
+              <a:t>Questions?</a:t>
+            </a:r>
+            <a:endParaRPr lang="en-US" dirty="0"/>
+          </a:p>
+        </p:txBody>
+      </p:sp>
     </p:spTree>
   </p:cSld>
   <p:clrMapOvr>
@@ -4485,38 +5707,107 @@
           </a:p>
         </p:txBody>
       </p:sp>
-      <p:sp>
-        <p:nvSpPr>
-          <p:cNvPr id="3" name="Content Placeholder 2"/>
-          <p:cNvSpPr>
-            <a:spLocks noGrp="1"/>
-          </p:cNvSpPr>
-          <p:nvPr>
-            <p:ph idx="1"/>
-          </p:nvPr>
-        </p:nvSpPr>
-        <p:spPr/>
-        <p:txBody>
-          <a:bodyPr/>
-          <a:lstStyle/>
+      <p:pic>
+        <p:nvPicPr>
+          <p:cNvPr id="1027" name="Picture 3" descr="C:\Users\Guilherme\Desktop\Skeletonization_Page_01.png"/>
+          <p:cNvPicPr>
+            <a:picLocks noChangeAspect="1" noChangeArrowheads="1"/>
+          </p:cNvPicPr>
+          <p:nvPr/>
+        </p:nvPicPr>
+        <p:blipFill>
+          <a:blip r:embed="rId2"/>
+          <a:srcRect/>
+          <a:stretch>
+            <a:fillRect/>
+          </a:stretch>
+        </p:blipFill>
+        <p:spPr bwMode="auto">
+          <a:xfrm>
+            <a:off x="304800" y="1600200"/>
+            <a:ext cx="3896497" cy="5029200"/>
+          </a:xfrm>
+          <a:prstGeom prst="rect">
+            <a:avLst/>
+          </a:prstGeom>
+          <a:noFill/>
+          <a:effectLst>
+            <a:outerShdw blurRad="50800" dist="38100" dir="2700000" algn="tl" rotWithShape="0">
+              <a:prstClr val="black">
+                <a:alpha val="40000"/>
+              </a:prstClr>
+            </a:outerShdw>
+          </a:effectLst>
+        </p:spPr>
+      </p:pic>
+      <p:sp>
+        <p:nvSpPr>
+          <p:cNvPr id="9" name="TextBox 8"/>
+          <p:cNvSpPr txBox="1"/>
+          <p:nvPr/>
+        </p:nvSpPr>
+        <p:spPr>
+          <a:xfrm>
+            <a:off x="4419600" y="1828800"/>
+            <a:ext cx="4267200" cy="2308324"/>
+          </a:xfrm>
+          <a:prstGeom prst="rect">
+            <a:avLst/>
+          </a:prstGeom>
+          <a:noFill/>
+        </p:spPr>
+        <p:txBody>
+          <a:bodyPr wrap="square" rtlCol="0">
+            <a:spAutoFit/>
+          </a:bodyPr>
+          <a:lstStyle/>
+          <a:p>
+            <a:r>
+              <a:rPr lang="en-US" b="1" dirty="0" smtClean="0"/>
+              <a:t>Skeleton extraction by mesh contraction. </a:t>
+            </a:r>
+          </a:p>
+          <a:p>
+            <a:endParaRPr lang="en-US" dirty="0" smtClean="0"/>
+          </a:p>
           <a:p>
             <a:r>
               <a:rPr lang="en-US" dirty="0" smtClean="0"/>
-              <a:t>=P</a:t>
-            </a:r>
+              <a:t>Au, O. K. C., </a:t>
+            </a:r>
+            <a:r>
+              <a:rPr lang="en-US" dirty="0" err="1" smtClean="0"/>
+              <a:t>Chiew-Lan</a:t>
+            </a:r>
+            <a:r>
+              <a:rPr lang="en-US" dirty="0" smtClean="0"/>
+              <a:t> Tai, Hung-</a:t>
+            </a:r>
+            <a:r>
+              <a:rPr lang="en-US" dirty="0" err="1" smtClean="0"/>
+              <a:t>Kuo</a:t>
+            </a:r>
+            <a:r>
+              <a:rPr lang="en-US" dirty="0" smtClean="0"/>
+              <a:t> Chu, Daniel Cohen-Or, and Tong-Yee Lee.  </a:t>
+            </a:r>
+          </a:p>
+          <a:p>
             <a:endParaRPr lang="en-US" dirty="0" smtClean="0"/>
           </a:p>
           <a:p>
-            <a:endParaRPr lang="en-US" dirty="0" smtClean="0"/>
-          </a:p>
-          <a:p>
-            <a:endParaRPr lang="en-US" dirty="0" smtClean="0"/>
-          </a:p>
-          <a:p>
-            <a:endParaRPr lang="en-US" dirty="0" smtClean="0"/>
-          </a:p>
-          <a:p>
-            <a:endParaRPr lang="en-US" dirty="0"/>
+            <a:r>
+              <a:rPr lang="en-US" i="1" dirty="0" smtClean="0"/>
+              <a:t>ACM Trans. Graph.</a:t>
+            </a:r>
+            <a:r>
+              <a:rPr lang="en-US" dirty="0" smtClean="0"/>
+              <a:t> 27, 3, Article 44 (August 2008)</a:t>
+            </a:r>
+            <a:endParaRPr lang="pt-BR" dirty="0" smtClean="0"/>
+          </a:p>
+          <a:p>
+            <a:endParaRPr lang="pt-BR" dirty="0"/>
           </a:p>
         </p:txBody>
       </p:sp>
@@ -4529,7 +5820,7 @@
 </file>
 
 <file path=ppt/slides/slide3.xml><?xml version="1.0" encoding="utf-8"?>
-<p:sld xmlns:a="http://schemas.openxmlformats.org/drawingml/2006/main" xmlns:r="http://schemas.openxmlformats.org/officeDocument/2006/relationships" xmlns:p="http://schemas.openxmlformats.org/presentationml/2006/main" showMasterSp="0">
+<p:sld xmlns:a="http://schemas.openxmlformats.org/drawingml/2006/main" xmlns:r="http://schemas.openxmlformats.org/officeDocument/2006/relationships" xmlns:p="http://schemas.openxmlformats.org/presentationml/2006/main">
   <p:cSld>
     <p:spTree>
       <p:nvGrpSpPr>
@@ -4545,6 +5836,32 @@
           <a:chExt cx="0" cy="0"/>
         </a:xfrm>
       </p:grpSpPr>
+      <p:pic>
+        <p:nvPicPr>
+          <p:cNvPr id="8194" name="Picture 2" descr="C:\Users\Guilherme\Desktop\Untitled.png"/>
+          <p:cNvPicPr>
+            <a:picLocks noChangeAspect="1" noChangeArrowheads="1"/>
+          </p:cNvPicPr>
+          <p:nvPr/>
+        </p:nvPicPr>
+        <p:blipFill>
+          <a:blip r:embed="rId2"/>
+          <a:srcRect/>
+          <a:stretch>
+            <a:fillRect/>
+          </a:stretch>
+        </p:blipFill>
+        <p:spPr bwMode="auto">
+          <a:xfrm>
+            <a:off x="2362200" y="3200400"/>
+            <a:ext cx="6735763" cy="3571875"/>
+          </a:xfrm>
+          <a:prstGeom prst="rect">
+            <a:avLst/>
+          </a:prstGeom>
+          <a:noFill/>
+        </p:spPr>
+      </p:pic>
       <p:sp>
         <p:nvSpPr>
           <p:cNvPr id="2" name="Title 1"/>
@@ -4555,25 +5872,2064 @@
             <p:ph type="title"/>
           </p:nvPr>
         </p:nvSpPr>
+        <p:spPr/>
+        <p:txBody>
+          <a:bodyPr/>
+          <a:lstStyle/>
+          <a:p>
+            <a:r>
+              <a:rPr lang="en-US" dirty="0" smtClean="0"/>
+              <a:t>Motivation</a:t>
+            </a:r>
+            <a:endParaRPr lang="en-US" dirty="0"/>
+          </a:p>
+        </p:txBody>
+      </p:sp>
+      <p:sp>
+        <p:nvSpPr>
+          <p:cNvPr id="3" name="Content Placeholder 2"/>
+          <p:cNvSpPr>
+            <a:spLocks noGrp="1"/>
+          </p:cNvSpPr>
+          <p:nvPr>
+            <p:ph idx="1"/>
+          </p:nvPr>
+        </p:nvSpPr>
+        <p:spPr/>
+        <p:txBody>
+          <a:bodyPr/>
+          <a:lstStyle/>
+          <a:p>
+            <a:r>
+              <a:rPr lang="en-US" dirty="0" smtClean="0"/>
+              <a:t>Model Animation</a:t>
+            </a:r>
+          </a:p>
+          <a:p>
+            <a:r>
+              <a:rPr lang="en-US" dirty="0" smtClean="0"/>
+              <a:t>Shape Retrieval</a:t>
+            </a:r>
+          </a:p>
+          <a:p>
+            <a:r>
+              <a:rPr lang="en-US" dirty="0" smtClean="0"/>
+              <a:t>Morphing</a:t>
+            </a:r>
+          </a:p>
+          <a:p>
+            <a:endParaRPr lang="en-US" dirty="0" smtClean="0"/>
+          </a:p>
+          <a:p>
+            <a:endParaRPr lang="en-US" dirty="0" smtClean="0"/>
+          </a:p>
+          <a:p>
+            <a:endParaRPr lang="en-US" dirty="0" smtClean="0"/>
+          </a:p>
+          <a:p>
+            <a:endParaRPr lang="en-US" dirty="0"/>
+          </a:p>
+        </p:txBody>
+      </p:sp>
+    </p:spTree>
+  </p:cSld>
+  <p:clrMapOvr>
+    <a:masterClrMapping/>
+  </p:clrMapOvr>
+</p:sld>
+</file>
+
+<file path=ppt/slides/slide4.xml><?xml version="1.0" encoding="utf-8"?>
+<p:sld xmlns:a="http://schemas.openxmlformats.org/drawingml/2006/main" xmlns:r="http://schemas.openxmlformats.org/officeDocument/2006/relationships" xmlns:p="http://schemas.openxmlformats.org/presentationml/2006/main">
+  <p:cSld>
+    <p:spTree>
+      <p:nvGrpSpPr>
+        <p:cNvPr id="1" name=""/>
+        <p:cNvGrpSpPr/>
+        <p:nvPr/>
+      </p:nvGrpSpPr>
+      <p:grpSpPr>
+        <a:xfrm>
+          <a:off x="0" y="0"/>
+          <a:ext cx="0" cy="0"/>
+          <a:chOff x="0" y="0"/>
+          <a:chExt cx="0" cy="0"/>
+        </a:xfrm>
+      </p:grpSpPr>
+      <p:sp>
+        <p:nvSpPr>
+          <p:cNvPr id="2" name="Title 1"/>
+          <p:cNvSpPr>
+            <a:spLocks noGrp="1"/>
+          </p:cNvSpPr>
+          <p:nvPr>
+            <p:ph type="title"/>
+          </p:nvPr>
+        </p:nvSpPr>
+        <p:spPr/>
+        <p:txBody>
+          <a:bodyPr/>
+          <a:lstStyle/>
+          <a:p>
+            <a:r>
+              <a:rPr lang="en-US" dirty="0" smtClean="0"/>
+              <a:t>Outline</a:t>
+            </a:r>
+            <a:endParaRPr lang="en-US" dirty="0"/>
+          </a:p>
+        </p:txBody>
+      </p:sp>
+      <p:sp>
+        <p:nvSpPr>
+          <p:cNvPr id="3" name="Content Placeholder 2"/>
+          <p:cNvSpPr>
+            <a:spLocks noGrp="1"/>
+          </p:cNvSpPr>
+          <p:nvPr>
+            <p:ph idx="1"/>
+          </p:nvPr>
+        </p:nvSpPr>
+        <p:spPr/>
+        <p:txBody>
+          <a:bodyPr/>
+          <a:lstStyle/>
+          <a:p>
+            <a:r>
+              <a:rPr lang="en-US" dirty="0" smtClean="0"/>
+              <a:t>Solution Overview</a:t>
+            </a:r>
+          </a:p>
+          <a:p>
+            <a:pPr lvl="1"/>
+            <a:r>
+              <a:rPr lang="en-US" dirty="0" smtClean="0">
+                <a:solidFill>
+                  <a:schemeClr val="accent1">
+                    <a:lumMod val="75000"/>
+                  </a:schemeClr>
+                </a:solidFill>
+              </a:rPr>
+              <a:t>Geometry Contraction</a:t>
+            </a:r>
+          </a:p>
+          <a:p>
+            <a:pPr lvl="1"/>
+            <a:r>
+              <a:rPr lang="en-US" dirty="0" smtClean="0"/>
+              <a:t>Connectivity Surgery</a:t>
+            </a:r>
+          </a:p>
+          <a:p>
+            <a:pPr lvl="1"/>
+            <a:r>
+              <a:rPr lang="en-US" dirty="0" smtClean="0"/>
+              <a:t>Embedding Refinement</a:t>
+            </a:r>
+          </a:p>
+          <a:p>
+            <a:r>
+              <a:rPr lang="en-US" dirty="0" smtClean="0"/>
+              <a:t>Results</a:t>
+            </a:r>
+          </a:p>
+          <a:p>
+            <a:r>
+              <a:rPr lang="en-US" dirty="0" smtClean="0"/>
+              <a:t>Conclusion</a:t>
+            </a:r>
+          </a:p>
+          <a:p>
+            <a:endParaRPr lang="en-US" dirty="0" smtClean="0"/>
+          </a:p>
+          <a:p>
+            <a:endParaRPr lang="en-US" dirty="0" smtClean="0"/>
+          </a:p>
+          <a:p>
+            <a:endParaRPr lang="en-US" dirty="0" smtClean="0"/>
+          </a:p>
+          <a:p>
+            <a:endParaRPr lang="en-US" dirty="0"/>
+          </a:p>
+        </p:txBody>
+      </p:sp>
+    </p:spTree>
+  </p:cSld>
+  <p:clrMapOvr>
+    <a:masterClrMapping/>
+  </p:clrMapOvr>
+</p:sld>
+</file>
+
+<file path=ppt/slides/slide5.xml><?xml version="1.0" encoding="utf-8"?>
+<p:sld xmlns:a="http://schemas.openxmlformats.org/drawingml/2006/main" xmlns:r="http://schemas.openxmlformats.org/officeDocument/2006/relationships" xmlns:p="http://schemas.openxmlformats.org/presentationml/2006/main">
+  <p:cSld>
+    <p:spTree>
+      <p:nvGrpSpPr>
+        <p:cNvPr id="1" name=""/>
+        <p:cNvGrpSpPr/>
+        <p:nvPr/>
+      </p:nvGrpSpPr>
+      <p:grpSpPr>
+        <a:xfrm>
+          <a:off x="0" y="0"/>
+          <a:ext cx="0" cy="0"/>
+          <a:chOff x="0" y="0"/>
+          <a:chExt cx="0" cy="0"/>
+        </a:xfrm>
+      </p:grpSpPr>
+      <p:sp>
+        <p:nvSpPr>
+          <p:cNvPr id="2" name="Title 1"/>
+          <p:cNvSpPr>
+            <a:spLocks noGrp="1"/>
+          </p:cNvSpPr>
+          <p:nvPr>
+            <p:ph type="title"/>
+          </p:nvPr>
+        </p:nvSpPr>
+        <p:spPr/>
+        <p:txBody>
+          <a:bodyPr/>
+          <a:lstStyle/>
+          <a:p>
+            <a:r>
+              <a:rPr lang="en-US" dirty="0" smtClean="0"/>
+              <a:t>Geometry Contraction</a:t>
+            </a:r>
+            <a:endParaRPr lang="en-US" dirty="0"/>
+          </a:p>
+        </p:txBody>
+      </p:sp>
+      <p:pic>
+        <p:nvPicPr>
+          <p:cNvPr id="6145" name="Picture 1"/>
+          <p:cNvPicPr>
+            <a:picLocks noChangeAspect="1" noChangeArrowheads="1"/>
+          </p:cNvPicPr>
+          <p:nvPr/>
+        </p:nvPicPr>
+        <p:blipFill>
+          <a:blip r:embed="rId2"/>
+          <a:srcRect/>
+          <a:stretch>
+            <a:fillRect/>
+          </a:stretch>
+        </p:blipFill>
+        <p:spPr bwMode="auto">
+          <a:xfrm>
+            <a:off x="4191000" y="1524000"/>
+            <a:ext cx="4876800" cy="2555577"/>
+          </a:xfrm>
+          <a:prstGeom prst="rect">
+            <a:avLst/>
+          </a:prstGeom>
+          <a:noFill/>
+          <a:ln w="9525">
+            <a:noFill/>
+            <a:miter lim="800000"/>
+            <a:headEnd/>
+            <a:tailEnd/>
+          </a:ln>
+          <a:effectLst/>
+        </p:spPr>
+      </p:pic>
+      <p:pic>
+        <p:nvPicPr>
+          <p:cNvPr id="6146" name="Picture 2"/>
+          <p:cNvPicPr>
+            <a:picLocks noChangeAspect="1" noChangeArrowheads="1"/>
+          </p:cNvPicPr>
+          <p:nvPr/>
+        </p:nvPicPr>
+        <p:blipFill>
+          <a:blip r:embed="rId3"/>
+          <a:srcRect/>
+          <a:stretch>
+            <a:fillRect/>
+          </a:stretch>
+        </p:blipFill>
+        <p:spPr bwMode="auto">
+          <a:xfrm>
+            <a:off x="4495800" y="4001777"/>
+            <a:ext cx="4343400" cy="2608573"/>
+          </a:xfrm>
+          <a:prstGeom prst="rect">
+            <a:avLst/>
+          </a:prstGeom>
+          <a:noFill/>
+          <a:ln w="9525">
+            <a:noFill/>
+            <a:miter lim="800000"/>
+            <a:headEnd/>
+            <a:tailEnd/>
+          </a:ln>
+          <a:effectLst/>
+        </p:spPr>
+      </p:pic>
+      <p:sp>
+        <p:nvSpPr>
+          <p:cNvPr id="8" name="Content Placeholder 2"/>
+          <p:cNvSpPr>
+            <a:spLocks noGrp="1"/>
+          </p:cNvSpPr>
+          <p:nvPr>
+            <p:ph idx="1"/>
+          </p:nvPr>
+        </p:nvSpPr>
         <p:spPr>
           <a:xfrm>
-            <a:off x="0" y="2590800"/>
-            <a:ext cx="9144000" cy="1557528"/>
+            <a:off x="457200" y="1775191"/>
+            <a:ext cx="3733800" cy="4625609"/>
           </a:xfrm>
         </p:spPr>
         <p:txBody>
           <a:bodyPr/>
           <a:lstStyle/>
           <a:p>
-            <a:pPr algn="ctr"/>
             <a:r>
               <a:rPr lang="en-US" dirty="0" smtClean="0"/>
-              <a:t>Questions?</a:t>
-            </a:r>
+              <a:t>Smoothly contract the mesh.</a:t>
+            </a:r>
+          </a:p>
+          <a:p>
+            <a:r>
+              <a:rPr lang="en-US" dirty="0" smtClean="0"/>
+              <a:t>Retain overall shape.</a:t>
+            </a:r>
+          </a:p>
+          <a:p>
+            <a:r>
+              <a:rPr lang="en-US" dirty="0" smtClean="0"/>
+              <a:t>Iterative process</a:t>
+            </a:r>
+          </a:p>
+          <a:p>
+            <a:endParaRPr lang="en-US" dirty="0" smtClean="0"/>
+          </a:p>
+          <a:p>
+            <a:endParaRPr lang="en-US" dirty="0" smtClean="0"/>
+          </a:p>
+          <a:p>
+            <a:endParaRPr lang="en-US" dirty="0" smtClean="0"/>
+          </a:p>
+          <a:p>
             <a:endParaRPr lang="en-US" dirty="0"/>
           </a:p>
         </p:txBody>
       </p:sp>
+    </p:spTree>
+  </p:cSld>
+  <p:clrMapOvr>
+    <a:masterClrMapping/>
+  </p:clrMapOvr>
+</p:sld>
+</file>
+
+<file path=ppt/slides/slide6.xml><?xml version="1.0" encoding="utf-8"?>
+<p:sld xmlns:a="http://schemas.openxmlformats.org/drawingml/2006/main" xmlns:r="http://schemas.openxmlformats.org/officeDocument/2006/relationships" xmlns:p="http://schemas.openxmlformats.org/presentationml/2006/main">
+  <p:cSld>
+    <p:spTree>
+      <p:nvGrpSpPr>
+        <p:cNvPr id="1" name=""/>
+        <p:cNvGrpSpPr/>
+        <p:nvPr/>
+      </p:nvGrpSpPr>
+      <p:grpSpPr>
+        <a:xfrm>
+          <a:off x="0" y="0"/>
+          <a:ext cx="0" cy="0"/>
+          <a:chOff x="0" y="0"/>
+          <a:chExt cx="0" cy="0"/>
+        </a:xfrm>
+      </p:grpSpPr>
+      <p:sp>
+        <p:nvSpPr>
+          <p:cNvPr id="2" name="Title 1"/>
+          <p:cNvSpPr>
+            <a:spLocks noGrp="1"/>
+          </p:cNvSpPr>
+          <p:nvPr>
+            <p:ph type="title"/>
+          </p:nvPr>
+        </p:nvSpPr>
+        <p:spPr/>
+        <p:txBody>
+          <a:bodyPr>
+            <a:normAutofit fontScale="90000"/>
+          </a:bodyPr>
+          <a:lstStyle/>
+          <a:p>
+            <a:r>
+              <a:rPr lang="en-US" dirty="0" smtClean="0"/>
+              <a:t>Geometry Contraction - Algorithm</a:t>
+            </a:r>
+            <a:endParaRPr lang="en-US" dirty="0"/>
+          </a:p>
+        </p:txBody>
+      </p:sp>
+      <p:sp>
+        <p:nvSpPr>
+          <p:cNvPr id="3" name="Content Placeholder 2"/>
+          <p:cNvSpPr>
+            <a:spLocks noGrp="1"/>
+          </p:cNvSpPr>
+          <p:nvPr>
+            <p:ph idx="1"/>
+          </p:nvPr>
+        </p:nvSpPr>
+        <p:spPr/>
+        <p:txBody>
+          <a:bodyPr/>
+          <a:lstStyle/>
+          <a:p>
+            <a:r>
+              <a:rPr lang="en-US" dirty="0" smtClean="0"/>
+              <a:t>Starting with the triangle mesh G=(V,E)</a:t>
+            </a:r>
+          </a:p>
+          <a:p>
+            <a:pPr lvl="1"/>
+            <a:r>
+              <a:rPr lang="en-US" dirty="0" smtClean="0"/>
+              <a:t>V = (V</a:t>
+            </a:r>
+            <a:r>
+              <a:rPr lang="en-US" baseline="-25000" dirty="0" smtClean="0"/>
+              <a:t>1</a:t>
+            </a:r>
+            <a:r>
+              <a:rPr lang="en-US" baseline="30000" dirty="0" smtClean="0"/>
+              <a:t>T</a:t>
+            </a:r>
+            <a:r>
+              <a:rPr lang="en-US" dirty="0" smtClean="0"/>
+              <a:t>, V</a:t>
+            </a:r>
+            <a:r>
+              <a:rPr lang="en-US" baseline="-25000" dirty="0" smtClean="0"/>
+              <a:t>2</a:t>
+            </a:r>
+            <a:r>
+              <a:rPr lang="en-US" baseline="30000" dirty="0" smtClean="0"/>
+              <a:t>T</a:t>
+            </a:r>
+            <a:r>
+              <a:rPr lang="en-US" dirty="0" smtClean="0"/>
+              <a:t>, ... </a:t>
+            </a:r>
+            <a:r>
+              <a:rPr lang="en-US" dirty="0" err="1" smtClean="0"/>
+              <a:t>V</a:t>
+            </a:r>
+            <a:r>
+              <a:rPr lang="en-US" baseline="-25000" dirty="0" err="1" smtClean="0"/>
+              <a:t>n</a:t>
+            </a:r>
+            <a:r>
+              <a:rPr lang="en-US" baseline="30000" dirty="0" err="1" smtClean="0"/>
+              <a:t>T</a:t>
+            </a:r>
+            <a:r>
+              <a:rPr lang="en-US" dirty="0" smtClean="0"/>
+              <a:t>)</a:t>
+            </a:r>
+          </a:p>
+          <a:p>
+            <a:pPr lvl="2"/>
+            <a:r>
+              <a:rPr lang="en-US" dirty="0" smtClean="0"/>
+              <a:t>V</a:t>
+            </a:r>
+            <a:r>
+              <a:rPr lang="en-US" baseline="-25000" dirty="0" smtClean="0"/>
+              <a:t>i</a:t>
+            </a:r>
+            <a:r>
+              <a:rPr lang="en-US" baseline="30000" dirty="0" smtClean="0"/>
+              <a:t>T  </a:t>
+            </a:r>
+            <a:r>
+              <a:rPr lang="en-US" dirty="0" smtClean="0"/>
+              <a:t>are the coordinates of vertex </a:t>
+            </a:r>
+            <a:r>
+              <a:rPr lang="en-US" dirty="0" err="1" smtClean="0"/>
+              <a:t>i</a:t>
+            </a:r>
+            <a:endParaRPr lang="en-US" dirty="0" smtClean="0"/>
+          </a:p>
+          <a:p>
+            <a:pPr lvl="1"/>
+            <a:r>
+              <a:rPr lang="en-US" dirty="0" smtClean="0"/>
+              <a:t>E = edges of G</a:t>
+            </a:r>
+          </a:p>
+          <a:p>
+            <a:r>
+              <a:rPr lang="en-US" dirty="0" smtClean="0"/>
+              <a:t>Find new vertices coordinates V’ such that the mesh G’=(V’,E) is a contracted version of G</a:t>
+            </a:r>
+          </a:p>
+          <a:p>
+            <a:endParaRPr lang="en-US" dirty="0" smtClean="0"/>
+          </a:p>
+          <a:p>
+            <a:endParaRPr lang="en-US" dirty="0" smtClean="0"/>
+          </a:p>
+          <a:p>
+            <a:endParaRPr lang="en-US" dirty="0"/>
+          </a:p>
+        </p:txBody>
+      </p:sp>
+    </p:spTree>
+  </p:cSld>
+  <p:clrMapOvr>
+    <a:masterClrMapping/>
+  </p:clrMapOvr>
+</p:sld>
+</file>
+
+<file path=ppt/slides/slide7.xml><?xml version="1.0" encoding="utf-8"?>
+<p:sld xmlns:a="http://schemas.openxmlformats.org/drawingml/2006/main" xmlns:r="http://schemas.openxmlformats.org/officeDocument/2006/relationships" xmlns:p="http://schemas.openxmlformats.org/presentationml/2006/main">
+  <p:cSld>
+    <p:spTree>
+      <p:nvGrpSpPr>
+        <p:cNvPr id="1" name=""/>
+        <p:cNvGrpSpPr/>
+        <p:nvPr/>
+      </p:nvGrpSpPr>
+      <p:grpSpPr>
+        <a:xfrm>
+          <a:off x="0" y="0"/>
+          <a:ext cx="0" cy="0"/>
+          <a:chOff x="0" y="0"/>
+          <a:chExt cx="0" cy="0"/>
+        </a:xfrm>
+      </p:grpSpPr>
+      <p:sp>
+        <p:nvSpPr>
+          <p:cNvPr id="2" name="Title 1"/>
+          <p:cNvSpPr>
+            <a:spLocks noGrp="1"/>
+          </p:cNvSpPr>
+          <p:nvPr>
+            <p:ph type="title"/>
+          </p:nvPr>
+        </p:nvSpPr>
+        <p:spPr/>
+        <p:txBody>
+          <a:bodyPr>
+            <a:normAutofit fontScale="90000"/>
+          </a:bodyPr>
+          <a:lstStyle/>
+          <a:p>
+            <a:r>
+              <a:rPr lang="en-US" dirty="0" smtClean="0"/>
+              <a:t>Geometry Contraction - Algorithm</a:t>
+            </a:r>
+            <a:endParaRPr lang="en-US" dirty="0"/>
+          </a:p>
+        </p:txBody>
+      </p:sp>
+      <p:sp>
+        <p:nvSpPr>
+          <p:cNvPr id="3" name="Content Placeholder 2"/>
+          <p:cNvSpPr>
+            <a:spLocks noGrp="1"/>
+          </p:cNvSpPr>
+          <p:nvPr>
+            <p:ph idx="1"/>
+          </p:nvPr>
+        </p:nvSpPr>
+        <p:spPr>
+          <a:xfrm>
+            <a:off x="457200" y="1851391"/>
+            <a:ext cx="8229600" cy="4244609"/>
+          </a:xfrm>
+        </p:spPr>
+        <p:txBody>
+          <a:bodyPr/>
+          <a:lstStyle/>
+          <a:p>
+            <a:r>
+              <a:rPr lang="en-US" dirty="0" smtClean="0"/>
+              <a:t>Find V’ by solving LV’ = 0</a:t>
+            </a:r>
+          </a:p>
+          <a:p>
+            <a:r>
+              <a:rPr lang="en-US" dirty="0" smtClean="0"/>
+              <a:t>L</a:t>
+            </a:r>
+            <a:r>
+              <a:rPr lang="en-US" baseline="-25000" dirty="0" smtClean="0"/>
+              <a:t>nxn</a:t>
+            </a:r>
+            <a:r>
+              <a:rPr lang="en-US" dirty="0" smtClean="0"/>
+              <a:t> is the curvature-flow </a:t>
+            </a:r>
+            <a:r>
+              <a:rPr lang="en-US" dirty="0" err="1" smtClean="0"/>
+              <a:t>laplacian</a:t>
+            </a:r>
+            <a:r>
+              <a:rPr lang="en-US" dirty="0" smtClean="0"/>
+              <a:t> operator:</a:t>
+            </a:r>
+          </a:p>
+          <a:p>
+            <a:endParaRPr lang="en-US" dirty="0" smtClean="0"/>
+          </a:p>
+          <a:p>
+            <a:pPr>
+              <a:buNone/>
+            </a:pPr>
+            <a:endParaRPr lang="en-US" dirty="0" smtClean="0"/>
+          </a:p>
+          <a:p>
+            <a:pPr>
+              <a:buNone/>
+            </a:pPr>
+            <a:endParaRPr lang="en-US" dirty="0" smtClean="0"/>
+          </a:p>
+          <a:p>
+            <a:pPr>
+              <a:buNone/>
+            </a:pPr>
+            <a:r>
+              <a:rPr lang="en-US" sz="2400" dirty="0" smtClean="0"/>
+              <a:t>   with </a:t>
+            </a:r>
+            <a:r>
+              <a:rPr lang="el-GR" sz="2400" dirty="0" smtClean="0"/>
+              <a:t>α</a:t>
+            </a:r>
+            <a:r>
+              <a:rPr lang="pt-BR" sz="2400" dirty="0" smtClean="0"/>
+              <a:t> and </a:t>
+            </a:r>
+            <a:r>
+              <a:rPr lang="el-GR" sz="2400" dirty="0" smtClean="0"/>
+              <a:t>β</a:t>
+            </a:r>
+            <a:r>
+              <a:rPr lang="pt-BR" sz="2400" dirty="0" smtClean="0"/>
+              <a:t> being the oposite angles of edge (i,j)</a:t>
+            </a:r>
+          </a:p>
+          <a:p>
+            <a:r>
+              <a:rPr lang="pt-BR" sz="2400" dirty="0" smtClean="0"/>
+              <a:t>The rows of L are the </a:t>
+            </a:r>
+            <a:r>
+              <a:rPr lang="pt-BR" sz="2400" i="1" dirty="0" smtClean="0">
+                <a:solidFill>
+                  <a:schemeClr val="accent1">
+                    <a:lumMod val="75000"/>
+                  </a:schemeClr>
+                </a:solidFill>
+              </a:rPr>
+              <a:t>contraction constraints</a:t>
+            </a:r>
+            <a:r>
+              <a:rPr lang="pt-BR" sz="2400" dirty="0" smtClean="0"/>
+              <a:t>.</a:t>
+            </a:r>
+            <a:endParaRPr lang="en-US" sz="2400" i="1" dirty="0" smtClean="0"/>
+          </a:p>
+        </p:txBody>
+      </p:sp>
+      <p:sp>
+        <p:nvSpPr>
+          <p:cNvPr id="25602" name="Rectangle 2"/>
+          <p:cNvSpPr>
+            <a:spLocks noChangeArrowheads="1"/>
+          </p:cNvSpPr>
+          <p:nvPr/>
+        </p:nvSpPr>
+        <p:spPr bwMode="auto">
+          <a:xfrm>
+            <a:off x="0" y="0"/>
+            <a:ext cx="9144000" cy="457200"/>
+          </a:xfrm>
+          <a:prstGeom prst="rect">
+            <a:avLst/>
+          </a:prstGeom>
+          <a:noFill/>
+          <a:ln w="9525">
+            <a:noFill/>
+            <a:miter lim="800000"/>
+            <a:headEnd/>
+            <a:tailEnd/>
+          </a:ln>
+          <a:effectLst/>
+        </p:spPr>
+        <p:txBody>
+          <a:bodyPr vert="horz" wrap="none" lIns="91440" tIns="45720" rIns="91440" bIns="45720" numCol="1" anchor="ctr" anchorCtr="0" compatLnSpc="1">
+            <a:prstTxWarp prst="textNoShape">
+              <a:avLst/>
+            </a:prstTxWarp>
+            <a:spAutoFit/>
+          </a:bodyPr>
+          <a:lstStyle/>
+          <a:p>
+            <a:endParaRPr lang="pt-BR"/>
+          </a:p>
+        </p:txBody>
+      </p:sp>
+      <p:sp>
+        <p:nvSpPr>
+          <p:cNvPr id="25605" name="Rectangle 5"/>
+          <p:cNvSpPr>
+            <a:spLocks noChangeArrowheads="1"/>
+          </p:cNvSpPr>
+          <p:nvPr/>
+        </p:nvSpPr>
+        <p:spPr bwMode="auto">
+          <a:xfrm>
+            <a:off x="0" y="0"/>
+            <a:ext cx="9144000" cy="457200"/>
+          </a:xfrm>
+          <a:prstGeom prst="rect">
+            <a:avLst/>
+          </a:prstGeom>
+          <a:noFill/>
+          <a:ln w="9525">
+            <a:noFill/>
+            <a:miter lim="800000"/>
+            <a:headEnd/>
+            <a:tailEnd/>
+          </a:ln>
+          <a:effectLst/>
+        </p:spPr>
+        <p:txBody>
+          <a:bodyPr vert="horz" wrap="none" lIns="91440" tIns="45720" rIns="91440" bIns="45720" numCol="1" anchor="ctr" anchorCtr="0" compatLnSpc="1">
+            <a:prstTxWarp prst="textNoShape">
+              <a:avLst/>
+            </a:prstTxWarp>
+            <a:spAutoFit/>
+          </a:bodyPr>
+          <a:lstStyle/>
+          <a:p>
+            <a:endParaRPr lang="pt-BR"/>
+          </a:p>
+        </p:txBody>
+      </p:sp>
+      <p:pic>
+        <p:nvPicPr>
+          <p:cNvPr id="25604" name="Picture 4"/>
+          <p:cNvPicPr>
+            <a:picLocks noChangeAspect="1" noChangeArrowheads="1"/>
+          </p:cNvPicPr>
+          <p:nvPr/>
+        </p:nvPicPr>
+        <p:blipFill>
+          <a:blip r:embed="rId2">
+            <a:clrChange>
+              <a:clrFrom>
+                <a:srgbClr val="FFFFFF"/>
+              </a:clrFrom>
+              <a:clrTo>
+                <a:srgbClr val="FFFFFF">
+                  <a:alpha val="0"/>
+                </a:srgbClr>
+              </a:clrTo>
+            </a:clrChange>
+          </a:blip>
+          <a:srcRect/>
+          <a:stretch>
+            <a:fillRect/>
+          </a:stretch>
+        </p:blipFill>
+        <p:spPr bwMode="auto">
+          <a:xfrm>
+            <a:off x="762000" y="3200400"/>
+            <a:ext cx="7162800" cy="1107649"/>
+          </a:xfrm>
+          <a:prstGeom prst="rect">
+            <a:avLst/>
+          </a:prstGeom>
+          <a:noFill/>
+        </p:spPr>
+      </p:pic>
+    </p:spTree>
+  </p:cSld>
+  <p:clrMapOvr>
+    <a:masterClrMapping/>
+  </p:clrMapOvr>
+</p:sld>
+</file>
+
+<file path=ppt/slides/slide8.xml><?xml version="1.0" encoding="utf-8"?>
+<p:sld xmlns:a="http://schemas.openxmlformats.org/drawingml/2006/main" xmlns:r="http://schemas.openxmlformats.org/officeDocument/2006/relationships" xmlns:p="http://schemas.openxmlformats.org/presentationml/2006/main">
+  <p:cSld>
+    <p:spTree>
+      <p:nvGrpSpPr>
+        <p:cNvPr id="1" name=""/>
+        <p:cNvGrpSpPr/>
+        <p:nvPr/>
+      </p:nvGrpSpPr>
+      <p:grpSpPr>
+        <a:xfrm>
+          <a:off x="0" y="0"/>
+          <a:ext cx="0" cy="0"/>
+          <a:chOff x="0" y="0"/>
+          <a:chExt cx="0" cy="0"/>
+        </a:xfrm>
+      </p:grpSpPr>
+      <p:sp>
+        <p:nvSpPr>
+          <p:cNvPr id="2" name="Title 1"/>
+          <p:cNvSpPr>
+            <a:spLocks noGrp="1"/>
+          </p:cNvSpPr>
+          <p:nvPr>
+            <p:ph type="title"/>
+          </p:nvPr>
+        </p:nvSpPr>
+        <p:spPr/>
+        <p:txBody>
+          <a:bodyPr>
+            <a:normAutofit fontScale="90000"/>
+          </a:bodyPr>
+          <a:lstStyle/>
+          <a:p>
+            <a:r>
+              <a:rPr lang="en-US" dirty="0" smtClean="0"/>
+              <a:t>Geometry Contraction - Algorithm</a:t>
+            </a:r>
+            <a:endParaRPr lang="en-US" dirty="0"/>
+          </a:p>
+        </p:txBody>
+      </p:sp>
+      <p:sp>
+        <p:nvSpPr>
+          <p:cNvPr id="3" name="Content Placeholder 2"/>
+          <p:cNvSpPr>
+            <a:spLocks noGrp="1"/>
+          </p:cNvSpPr>
+          <p:nvPr>
+            <p:ph idx="1"/>
+          </p:nvPr>
+        </p:nvSpPr>
+        <p:spPr>
+          <a:xfrm>
+            <a:off x="457200" y="1851391"/>
+            <a:ext cx="8229600" cy="4625609"/>
+          </a:xfrm>
+        </p:spPr>
+        <p:txBody>
+          <a:bodyPr>
+            <a:normAutofit/>
+          </a:bodyPr>
+          <a:lstStyle/>
+          <a:p>
+            <a:r>
+              <a:rPr lang="en-US" sz="2400" dirty="0" smtClean="0"/>
+              <a:t>Add more constraints to force a unique solution for V’, and ensure that the contracted mesh retain the overall original shape. The new constraints are called </a:t>
+            </a:r>
+            <a:r>
+              <a:rPr lang="en-US" sz="2400" i="1" dirty="0" smtClean="0">
+                <a:solidFill>
+                  <a:schemeClr val="accent1">
+                    <a:lumMod val="75000"/>
+                  </a:schemeClr>
+                </a:solidFill>
+              </a:rPr>
+              <a:t>attraction constraints.</a:t>
+            </a:r>
+          </a:p>
+          <a:p>
+            <a:r>
+              <a:rPr lang="en-US" sz="2400" dirty="0" smtClean="0"/>
+              <a:t>System LV’ = 0 becomes</a:t>
+            </a:r>
+          </a:p>
+          <a:p>
+            <a:pPr>
+              <a:buNone/>
+            </a:pPr>
+            <a:endParaRPr lang="en-US" sz="2400" dirty="0" smtClean="0"/>
+          </a:p>
+          <a:p>
+            <a:pPr>
+              <a:buNone/>
+            </a:pPr>
+            <a:endParaRPr lang="en-US" sz="2400" dirty="0" smtClean="0"/>
+          </a:p>
+          <a:p>
+            <a:pPr>
+              <a:buNone/>
+            </a:pPr>
+            <a:endParaRPr lang="en-US" sz="2400" dirty="0" smtClean="0"/>
+          </a:p>
+          <a:p>
+            <a:pPr>
+              <a:buNone/>
+            </a:pPr>
+            <a:r>
+              <a:rPr lang="en-US" sz="2400" dirty="0" smtClean="0"/>
+              <a:t>     where  and  are diagonal matrices to balance the contraction and attraction factors respectively.</a:t>
+            </a:r>
+          </a:p>
+          <a:p>
+            <a:r>
+              <a:rPr lang="en-US" sz="2400" dirty="0" smtClean="0"/>
+              <a:t>The new system is over-determined.</a:t>
+            </a:r>
+          </a:p>
+          <a:p>
+            <a:r>
+              <a:rPr lang="en-US" sz="2400" dirty="0" smtClean="0"/>
+              <a:t>Uses least-squares to solve.</a:t>
+            </a:r>
+          </a:p>
+        </p:txBody>
+      </p:sp>
+      <p:sp>
+        <p:nvSpPr>
+          <p:cNvPr id="25602" name="Rectangle 2"/>
+          <p:cNvSpPr>
+            <a:spLocks noChangeArrowheads="1"/>
+          </p:cNvSpPr>
+          <p:nvPr/>
+        </p:nvSpPr>
+        <p:spPr bwMode="auto">
+          <a:xfrm>
+            <a:off x="0" y="0"/>
+            <a:ext cx="9144000" cy="457200"/>
+          </a:xfrm>
+          <a:prstGeom prst="rect">
+            <a:avLst/>
+          </a:prstGeom>
+          <a:noFill/>
+          <a:ln w="9525">
+            <a:noFill/>
+            <a:miter lim="800000"/>
+            <a:headEnd/>
+            <a:tailEnd/>
+          </a:ln>
+          <a:effectLst/>
+        </p:spPr>
+        <p:txBody>
+          <a:bodyPr vert="horz" wrap="none" lIns="91440" tIns="45720" rIns="91440" bIns="45720" numCol="1" anchor="ctr" anchorCtr="0" compatLnSpc="1">
+            <a:prstTxWarp prst="textNoShape">
+              <a:avLst/>
+            </a:prstTxWarp>
+            <a:spAutoFit/>
+          </a:bodyPr>
+          <a:lstStyle/>
+          <a:p>
+            <a:endParaRPr lang="pt-BR"/>
+          </a:p>
+        </p:txBody>
+      </p:sp>
+      <p:sp>
+        <p:nvSpPr>
+          <p:cNvPr id="25605" name="Rectangle 5"/>
+          <p:cNvSpPr>
+            <a:spLocks noChangeArrowheads="1"/>
+          </p:cNvSpPr>
+          <p:nvPr/>
+        </p:nvSpPr>
+        <p:spPr bwMode="auto">
+          <a:xfrm>
+            <a:off x="0" y="0"/>
+            <a:ext cx="9144000" cy="457200"/>
+          </a:xfrm>
+          <a:prstGeom prst="rect">
+            <a:avLst/>
+          </a:prstGeom>
+          <a:noFill/>
+          <a:ln w="9525">
+            <a:noFill/>
+            <a:miter lim="800000"/>
+            <a:headEnd/>
+            <a:tailEnd/>
+          </a:ln>
+          <a:effectLst/>
+        </p:spPr>
+        <p:txBody>
+          <a:bodyPr vert="horz" wrap="none" lIns="91440" tIns="45720" rIns="91440" bIns="45720" numCol="1" anchor="ctr" anchorCtr="0" compatLnSpc="1">
+            <a:prstTxWarp prst="textNoShape">
+              <a:avLst/>
+            </a:prstTxWarp>
+            <a:spAutoFit/>
+          </a:bodyPr>
+          <a:lstStyle/>
+          <a:p>
+            <a:endParaRPr lang="pt-BR"/>
+          </a:p>
+        </p:txBody>
+      </p:sp>
+      <p:sp>
+        <p:nvSpPr>
+          <p:cNvPr id="27650" name="Rectangle 2"/>
+          <p:cNvSpPr>
+            <a:spLocks noChangeArrowheads="1"/>
+          </p:cNvSpPr>
+          <p:nvPr/>
+        </p:nvSpPr>
+        <p:spPr bwMode="auto">
+          <a:xfrm>
+            <a:off x="0" y="0"/>
+            <a:ext cx="9144000" cy="457200"/>
+          </a:xfrm>
+          <a:prstGeom prst="rect">
+            <a:avLst/>
+          </a:prstGeom>
+          <a:noFill/>
+          <a:ln w="9525">
+            <a:noFill/>
+            <a:miter lim="800000"/>
+            <a:headEnd/>
+            <a:tailEnd/>
+          </a:ln>
+          <a:effectLst/>
+        </p:spPr>
+        <p:txBody>
+          <a:bodyPr vert="horz" wrap="none" lIns="91440" tIns="45720" rIns="91440" bIns="45720" numCol="1" anchor="ctr" anchorCtr="0" compatLnSpc="1">
+            <a:prstTxWarp prst="textNoShape">
+              <a:avLst/>
+            </a:prstTxWarp>
+            <a:spAutoFit/>
+          </a:bodyPr>
+          <a:lstStyle/>
+          <a:p>
+            <a:endParaRPr lang="pt-BR"/>
+          </a:p>
+        </p:txBody>
+      </p:sp>
+      <p:pic>
+        <p:nvPicPr>
+          <p:cNvPr id="27649" name="Picture 1"/>
+          <p:cNvPicPr>
+            <a:picLocks noChangeAspect="1" noChangeArrowheads="1"/>
+          </p:cNvPicPr>
+          <p:nvPr/>
+        </p:nvPicPr>
+        <p:blipFill>
+          <a:blip r:embed="rId2">
+            <a:clrChange>
+              <a:clrFrom>
+                <a:srgbClr val="FFFFFF"/>
+              </a:clrFrom>
+              <a:clrTo>
+                <a:srgbClr val="FFFFFF">
+                  <a:alpha val="0"/>
+                </a:srgbClr>
+              </a:clrTo>
+            </a:clrChange>
+          </a:blip>
+          <a:srcRect/>
+          <a:stretch>
+            <a:fillRect/>
+          </a:stretch>
+        </p:blipFill>
+        <p:spPr bwMode="auto">
+          <a:xfrm>
+            <a:off x="2819400" y="3657600"/>
+            <a:ext cx="2701636" cy="762000"/>
+          </a:xfrm>
+          <a:prstGeom prst="rect">
+            <a:avLst/>
+          </a:prstGeom>
+          <a:noFill/>
+        </p:spPr>
+      </p:pic>
+      <p:sp>
+        <p:nvSpPr>
+          <p:cNvPr id="27651" name="Rectangle 3"/>
+          <p:cNvSpPr>
+            <a:spLocks noChangeArrowheads="1"/>
+          </p:cNvSpPr>
+          <p:nvPr/>
+        </p:nvSpPr>
+        <p:spPr bwMode="auto">
+          <a:xfrm>
+            <a:off x="0" y="876300"/>
+            <a:ext cx="9144000" cy="457200"/>
+          </a:xfrm>
+          <a:prstGeom prst="rect">
+            <a:avLst/>
+          </a:prstGeom>
+          <a:noFill/>
+          <a:ln w="9525">
+            <a:noFill/>
+            <a:miter lim="800000"/>
+            <a:headEnd/>
+            <a:tailEnd/>
+          </a:ln>
+          <a:effectLst/>
+        </p:spPr>
+        <p:txBody>
+          <a:bodyPr vert="horz" wrap="none" lIns="91440" tIns="45720" rIns="91440" bIns="45720" numCol="1" anchor="ctr" anchorCtr="0" compatLnSpc="1">
+            <a:prstTxWarp prst="textNoShape">
+              <a:avLst/>
+            </a:prstTxWarp>
+            <a:spAutoFit/>
+          </a:bodyPr>
+          <a:lstStyle/>
+          <a:p>
+            <a:pPr marL="0" marR="0" lvl="0" indent="0" algn="ctr" defTabSz="914400" rtl="0" eaLnBrk="1" fontAlgn="base" latinLnBrk="0" hangingPunct="1">
+              <a:lnSpc>
+                <a:spcPct val="100000"/>
+              </a:lnSpc>
+              <a:spcBef>
+                <a:spcPct val="0"/>
+              </a:spcBef>
+              <a:spcAft>
+                <a:spcPct val="0"/>
+              </a:spcAft>
+              <a:buClrTx/>
+              <a:buSzTx/>
+              <a:buFontTx/>
+              <a:buNone/>
+              <a:tabLst/>
+            </a:pPr>
+            <a:r>
+              <a:rPr kumimoji="0" lang="en-US" sz="1400" b="1" i="0" u="none" strike="noStrike" cap="none" normalizeH="0" baseline="0" smtClean="0">
+                <a:ln>
+                  <a:noFill/>
+                </a:ln>
+                <a:solidFill>
+                  <a:schemeClr val="tx1"/>
+                </a:solidFill>
+                <a:effectLst/>
+                <a:latin typeface="Calibri" pitchFamily="34" charset="0"/>
+                <a:ea typeface="Times New Roman" pitchFamily="18" charset="0"/>
+                <a:cs typeface="Times New Roman" pitchFamily="18" charset="0"/>
+              </a:rPr>
+              <a:t>         (3)</a:t>
+            </a:r>
+            <a:endParaRPr kumimoji="0" lang="en-US" sz="1800" b="0" i="0" u="none" strike="noStrike" cap="none" normalizeH="0" baseline="0" smtClean="0">
+              <a:ln>
+                <a:noFill/>
+              </a:ln>
+              <a:solidFill>
+                <a:schemeClr val="tx1"/>
+              </a:solidFill>
+              <a:effectLst/>
+              <a:latin typeface="Arial" pitchFamily="34" charset="0"/>
+              <a:cs typeface="Arial" pitchFamily="34" charset="0"/>
+            </a:endParaRPr>
+          </a:p>
+        </p:txBody>
+      </p:sp>
+    </p:spTree>
+  </p:cSld>
+  <p:clrMapOvr>
+    <a:masterClrMapping/>
+  </p:clrMapOvr>
+</p:sld>
+</file>
+
+<file path=ppt/slides/slide9.xml><?xml version="1.0" encoding="utf-8"?>
+<p:sld xmlns:a="http://schemas.openxmlformats.org/drawingml/2006/main" xmlns:r="http://schemas.openxmlformats.org/officeDocument/2006/relationships" xmlns:p="http://schemas.openxmlformats.org/presentationml/2006/main">
+  <p:cSld>
+    <p:spTree>
+      <p:nvGrpSpPr>
+        <p:cNvPr id="1" name=""/>
+        <p:cNvGrpSpPr/>
+        <p:nvPr/>
+      </p:nvGrpSpPr>
+      <p:grpSpPr>
+        <a:xfrm>
+          <a:off x="0" y="0"/>
+          <a:ext cx="0" cy="0"/>
+          <a:chOff x="0" y="0"/>
+          <a:chExt cx="0" cy="0"/>
+        </a:xfrm>
+      </p:grpSpPr>
+      <p:sp>
+        <p:nvSpPr>
+          <p:cNvPr id="2" name="Title 1"/>
+          <p:cNvSpPr>
+            <a:spLocks noGrp="1"/>
+          </p:cNvSpPr>
+          <p:nvPr>
+            <p:ph type="title"/>
+          </p:nvPr>
+        </p:nvSpPr>
+        <p:spPr/>
+        <p:txBody>
+          <a:bodyPr>
+            <a:normAutofit fontScale="90000"/>
+          </a:bodyPr>
+          <a:lstStyle/>
+          <a:p>
+            <a:r>
+              <a:rPr lang="en-US" dirty="0" smtClean="0"/>
+              <a:t>Geometry Contraction - Algorithm</a:t>
+            </a:r>
+            <a:endParaRPr lang="en-US" dirty="0"/>
+          </a:p>
+        </p:txBody>
+      </p:sp>
+      <p:sp>
+        <p:nvSpPr>
+          <p:cNvPr id="3" name="Content Placeholder 2"/>
+          <p:cNvSpPr>
+            <a:spLocks noGrp="1"/>
+          </p:cNvSpPr>
+          <p:nvPr>
+            <p:ph idx="1"/>
+          </p:nvPr>
+        </p:nvSpPr>
+        <p:spPr>
+          <a:xfrm>
+            <a:off x="457200" y="1851391"/>
+            <a:ext cx="8229600" cy="4625609"/>
+          </a:xfrm>
+        </p:spPr>
+        <p:txBody>
+          <a:bodyPr>
+            <a:normAutofit lnSpcReduction="10000"/>
+          </a:bodyPr>
+          <a:lstStyle/>
+          <a:p>
+            <a:pPr>
+              <a:buNone/>
+            </a:pPr>
+            <a:r>
+              <a:rPr lang="en-US" sz="3600" dirty="0" smtClean="0"/>
+              <a:t>Iteration </a:t>
+            </a:r>
+            <a:r>
+              <a:rPr lang="en-US" sz="3600" i="1" dirty="0" smtClean="0"/>
+              <a:t>t</a:t>
+            </a:r>
+          </a:p>
+          <a:p>
+            <a:pPr marL="633222" indent="-514350">
+              <a:buFont typeface="+mj-lt"/>
+              <a:buAutoNum type="arabicPeriod"/>
+            </a:pPr>
+            <a:r>
+              <a:rPr lang="en-US" sz="2800" dirty="0" smtClean="0"/>
+              <a:t>Solve                                            for</a:t>
+            </a:r>
+          </a:p>
+          <a:p>
+            <a:pPr marL="633222" indent="-514350">
+              <a:buFont typeface="+mj-lt"/>
+              <a:buAutoNum type="arabicPeriod"/>
+            </a:pPr>
+            <a:endParaRPr lang="en-US" sz="2800" dirty="0" smtClean="0"/>
+          </a:p>
+          <a:p>
+            <a:pPr marL="633222" indent="-514350">
+              <a:buFont typeface="+mj-lt"/>
+              <a:buAutoNum type="arabicPeriod"/>
+            </a:pPr>
+            <a:r>
+              <a:rPr lang="en-US" sz="2800" dirty="0" smtClean="0"/>
+              <a:t>Update</a:t>
+            </a:r>
+          </a:p>
+          <a:p>
+            <a:pPr marL="633222" indent="-514350">
+              <a:buFont typeface="+mj-lt"/>
+              <a:buAutoNum type="arabicPeriod"/>
+            </a:pPr>
+            <a:endParaRPr lang="en-US" sz="2800" dirty="0" smtClean="0"/>
+          </a:p>
+          <a:p>
+            <a:pPr marL="633222" lvl="0" indent="-514350">
+              <a:buFont typeface="+mj-lt"/>
+              <a:buAutoNum type="arabicPeriod"/>
+            </a:pPr>
+            <a:r>
+              <a:rPr lang="en-US" sz="2800" dirty="0" smtClean="0"/>
+              <a:t>Update                                        where      and      are the current and the original one-ring area of the vertex </a:t>
+            </a:r>
+            <a:r>
+              <a:rPr lang="en-US" sz="2800" dirty="0" err="1" smtClean="0"/>
+              <a:t>i</a:t>
+            </a:r>
+            <a:r>
+              <a:rPr lang="en-US" sz="2800" dirty="0" smtClean="0"/>
+              <a:t>.</a:t>
+            </a:r>
+            <a:endParaRPr lang="pt-BR" sz="2800" dirty="0" smtClean="0"/>
+          </a:p>
+          <a:p>
+            <a:pPr marL="633222" lvl="0" indent="-514350">
+              <a:buFont typeface="+mj-lt"/>
+              <a:buAutoNum type="arabicPeriod"/>
+            </a:pPr>
+            <a:r>
+              <a:rPr lang="en-US" sz="2800" dirty="0" smtClean="0"/>
+              <a:t>Compute the new           with the new          vertex positions </a:t>
+            </a:r>
+            <a:endParaRPr lang="pt-BR" sz="2800" dirty="0" smtClean="0"/>
+          </a:p>
+          <a:p>
+            <a:pPr marL="633222" indent="-514350">
+              <a:buNone/>
+            </a:pPr>
+            <a:r>
+              <a:rPr lang="en-US" sz="2800" dirty="0" smtClean="0"/>
+              <a:t>   </a:t>
+            </a:r>
+          </a:p>
+        </p:txBody>
+      </p:sp>
+      <p:sp>
+        <p:nvSpPr>
+          <p:cNvPr id="25602" name="Rectangle 2"/>
+          <p:cNvSpPr>
+            <a:spLocks noChangeArrowheads="1"/>
+          </p:cNvSpPr>
+          <p:nvPr/>
+        </p:nvSpPr>
+        <p:spPr bwMode="auto">
+          <a:xfrm>
+            <a:off x="0" y="0"/>
+            <a:ext cx="9144000" cy="457200"/>
+          </a:xfrm>
+          <a:prstGeom prst="rect">
+            <a:avLst/>
+          </a:prstGeom>
+          <a:noFill/>
+          <a:ln w="9525">
+            <a:noFill/>
+            <a:miter lim="800000"/>
+            <a:headEnd/>
+            <a:tailEnd/>
+          </a:ln>
+          <a:effectLst/>
+        </p:spPr>
+        <p:txBody>
+          <a:bodyPr vert="horz" wrap="none" lIns="91440" tIns="45720" rIns="91440" bIns="45720" numCol="1" anchor="ctr" anchorCtr="0" compatLnSpc="1">
+            <a:prstTxWarp prst="textNoShape">
+              <a:avLst/>
+            </a:prstTxWarp>
+            <a:spAutoFit/>
+          </a:bodyPr>
+          <a:lstStyle/>
+          <a:p>
+            <a:endParaRPr lang="pt-BR"/>
+          </a:p>
+        </p:txBody>
+      </p:sp>
+      <p:sp>
+        <p:nvSpPr>
+          <p:cNvPr id="25605" name="Rectangle 5"/>
+          <p:cNvSpPr>
+            <a:spLocks noChangeArrowheads="1"/>
+          </p:cNvSpPr>
+          <p:nvPr/>
+        </p:nvSpPr>
+        <p:spPr bwMode="auto">
+          <a:xfrm>
+            <a:off x="0" y="0"/>
+            <a:ext cx="9144000" cy="457200"/>
+          </a:xfrm>
+          <a:prstGeom prst="rect">
+            <a:avLst/>
+          </a:prstGeom>
+          <a:noFill/>
+          <a:ln w="9525">
+            <a:noFill/>
+            <a:miter lim="800000"/>
+            <a:headEnd/>
+            <a:tailEnd/>
+          </a:ln>
+          <a:effectLst/>
+        </p:spPr>
+        <p:txBody>
+          <a:bodyPr vert="horz" wrap="none" lIns="91440" tIns="45720" rIns="91440" bIns="45720" numCol="1" anchor="ctr" anchorCtr="0" compatLnSpc="1">
+            <a:prstTxWarp prst="textNoShape">
+              <a:avLst/>
+            </a:prstTxWarp>
+            <a:spAutoFit/>
+          </a:bodyPr>
+          <a:lstStyle/>
+          <a:p>
+            <a:endParaRPr lang="pt-BR"/>
+          </a:p>
+        </p:txBody>
+      </p:sp>
+      <p:sp>
+        <p:nvSpPr>
+          <p:cNvPr id="27650" name="Rectangle 2"/>
+          <p:cNvSpPr>
+            <a:spLocks noChangeArrowheads="1"/>
+          </p:cNvSpPr>
+          <p:nvPr/>
+        </p:nvSpPr>
+        <p:spPr bwMode="auto">
+          <a:xfrm>
+            <a:off x="0" y="0"/>
+            <a:ext cx="9144000" cy="457200"/>
+          </a:xfrm>
+          <a:prstGeom prst="rect">
+            <a:avLst/>
+          </a:prstGeom>
+          <a:noFill/>
+          <a:ln w="9525">
+            <a:noFill/>
+            <a:miter lim="800000"/>
+            <a:headEnd/>
+            <a:tailEnd/>
+          </a:ln>
+          <a:effectLst/>
+        </p:spPr>
+        <p:txBody>
+          <a:bodyPr vert="horz" wrap="none" lIns="91440" tIns="45720" rIns="91440" bIns="45720" numCol="1" anchor="ctr" anchorCtr="0" compatLnSpc="1">
+            <a:prstTxWarp prst="textNoShape">
+              <a:avLst/>
+            </a:prstTxWarp>
+            <a:spAutoFit/>
+          </a:bodyPr>
+          <a:lstStyle/>
+          <a:p>
+            <a:endParaRPr lang="pt-BR"/>
+          </a:p>
+        </p:txBody>
+      </p:sp>
+      <p:sp>
+        <p:nvSpPr>
+          <p:cNvPr id="28674" name="Rectangle 2"/>
+          <p:cNvSpPr>
+            <a:spLocks noChangeArrowheads="1"/>
+          </p:cNvSpPr>
+          <p:nvPr/>
+        </p:nvSpPr>
+        <p:spPr bwMode="auto">
+          <a:xfrm>
+            <a:off x="0" y="0"/>
+            <a:ext cx="9144000" cy="0"/>
+          </a:xfrm>
+          <a:prstGeom prst="rect">
+            <a:avLst/>
+          </a:prstGeom>
+          <a:noFill/>
+          <a:ln w="9525">
+            <a:noFill/>
+            <a:miter lim="800000"/>
+            <a:headEnd/>
+            <a:tailEnd/>
+          </a:ln>
+          <a:effectLst/>
+        </p:spPr>
+        <p:txBody>
+          <a:bodyPr vert="horz" wrap="none" lIns="91440" tIns="45720" rIns="91440" bIns="45720" numCol="1" anchor="ctr" anchorCtr="0" compatLnSpc="1">
+            <a:prstTxWarp prst="textNoShape">
+              <a:avLst/>
+            </a:prstTxWarp>
+            <a:spAutoFit/>
+          </a:bodyPr>
+          <a:lstStyle/>
+          <a:p>
+            <a:endParaRPr lang="pt-BR"/>
+          </a:p>
+        </p:txBody>
+      </p:sp>
+      <p:sp>
+        <p:nvSpPr>
+          <p:cNvPr id="28676" name="Rectangle 4"/>
+          <p:cNvSpPr>
+            <a:spLocks noChangeArrowheads="1"/>
+          </p:cNvSpPr>
+          <p:nvPr/>
+        </p:nvSpPr>
+        <p:spPr bwMode="auto">
+          <a:xfrm>
+            <a:off x="0" y="0"/>
+            <a:ext cx="9144000" cy="0"/>
+          </a:xfrm>
+          <a:prstGeom prst="rect">
+            <a:avLst/>
+          </a:prstGeom>
+          <a:noFill/>
+          <a:ln w="9525">
+            <a:noFill/>
+            <a:miter lim="800000"/>
+            <a:headEnd/>
+            <a:tailEnd/>
+          </a:ln>
+          <a:effectLst/>
+        </p:spPr>
+        <p:txBody>
+          <a:bodyPr vert="horz" wrap="none" lIns="91440" tIns="45720" rIns="91440" bIns="45720" numCol="1" anchor="ctr" anchorCtr="0" compatLnSpc="1">
+            <a:prstTxWarp prst="textNoShape">
+              <a:avLst/>
+            </a:prstTxWarp>
+            <a:spAutoFit/>
+          </a:bodyPr>
+          <a:lstStyle/>
+          <a:p>
+            <a:endParaRPr lang="pt-BR"/>
+          </a:p>
+        </p:txBody>
+      </p:sp>
+      <p:pic>
+        <p:nvPicPr>
+          <p:cNvPr id="28675" name="Picture 3"/>
+          <p:cNvPicPr>
+            <a:picLocks noChangeAspect="1" noChangeArrowheads="1"/>
+          </p:cNvPicPr>
+          <p:nvPr/>
+        </p:nvPicPr>
+        <p:blipFill>
+          <a:blip r:embed="rId2">
+            <a:clrChange>
+              <a:clrFrom>
+                <a:srgbClr val="FFFFFF"/>
+              </a:clrFrom>
+              <a:clrTo>
+                <a:srgbClr val="FFFFFF">
+                  <a:alpha val="0"/>
+                </a:srgbClr>
+              </a:clrTo>
+            </a:clrChange>
+          </a:blip>
+          <a:srcRect/>
+          <a:stretch>
+            <a:fillRect/>
+          </a:stretch>
+        </p:blipFill>
+        <p:spPr bwMode="auto">
+          <a:xfrm>
+            <a:off x="2097657" y="2286000"/>
+            <a:ext cx="2702943" cy="762000"/>
+          </a:xfrm>
+          <a:prstGeom prst="rect">
+            <a:avLst/>
+          </a:prstGeom>
+          <a:noFill/>
+        </p:spPr>
+      </p:pic>
+      <p:sp>
+        <p:nvSpPr>
+          <p:cNvPr id="28678" name="Rectangle 6"/>
+          <p:cNvSpPr>
+            <a:spLocks noChangeArrowheads="1"/>
+          </p:cNvSpPr>
+          <p:nvPr/>
+        </p:nvSpPr>
+        <p:spPr bwMode="auto">
+          <a:xfrm>
+            <a:off x="0" y="0"/>
+            <a:ext cx="9144000" cy="0"/>
+          </a:xfrm>
+          <a:prstGeom prst="rect">
+            <a:avLst/>
+          </a:prstGeom>
+          <a:noFill/>
+          <a:ln w="9525">
+            <a:noFill/>
+            <a:miter lim="800000"/>
+            <a:headEnd/>
+            <a:tailEnd/>
+          </a:ln>
+          <a:effectLst/>
+        </p:spPr>
+        <p:txBody>
+          <a:bodyPr vert="horz" wrap="none" lIns="91440" tIns="45720" rIns="91440" bIns="45720" numCol="1" anchor="ctr" anchorCtr="0" compatLnSpc="1">
+            <a:prstTxWarp prst="textNoShape">
+              <a:avLst/>
+            </a:prstTxWarp>
+            <a:spAutoFit/>
+          </a:bodyPr>
+          <a:lstStyle/>
+          <a:p>
+            <a:endParaRPr lang="pt-BR"/>
+          </a:p>
+        </p:txBody>
+      </p:sp>
+      <p:pic>
+        <p:nvPicPr>
+          <p:cNvPr id="28677" name="Picture 5"/>
+          <p:cNvPicPr>
+            <a:picLocks noChangeAspect="1" noChangeArrowheads="1"/>
+          </p:cNvPicPr>
+          <p:nvPr/>
+        </p:nvPicPr>
+        <p:blipFill>
+          <a:blip r:embed="rId3">
+            <a:clrChange>
+              <a:clrFrom>
+                <a:srgbClr val="FFFFFF"/>
+              </a:clrFrom>
+              <a:clrTo>
+                <a:srgbClr val="FFFFFF">
+                  <a:alpha val="0"/>
+                </a:srgbClr>
+              </a:clrTo>
+            </a:clrChange>
+          </a:blip>
+          <a:srcRect/>
+          <a:stretch>
+            <a:fillRect/>
+          </a:stretch>
+        </p:blipFill>
+        <p:spPr bwMode="auto">
+          <a:xfrm>
+            <a:off x="5638800" y="2438400"/>
+            <a:ext cx="553914" cy="400049"/>
+          </a:xfrm>
+          <a:prstGeom prst="rect">
+            <a:avLst/>
+          </a:prstGeom>
+          <a:noFill/>
+        </p:spPr>
+      </p:pic>
+      <p:sp>
+        <p:nvSpPr>
+          <p:cNvPr id="28680" name="Rectangle 8"/>
+          <p:cNvSpPr>
+            <a:spLocks noChangeArrowheads="1"/>
+          </p:cNvSpPr>
+          <p:nvPr/>
+        </p:nvSpPr>
+        <p:spPr bwMode="auto">
+          <a:xfrm>
+            <a:off x="0" y="0"/>
+            <a:ext cx="9144000" cy="0"/>
+          </a:xfrm>
+          <a:prstGeom prst="rect">
+            <a:avLst/>
+          </a:prstGeom>
+          <a:noFill/>
+          <a:ln w="9525">
+            <a:noFill/>
+            <a:miter lim="800000"/>
+            <a:headEnd/>
+            <a:tailEnd/>
+          </a:ln>
+          <a:effectLst/>
+        </p:spPr>
+        <p:txBody>
+          <a:bodyPr vert="horz" wrap="none" lIns="91440" tIns="45720" rIns="91440" bIns="45720" numCol="1" anchor="ctr" anchorCtr="0" compatLnSpc="1">
+            <a:prstTxWarp prst="textNoShape">
+              <a:avLst/>
+            </a:prstTxWarp>
+            <a:spAutoFit/>
+          </a:bodyPr>
+          <a:lstStyle/>
+          <a:p>
+            <a:endParaRPr lang="pt-BR"/>
+          </a:p>
+        </p:txBody>
+      </p:sp>
+      <p:pic>
+        <p:nvPicPr>
+          <p:cNvPr id="28679" name="Picture 7"/>
+          <p:cNvPicPr>
+            <a:picLocks noChangeAspect="1" noChangeArrowheads="1"/>
+          </p:cNvPicPr>
+          <p:nvPr/>
+        </p:nvPicPr>
+        <p:blipFill>
+          <a:blip r:embed="rId4">
+            <a:clrChange>
+              <a:clrFrom>
+                <a:srgbClr val="FFFFFF"/>
+              </a:clrFrom>
+              <a:clrTo>
+                <a:srgbClr val="FFFFFF">
+                  <a:alpha val="0"/>
+                </a:srgbClr>
+              </a:clrTo>
+            </a:clrChange>
+          </a:blip>
+          <a:srcRect/>
+          <a:stretch>
+            <a:fillRect/>
+          </a:stretch>
+        </p:blipFill>
+        <p:spPr bwMode="auto">
+          <a:xfrm>
+            <a:off x="2362200" y="3200400"/>
+            <a:ext cx="1759656" cy="409575"/>
+          </a:xfrm>
+          <a:prstGeom prst="rect">
+            <a:avLst/>
+          </a:prstGeom>
+          <a:noFill/>
+        </p:spPr>
+      </p:pic>
+      <p:sp>
+        <p:nvSpPr>
+          <p:cNvPr id="28682" name="Rectangle 10"/>
+          <p:cNvSpPr>
+            <a:spLocks noChangeArrowheads="1"/>
+          </p:cNvSpPr>
+          <p:nvPr/>
+        </p:nvSpPr>
+        <p:spPr bwMode="auto">
+          <a:xfrm>
+            <a:off x="0" y="0"/>
+            <a:ext cx="9144000" cy="0"/>
+          </a:xfrm>
+          <a:prstGeom prst="rect">
+            <a:avLst/>
+          </a:prstGeom>
+          <a:noFill/>
+          <a:ln w="9525">
+            <a:noFill/>
+            <a:miter lim="800000"/>
+            <a:headEnd/>
+            <a:tailEnd/>
+          </a:ln>
+          <a:effectLst/>
+        </p:spPr>
+        <p:txBody>
+          <a:bodyPr vert="horz" wrap="none" lIns="91440" tIns="45720" rIns="91440" bIns="45720" numCol="1" anchor="ctr" anchorCtr="0" compatLnSpc="1">
+            <a:prstTxWarp prst="textNoShape">
+              <a:avLst/>
+            </a:prstTxWarp>
+            <a:spAutoFit/>
+          </a:bodyPr>
+          <a:lstStyle/>
+          <a:p>
+            <a:endParaRPr lang="pt-BR"/>
+          </a:p>
+        </p:txBody>
+      </p:sp>
+      <p:pic>
+        <p:nvPicPr>
+          <p:cNvPr id="28681" name="Picture 9"/>
+          <p:cNvPicPr>
+            <a:picLocks noChangeAspect="1" noChangeArrowheads="1"/>
+          </p:cNvPicPr>
+          <p:nvPr/>
+        </p:nvPicPr>
+        <p:blipFill>
+          <a:blip r:embed="rId5">
+            <a:clrChange>
+              <a:clrFrom>
+                <a:srgbClr val="FFFFFF"/>
+              </a:clrFrom>
+              <a:clrTo>
+                <a:srgbClr val="FFFFFF">
+                  <a:alpha val="0"/>
+                </a:srgbClr>
+              </a:clrTo>
+            </a:clrChange>
+          </a:blip>
+          <a:srcRect/>
+          <a:stretch>
+            <a:fillRect/>
+          </a:stretch>
+        </p:blipFill>
+        <p:spPr bwMode="auto">
+          <a:xfrm>
+            <a:off x="2362200" y="3761936"/>
+            <a:ext cx="2483304" cy="695325"/>
+          </a:xfrm>
+          <a:prstGeom prst="rect">
+            <a:avLst/>
+          </a:prstGeom>
+          <a:noFill/>
+        </p:spPr>
+      </p:pic>
+      <p:sp>
+        <p:nvSpPr>
+          <p:cNvPr id="28684" name="Rectangle 12"/>
+          <p:cNvSpPr>
+            <a:spLocks noChangeArrowheads="1"/>
+          </p:cNvSpPr>
+          <p:nvPr/>
+        </p:nvSpPr>
+        <p:spPr bwMode="auto">
+          <a:xfrm>
+            <a:off x="0" y="0"/>
+            <a:ext cx="9144000" cy="0"/>
+          </a:xfrm>
+          <a:prstGeom prst="rect">
+            <a:avLst/>
+          </a:prstGeom>
+          <a:noFill/>
+          <a:ln w="9525">
+            <a:noFill/>
+            <a:miter lim="800000"/>
+            <a:headEnd/>
+            <a:tailEnd/>
+          </a:ln>
+          <a:effectLst/>
+        </p:spPr>
+        <p:txBody>
+          <a:bodyPr vert="horz" wrap="none" lIns="91440" tIns="45720" rIns="91440" bIns="45720" numCol="1" anchor="ctr" anchorCtr="0" compatLnSpc="1">
+            <a:prstTxWarp prst="textNoShape">
+              <a:avLst/>
+            </a:prstTxWarp>
+            <a:spAutoFit/>
+          </a:bodyPr>
+          <a:lstStyle/>
+          <a:p>
+            <a:endParaRPr lang="pt-BR"/>
+          </a:p>
+        </p:txBody>
+      </p:sp>
+      <p:pic>
+        <p:nvPicPr>
+          <p:cNvPr id="28683" name="Picture 11"/>
+          <p:cNvPicPr>
+            <a:picLocks noChangeAspect="1" noChangeArrowheads="1"/>
+          </p:cNvPicPr>
+          <p:nvPr/>
+        </p:nvPicPr>
+        <p:blipFill>
+          <a:blip r:embed="rId6">
+            <a:clrChange>
+              <a:clrFrom>
+                <a:srgbClr val="FFFFFF"/>
+              </a:clrFrom>
+              <a:clrTo>
+                <a:srgbClr val="FFFFFF">
+                  <a:alpha val="0"/>
+                </a:srgbClr>
+              </a:clrTo>
+            </a:clrChange>
+          </a:blip>
+          <a:srcRect/>
+          <a:stretch>
+            <a:fillRect/>
+          </a:stretch>
+        </p:blipFill>
+        <p:spPr bwMode="auto">
+          <a:xfrm>
+            <a:off x="6019800" y="3963967"/>
+            <a:ext cx="304800" cy="417094"/>
+          </a:xfrm>
+          <a:prstGeom prst="rect">
+            <a:avLst/>
+          </a:prstGeom>
+          <a:noFill/>
+        </p:spPr>
+      </p:pic>
+      <p:sp>
+        <p:nvSpPr>
+          <p:cNvPr id="28686" name="Rectangle 14"/>
+          <p:cNvSpPr>
+            <a:spLocks noChangeArrowheads="1"/>
+          </p:cNvSpPr>
+          <p:nvPr/>
+        </p:nvSpPr>
+        <p:spPr bwMode="auto">
+          <a:xfrm>
+            <a:off x="0" y="0"/>
+            <a:ext cx="9144000" cy="0"/>
+          </a:xfrm>
+          <a:prstGeom prst="rect">
+            <a:avLst/>
+          </a:prstGeom>
+          <a:noFill/>
+          <a:ln w="9525">
+            <a:noFill/>
+            <a:miter lim="800000"/>
+            <a:headEnd/>
+            <a:tailEnd/>
+          </a:ln>
+          <a:effectLst/>
+        </p:spPr>
+        <p:txBody>
+          <a:bodyPr vert="horz" wrap="none" lIns="91440" tIns="45720" rIns="91440" bIns="45720" numCol="1" anchor="ctr" anchorCtr="0" compatLnSpc="1">
+            <a:prstTxWarp prst="textNoShape">
+              <a:avLst/>
+            </a:prstTxWarp>
+            <a:spAutoFit/>
+          </a:bodyPr>
+          <a:lstStyle/>
+          <a:p>
+            <a:endParaRPr lang="pt-BR"/>
+          </a:p>
+        </p:txBody>
+      </p:sp>
+      <p:pic>
+        <p:nvPicPr>
+          <p:cNvPr id="28685" name="Picture 13"/>
+          <p:cNvPicPr>
+            <a:picLocks noChangeAspect="1" noChangeArrowheads="1"/>
+          </p:cNvPicPr>
+          <p:nvPr/>
+        </p:nvPicPr>
+        <p:blipFill>
+          <a:blip r:embed="rId7">
+            <a:clrChange>
+              <a:clrFrom>
+                <a:srgbClr val="FFFFFF"/>
+              </a:clrFrom>
+              <a:clrTo>
+                <a:srgbClr val="FFFFFF">
+                  <a:alpha val="0"/>
+                </a:srgbClr>
+              </a:clrTo>
+            </a:clrChange>
+          </a:blip>
+          <a:srcRect/>
+          <a:stretch>
+            <a:fillRect/>
+          </a:stretch>
+        </p:blipFill>
+        <p:spPr bwMode="auto">
+          <a:xfrm>
+            <a:off x="7010400" y="3971486"/>
+            <a:ext cx="318558" cy="409575"/>
+          </a:xfrm>
+          <a:prstGeom prst="rect">
+            <a:avLst/>
+          </a:prstGeom>
+          <a:noFill/>
+        </p:spPr>
+      </p:pic>
+      <p:sp>
+        <p:nvSpPr>
+          <p:cNvPr id="28688" name="Rectangle 16"/>
+          <p:cNvSpPr>
+            <a:spLocks noChangeArrowheads="1"/>
+          </p:cNvSpPr>
+          <p:nvPr/>
+        </p:nvSpPr>
+        <p:spPr bwMode="auto">
+          <a:xfrm>
+            <a:off x="0" y="0"/>
+            <a:ext cx="9144000" cy="0"/>
+          </a:xfrm>
+          <a:prstGeom prst="rect">
+            <a:avLst/>
+          </a:prstGeom>
+          <a:noFill/>
+          <a:ln w="9525">
+            <a:noFill/>
+            <a:miter lim="800000"/>
+            <a:headEnd/>
+            <a:tailEnd/>
+          </a:ln>
+          <a:effectLst/>
+        </p:spPr>
+        <p:txBody>
+          <a:bodyPr vert="horz" wrap="none" lIns="91440" tIns="45720" rIns="91440" bIns="45720" numCol="1" anchor="ctr" anchorCtr="0" compatLnSpc="1">
+            <a:prstTxWarp prst="textNoShape">
+              <a:avLst/>
+            </a:prstTxWarp>
+            <a:spAutoFit/>
+          </a:bodyPr>
+          <a:lstStyle/>
+          <a:p>
+            <a:endParaRPr lang="pt-BR"/>
+          </a:p>
+        </p:txBody>
+      </p:sp>
+      <p:pic>
+        <p:nvPicPr>
+          <p:cNvPr id="28687" name="Picture 15"/>
+          <p:cNvPicPr>
+            <a:picLocks noChangeAspect="1" noChangeArrowheads="1"/>
+          </p:cNvPicPr>
+          <p:nvPr/>
+        </p:nvPicPr>
+        <p:blipFill>
+          <a:blip r:embed="rId8">
+            <a:clrChange>
+              <a:clrFrom>
+                <a:srgbClr val="FFFFFF"/>
+              </a:clrFrom>
+              <a:clrTo>
+                <a:srgbClr val="FFFFFF">
+                  <a:alpha val="0"/>
+                </a:srgbClr>
+              </a:clrTo>
+            </a:clrChange>
+          </a:blip>
+          <a:srcRect/>
+          <a:stretch>
+            <a:fillRect/>
+          </a:stretch>
+        </p:blipFill>
+        <p:spPr bwMode="auto">
+          <a:xfrm>
+            <a:off x="3881071" y="5128554"/>
+            <a:ext cx="538529" cy="400050"/>
+          </a:xfrm>
+          <a:prstGeom prst="rect">
+            <a:avLst/>
+          </a:prstGeom>
+          <a:noFill/>
+        </p:spPr>
+      </p:pic>
+      <p:sp>
+        <p:nvSpPr>
+          <p:cNvPr id="28690" name="Rectangle 18"/>
+          <p:cNvSpPr>
+            <a:spLocks noChangeArrowheads="1"/>
+          </p:cNvSpPr>
+          <p:nvPr/>
+        </p:nvSpPr>
+        <p:spPr bwMode="auto">
+          <a:xfrm>
+            <a:off x="0" y="0"/>
+            <a:ext cx="9144000" cy="0"/>
+          </a:xfrm>
+          <a:prstGeom prst="rect">
+            <a:avLst/>
+          </a:prstGeom>
+          <a:noFill/>
+          <a:ln w="9525">
+            <a:noFill/>
+            <a:miter lim="800000"/>
+            <a:headEnd/>
+            <a:tailEnd/>
+          </a:ln>
+          <a:effectLst/>
+        </p:spPr>
+        <p:txBody>
+          <a:bodyPr vert="horz" wrap="none" lIns="91440" tIns="45720" rIns="91440" bIns="45720" numCol="1" anchor="ctr" anchorCtr="0" compatLnSpc="1">
+            <a:prstTxWarp prst="textNoShape">
+              <a:avLst/>
+            </a:prstTxWarp>
+            <a:spAutoFit/>
+          </a:bodyPr>
+          <a:lstStyle/>
+          <a:p>
+            <a:endParaRPr lang="pt-BR"/>
+          </a:p>
+        </p:txBody>
+      </p:sp>
+      <p:pic>
+        <p:nvPicPr>
+          <p:cNvPr id="28689" name="Picture 17"/>
+          <p:cNvPicPr>
+            <a:picLocks noChangeAspect="1" noChangeArrowheads="1"/>
+          </p:cNvPicPr>
+          <p:nvPr/>
+        </p:nvPicPr>
+        <p:blipFill>
+          <a:blip r:embed="rId3">
+            <a:clrChange>
+              <a:clrFrom>
+                <a:srgbClr val="FFFFFF"/>
+              </a:clrFrom>
+              <a:clrTo>
+                <a:srgbClr val="FFFFFF">
+                  <a:alpha val="0"/>
+                </a:srgbClr>
+              </a:clrTo>
+            </a:clrChange>
+          </a:blip>
+          <a:srcRect/>
+          <a:stretch>
+            <a:fillRect/>
+          </a:stretch>
+        </p:blipFill>
+        <p:spPr bwMode="auto">
+          <a:xfrm>
+            <a:off x="6477000" y="5153464"/>
+            <a:ext cx="553915" cy="400050"/>
+          </a:xfrm>
+          <a:prstGeom prst="rect">
+            <a:avLst/>
+          </a:prstGeom>
+          <a:noFill/>
+        </p:spPr>
+      </p:pic>
     </p:spTree>
   </p:cSld>
   <p:clrMapOvr>

</xml_diff>

<commit_message>
presentation e techreport quase prontos
</commit_message>
<xml_diff>
--- a/Docs/Presentation.pptx
+++ b/Docs/Presentation.pptx
@@ -5,7 +5,7 @@
     <p:sldMasterId id="2147483960" r:id="rId1"/>
   </p:sldMasterIdLst>
   <p:notesMasterIdLst>
-    <p:notesMasterId r:id="rId17"/>
+    <p:notesMasterId r:id="rId23"/>
   </p:notesMasterIdLst>
   <p:sldIdLst>
     <p:sldId id="256" r:id="rId2"/>
@@ -19,10 +19,16 @@
     <p:sldId id="269" r:id="rId10"/>
     <p:sldId id="270" r:id="rId11"/>
     <p:sldId id="263" r:id="rId12"/>
-    <p:sldId id="262" r:id="rId13"/>
-    <p:sldId id="264" r:id="rId14"/>
-    <p:sldId id="265" r:id="rId15"/>
-    <p:sldId id="258" r:id="rId16"/>
+    <p:sldId id="272" r:id="rId13"/>
+    <p:sldId id="271" r:id="rId14"/>
+    <p:sldId id="273" r:id="rId15"/>
+    <p:sldId id="262" r:id="rId16"/>
+    <p:sldId id="264" r:id="rId17"/>
+    <p:sldId id="275" r:id="rId18"/>
+    <p:sldId id="274" r:id="rId19"/>
+    <p:sldId id="276" r:id="rId20"/>
+    <p:sldId id="265" r:id="rId21"/>
+    <p:sldId id="258" r:id="rId22"/>
   </p:sldIdLst>
   <p:sldSz cx="9144000" cy="6858000" type="screen4x3"/>
   <p:notesSz cx="6858000" cy="9144000"/>
@@ -369,7 +375,7 @@
             <a:fld id="{1C8F9D5F-DA09-4F20-8EE9-51D9513DAE68}" type="slidenum">
               <a:rPr lang="en-US" smtClean="0"/>
               <a:pPr/>
-              <a:t>‹#›</a:t>
+              <a:t>‹nº›</a:t>
             </a:fld>
             <a:endParaRPr lang="en-US"/>
           </a:p>
@@ -862,7 +868,7 @@
             <a:fld id="{B6F15528-21DE-4FAA-801E-634DDDAF4B2B}" type="slidenum">
               <a:rPr lang="en-US" smtClean="0"/>
               <a:pPr/>
-              <a:t>‹#›</a:t>
+              <a:t>‹nº›</a:t>
             </a:fld>
             <a:endParaRPr lang="en-US"/>
           </a:p>
@@ -1087,7 +1093,7 @@
             <a:fld id="{B6F15528-21DE-4FAA-801E-634DDDAF4B2B}" type="slidenum">
               <a:rPr lang="en-US" smtClean="0"/>
               <a:pPr/>
-              <a:t>‹#›</a:t>
+              <a:t>‹nº›</a:t>
             </a:fld>
             <a:endParaRPr lang="en-US"/>
           </a:p>
@@ -1374,7 +1380,7 @@
             <a:fld id="{B6F15528-21DE-4FAA-801E-634DDDAF4B2B}" type="slidenum">
               <a:rPr lang="en-US" smtClean="0"/>
               <a:pPr/>
-              <a:t>‹#›</a:t>
+              <a:t>‹nº›</a:t>
             </a:fld>
             <a:endParaRPr lang="en-US"/>
           </a:p>
@@ -1570,7 +1576,7 @@
             <a:fld id="{B6F15528-21DE-4FAA-801E-634DDDAF4B2B}" type="slidenum">
               <a:rPr lang="en-US" smtClean="0"/>
               <a:pPr/>
-              <a:t>‹#›</a:t>
+              <a:t>‹nº›</a:t>
             </a:fld>
             <a:endParaRPr lang="en-US"/>
           </a:p>
@@ -1925,7 +1931,7 @@
             <a:fld id="{B6F15528-21DE-4FAA-801E-634DDDAF4B2B}" type="slidenum">
               <a:rPr lang="en-US" smtClean="0"/>
               <a:pPr/>
-              <a:t>‹#›</a:t>
+              <a:t>‹nº›</a:t>
             </a:fld>
             <a:endParaRPr lang="en-US"/>
           </a:p>
@@ -2214,7 +2220,7 @@
             <a:fld id="{B6F15528-21DE-4FAA-801E-634DDDAF4B2B}" type="slidenum">
               <a:rPr lang="en-US" smtClean="0"/>
               <a:pPr/>
-              <a:t>‹#›</a:t>
+              <a:t>‹nº›</a:t>
             </a:fld>
             <a:endParaRPr lang="en-US"/>
           </a:p>
@@ -2638,7 +2644,7 @@
             <a:fld id="{B6F15528-21DE-4FAA-801E-634DDDAF4B2B}" type="slidenum">
               <a:rPr lang="en-US" smtClean="0"/>
               <a:pPr/>
-              <a:t>‹#›</a:t>
+              <a:t>‹nº›</a:t>
             </a:fld>
             <a:endParaRPr lang="en-US"/>
           </a:p>
@@ -2755,7 +2761,7 @@
             <a:fld id="{B6F15528-21DE-4FAA-801E-634DDDAF4B2B}" type="slidenum">
               <a:rPr lang="en-US" smtClean="0"/>
               <a:pPr/>
-              <a:t>‹#›</a:t>
+              <a:t>‹nº›</a:t>
             </a:fld>
             <a:endParaRPr lang="en-US"/>
           </a:p>
@@ -2847,7 +2853,7 @@
             <a:fld id="{B6F15528-21DE-4FAA-801E-634DDDAF4B2B}" type="slidenum">
               <a:rPr lang="en-US" smtClean="0"/>
               <a:pPr/>
-              <a:t>‹#›</a:t>
+              <a:t>‹nº›</a:t>
             </a:fld>
             <a:endParaRPr lang="en-US"/>
           </a:p>
@@ -3127,7 +3133,7 @@
             <a:fld id="{B6F15528-21DE-4FAA-801E-634DDDAF4B2B}" type="slidenum">
               <a:rPr lang="en-US" smtClean="0"/>
               <a:pPr/>
-              <a:t>‹#›</a:t>
+              <a:t>‹nº›</a:t>
             </a:fld>
             <a:endParaRPr lang="en-US"/>
           </a:p>
@@ -3604,7 +3610,7 @@
             <a:fld id="{B6F15528-21DE-4FAA-801E-634DDDAF4B2B}" type="slidenum">
               <a:rPr lang="en-US" smtClean="0"/>
               <a:pPr/>
-              <a:t>‹#›</a:t>
+              <a:t>‹nº›</a:t>
             </a:fld>
             <a:endParaRPr lang="en-US"/>
           </a:p>
@@ -3995,7 +4001,7 @@
             <a:fld id="{B6F15528-21DE-4FAA-801E-634DDDAF4B2B}" type="slidenum">
               <a:rPr lang="en-US" smtClean="0"/>
               <a:pPr/>
-              <a:t>‹#›</a:t>
+              <a:t>‹nº›</a:t>
             </a:fld>
             <a:endParaRPr lang="en-US"/>
           </a:p>
@@ -4486,13 +4492,13 @@
         <p:spPr/>
         <p:txBody>
           <a:bodyPr>
-            <a:normAutofit fontScale="90000"/>
+            <a:normAutofit/>
           </a:bodyPr>
           <a:lstStyle/>
           <a:p>
             <a:r>
               <a:rPr lang="en-US" dirty="0" smtClean="0"/>
-              <a:t>Geometry Contraction - Algorithm</a:t>
+              <a:t>Geometry Contraction</a:t>
             </a:r>
             <a:endParaRPr lang="en-US" dirty="0"/>
           </a:p>
@@ -5322,27 +5328,271 @@
           </a:p>
         </p:txBody>
       </p:sp>
+      <p:sp>
+        <p:nvSpPr>
+          <p:cNvPr id="5" name="Content Placeholder 2"/>
+          <p:cNvSpPr txBox="1">
+            <a:spLocks/>
+          </p:cNvSpPr>
+          <p:nvPr/>
+        </p:nvSpPr>
+        <p:spPr>
+          <a:xfrm>
+            <a:off x="609600" y="1927591"/>
+            <a:ext cx="8229600" cy="4625609"/>
+          </a:xfrm>
+          <a:prstGeom prst="rect">
+            <a:avLst/>
+          </a:prstGeom>
+        </p:spPr>
+        <p:txBody>
+          <a:bodyPr vert="horz" lIns="54864" tIns="91440" rtlCol="0">
+            <a:normAutofit/>
+          </a:bodyPr>
+          <a:lstStyle/>
+          <a:p>
+            <a:pPr marL="438912" lvl="0" indent="-320040">
+              <a:buClr>
+                <a:schemeClr val="accent1"/>
+              </a:buClr>
+              <a:buSzPct val="80000"/>
+              <a:buFont typeface="Wingdings 2"/>
+              <a:buChar char=""/>
+            </a:pPr>
+            <a:r>
+              <a:rPr lang="en-US" sz="3200" dirty="0" smtClean="0"/>
+              <a:t>Quadric Error Metric Simplification</a:t>
+            </a:r>
+          </a:p>
+          <a:p>
+            <a:pPr marL="438912" indent="-320040">
+              <a:buClr>
+                <a:schemeClr val="accent1"/>
+              </a:buClr>
+              <a:buSzPct val="80000"/>
+              <a:buFont typeface="Wingdings 2"/>
+              <a:buChar char=""/>
+            </a:pPr>
+            <a:r>
+              <a:rPr lang="en-US" sz="3200" dirty="0" smtClean="0"/>
+              <a:t>GARLAND , M . , and HECKBERT, P. S </a:t>
+            </a:r>
+            <a:r>
+              <a:rPr lang="en-US" sz="3200" dirty="0" smtClean="0">
+                <a:solidFill>
+                  <a:schemeClr val="accent1">
+                    <a:lumMod val="75000"/>
+                  </a:schemeClr>
+                </a:solidFill>
+              </a:rPr>
+              <a:t>Surface </a:t>
+            </a:r>
+            <a:r>
+              <a:rPr lang="en-US" sz="3200" dirty="0" err="1" smtClean="0">
+                <a:solidFill>
+                  <a:schemeClr val="accent1">
+                    <a:lumMod val="75000"/>
+                  </a:schemeClr>
+                </a:solidFill>
+              </a:rPr>
+              <a:t>simpliﬁcation</a:t>
+            </a:r>
+            <a:r>
+              <a:rPr lang="en-US" sz="3200" dirty="0" smtClean="0">
+                <a:solidFill>
+                  <a:schemeClr val="accent1">
+                    <a:lumMod val="75000"/>
+                  </a:schemeClr>
+                </a:solidFill>
+              </a:rPr>
+              <a:t> using quadric error metrics</a:t>
+            </a:r>
+            <a:r>
+              <a:rPr lang="en-US" sz="3200" dirty="0" smtClean="0"/>
+              <a:t>. In </a:t>
+            </a:r>
+            <a:r>
+              <a:rPr lang="en-US" sz="3200" i="1" dirty="0" smtClean="0"/>
+              <a:t>Proceedings of ACM SIGGRAPH 97</a:t>
+            </a:r>
+            <a:endParaRPr lang="pt-BR" sz="3200" dirty="0" smtClean="0"/>
+          </a:p>
+          <a:p>
+            <a:pPr marL="438912" lvl="0" indent="-320040">
+              <a:buClr>
+                <a:schemeClr val="accent1"/>
+              </a:buClr>
+              <a:buSzPct val="80000"/>
+              <a:buFont typeface="Wingdings 2"/>
+              <a:buChar char=""/>
+            </a:pPr>
+            <a:endParaRPr kumimoji="0" lang="en-US" sz="3200" b="0" i="0" u="none" strike="noStrike" kern="1200" cap="none" spc="0" normalizeH="0" baseline="0" noProof="0" dirty="0" smtClean="0">
+              <a:ln>
+                <a:noFill/>
+              </a:ln>
+              <a:solidFill>
+                <a:schemeClr val="tx1"/>
+              </a:solidFill>
+              <a:effectLst/>
+              <a:uLnTx/>
+              <a:uFillTx/>
+              <a:latin typeface="+mn-lt"/>
+              <a:ea typeface="+mn-ea"/>
+              <a:cs typeface="+mn-cs"/>
+            </a:endParaRPr>
+          </a:p>
+          <a:p>
+            <a:pPr marL="438912" marR="0" lvl="0" indent="-320040" algn="l" defTabSz="914400" rtl="0" eaLnBrk="1" fontAlgn="auto" latinLnBrk="0" hangingPunct="1">
+              <a:lnSpc>
+                <a:spcPct val="100000"/>
+              </a:lnSpc>
+              <a:spcBef>
+                <a:spcPts val="0"/>
+              </a:spcBef>
+              <a:spcAft>
+                <a:spcPts val="0"/>
+              </a:spcAft>
+              <a:buClr>
+                <a:schemeClr val="accent1"/>
+              </a:buClr>
+              <a:buSzPct val="80000"/>
+              <a:buFont typeface="Wingdings 2"/>
+              <a:buChar char=""/>
+              <a:tabLst/>
+              <a:defRPr/>
+            </a:pPr>
+            <a:endParaRPr kumimoji="0" lang="en-US" sz="3200" b="0" i="0" u="none" strike="noStrike" kern="1200" cap="none" spc="0" normalizeH="0" baseline="0" noProof="0" dirty="0" smtClean="0">
+              <a:ln>
+                <a:noFill/>
+              </a:ln>
+              <a:solidFill>
+                <a:schemeClr val="tx1"/>
+              </a:solidFill>
+              <a:effectLst/>
+              <a:uLnTx/>
+              <a:uFillTx/>
+              <a:latin typeface="+mn-lt"/>
+              <a:ea typeface="+mn-ea"/>
+              <a:cs typeface="+mn-cs"/>
+            </a:endParaRPr>
+          </a:p>
+          <a:p>
+            <a:pPr marL="438912" marR="0" lvl="0" indent="-320040" algn="l" defTabSz="914400" rtl="0" eaLnBrk="1" fontAlgn="auto" latinLnBrk="0" hangingPunct="1">
+              <a:lnSpc>
+                <a:spcPct val="100000"/>
+              </a:lnSpc>
+              <a:spcBef>
+                <a:spcPts val="0"/>
+              </a:spcBef>
+              <a:spcAft>
+                <a:spcPts val="0"/>
+              </a:spcAft>
+              <a:buClr>
+                <a:schemeClr val="accent1"/>
+              </a:buClr>
+              <a:buSzPct val="80000"/>
+              <a:buFont typeface="Wingdings 2"/>
+              <a:buChar char=""/>
+              <a:tabLst/>
+              <a:defRPr/>
+            </a:pPr>
+            <a:endParaRPr kumimoji="0" lang="en-US" sz="3200" b="0" i="0" u="none" strike="noStrike" kern="1200" cap="none" spc="0" normalizeH="0" baseline="0" noProof="0" dirty="0" smtClean="0">
+              <a:ln>
+                <a:noFill/>
+              </a:ln>
+              <a:solidFill>
+                <a:schemeClr val="tx1"/>
+              </a:solidFill>
+              <a:effectLst/>
+              <a:uLnTx/>
+              <a:uFillTx/>
+              <a:latin typeface="+mn-lt"/>
+              <a:ea typeface="+mn-ea"/>
+              <a:cs typeface="+mn-cs"/>
+            </a:endParaRPr>
+          </a:p>
+          <a:p>
+            <a:pPr marL="438912" marR="0" lvl="0" indent="-320040" algn="l" defTabSz="914400" rtl="0" eaLnBrk="1" fontAlgn="auto" latinLnBrk="0" hangingPunct="1">
+              <a:lnSpc>
+                <a:spcPct val="100000"/>
+              </a:lnSpc>
+              <a:spcBef>
+                <a:spcPts val="0"/>
+              </a:spcBef>
+              <a:spcAft>
+                <a:spcPts val="0"/>
+              </a:spcAft>
+              <a:buClr>
+                <a:schemeClr val="accent1"/>
+              </a:buClr>
+              <a:buSzPct val="80000"/>
+              <a:buFont typeface="Wingdings 2"/>
+              <a:buChar char=""/>
+              <a:tabLst/>
+              <a:defRPr/>
+            </a:pPr>
+            <a:endParaRPr kumimoji="0" lang="en-US" sz="3200" b="0" i="0" u="none" strike="noStrike" kern="1200" cap="none" spc="0" normalizeH="0" baseline="0" noProof="0" dirty="0" smtClean="0">
+              <a:ln>
+                <a:noFill/>
+              </a:ln>
+              <a:solidFill>
+                <a:schemeClr val="tx1"/>
+              </a:solidFill>
+              <a:effectLst/>
+              <a:uLnTx/>
+              <a:uFillTx/>
+              <a:latin typeface="+mn-lt"/>
+              <a:ea typeface="+mn-ea"/>
+              <a:cs typeface="+mn-cs"/>
+            </a:endParaRPr>
+          </a:p>
+          <a:p>
+            <a:pPr marL="438912" marR="0" lvl="0" indent="-320040" algn="l" defTabSz="914400" rtl="0" eaLnBrk="1" fontAlgn="auto" latinLnBrk="0" hangingPunct="1">
+              <a:lnSpc>
+                <a:spcPct val="100000"/>
+              </a:lnSpc>
+              <a:spcBef>
+                <a:spcPts val="0"/>
+              </a:spcBef>
+              <a:spcAft>
+                <a:spcPts val="0"/>
+              </a:spcAft>
+              <a:buClr>
+                <a:schemeClr val="accent1"/>
+              </a:buClr>
+              <a:buSzPct val="80000"/>
+              <a:buFont typeface="Wingdings 2"/>
+              <a:buChar char=""/>
+              <a:tabLst/>
+              <a:defRPr/>
+            </a:pPr>
+            <a:endParaRPr kumimoji="0" lang="en-US" sz="3200" b="0" i="0" u="none" strike="noStrike" kern="1200" cap="none" spc="0" normalizeH="0" baseline="0" noProof="0" dirty="0">
+              <a:ln>
+                <a:noFill/>
+              </a:ln>
+              <a:solidFill>
+                <a:schemeClr val="tx1"/>
+              </a:solidFill>
+              <a:effectLst/>
+              <a:uLnTx/>
+              <a:uFillTx/>
+              <a:latin typeface="+mn-lt"/>
+              <a:ea typeface="+mn-ea"/>
+              <a:cs typeface="+mn-cs"/>
+            </a:endParaRPr>
+          </a:p>
+        </p:txBody>
+      </p:sp>
       <p:pic>
         <p:nvPicPr>
-          <p:cNvPr id="4097" name="Picture 1"/>
+          <p:cNvPr id="3074" name="Picture 2"/>
           <p:cNvPicPr>
             <a:picLocks noChangeAspect="1" noChangeArrowheads="1"/>
           </p:cNvPicPr>
           <p:nvPr/>
         </p:nvPicPr>
         <p:blipFill>
-          <a:blip r:embed="rId2">
-            <a:clrChange>
-              <a:clrFrom>
-                <a:srgbClr val="FFFFFF"/>
-              </a:clrFrom>
-              <a:clrTo>
-                <a:srgbClr val="FFFFFF">
-                  <a:alpha val="0"/>
-                </a:srgbClr>
-              </a:clrTo>
-            </a:clrChange>
-          </a:blip>
+          <a:blip r:embed="rId2"/>
           <a:srcRect/>
           <a:stretch>
             <a:fillRect/>
@@ -5350,13 +5600,20 @@
         </p:blipFill>
         <p:spPr bwMode="auto">
           <a:xfrm>
-            <a:off x="0" y="0"/>
-            <a:ext cx="95250" cy="238125"/>
+            <a:off x="1828800" y="4191000"/>
+            <a:ext cx="5495925" cy="2333625"/>
           </a:xfrm>
           <a:prstGeom prst="rect">
             <a:avLst/>
           </a:prstGeom>
           <a:noFill/>
+          <a:ln w="9525">
+            <a:noFill/>
+            <a:miter lim="800000"/>
+            <a:headEnd/>
+            <a:tailEnd/>
+          </a:ln>
+          <a:effectLst/>
         </p:spPr>
       </p:pic>
     </p:spTree>
@@ -5401,7 +5658,7 @@
           <a:p>
             <a:r>
               <a:rPr lang="en-US" dirty="0" smtClean="0"/>
-              <a:t>Embedding Refinement</a:t>
+              <a:t>Connectivity Surgery</a:t>
             </a:r>
             <a:endParaRPr lang="en-US" dirty="0"/>
           </a:p>
@@ -5422,12 +5679,6 @@
           <a:bodyPr/>
           <a:lstStyle/>
           <a:p>
-            <a:r>
-              <a:rPr lang="en-US" dirty="0" smtClean="0"/>
-              <a:t>=P</a:t>
-            </a:r>
-          </a:p>
-          <a:p>
             <a:endParaRPr lang="en-US" dirty="0" smtClean="0"/>
           </a:p>
           <a:p>
@@ -5441,6 +5692,372 @@
           </a:p>
         </p:txBody>
       </p:sp>
+      <p:sp>
+        <p:nvSpPr>
+          <p:cNvPr id="4098" name="Rectangle 2"/>
+          <p:cNvSpPr>
+            <a:spLocks noChangeArrowheads="1"/>
+          </p:cNvSpPr>
+          <p:nvPr/>
+        </p:nvSpPr>
+        <p:spPr bwMode="auto">
+          <a:xfrm>
+            <a:off x="0" y="0"/>
+            <a:ext cx="9144000" cy="0"/>
+          </a:xfrm>
+          <a:prstGeom prst="rect">
+            <a:avLst/>
+          </a:prstGeom>
+          <a:noFill/>
+          <a:ln w="9525">
+            <a:noFill/>
+            <a:miter lim="800000"/>
+            <a:headEnd/>
+            <a:tailEnd/>
+          </a:ln>
+          <a:effectLst/>
+        </p:spPr>
+        <p:txBody>
+          <a:bodyPr vert="horz" wrap="none" lIns="91440" tIns="45720" rIns="91440" bIns="45720" numCol="1" anchor="ctr" anchorCtr="0" compatLnSpc="1">
+            <a:prstTxWarp prst="textNoShape">
+              <a:avLst/>
+            </a:prstTxWarp>
+            <a:spAutoFit/>
+          </a:bodyPr>
+          <a:lstStyle/>
+          <a:p>
+            <a:endParaRPr lang="pt-BR"/>
+          </a:p>
+        </p:txBody>
+      </p:sp>
+      <p:sp>
+        <p:nvSpPr>
+          <p:cNvPr id="5" name="Content Placeholder 2"/>
+          <p:cNvSpPr txBox="1">
+            <a:spLocks/>
+          </p:cNvSpPr>
+          <p:nvPr/>
+        </p:nvSpPr>
+        <p:spPr>
+          <a:xfrm>
+            <a:off x="609600" y="1828800"/>
+            <a:ext cx="8229600" cy="4625609"/>
+          </a:xfrm>
+          <a:prstGeom prst="rect">
+            <a:avLst/>
+          </a:prstGeom>
+        </p:spPr>
+        <p:txBody>
+          <a:bodyPr vert="horz" lIns="54864" tIns="91440" rtlCol="0">
+            <a:normAutofit/>
+          </a:bodyPr>
+          <a:lstStyle/>
+          <a:p>
+            <a:pPr marL="438912" lvl="0" indent="-320040">
+              <a:buClr>
+                <a:schemeClr val="accent1"/>
+              </a:buClr>
+              <a:buSzPct val="80000"/>
+              <a:buFont typeface="Wingdings 2"/>
+              <a:buChar char=""/>
+            </a:pPr>
+            <a:r>
+              <a:rPr lang="en-US" sz="3200" dirty="0" smtClean="0"/>
+              <a:t>QEM over edges instead of faces</a:t>
+            </a:r>
+          </a:p>
+          <a:p>
+            <a:pPr marL="438912" lvl="0" indent="-320040">
+              <a:buClr>
+                <a:schemeClr val="accent1"/>
+              </a:buClr>
+              <a:buSzPct val="80000"/>
+              <a:buFont typeface="Wingdings 2"/>
+              <a:buChar char=""/>
+            </a:pPr>
+            <a:r>
+              <a:rPr kumimoji="0" lang="en-US" sz="3200" b="0" i="0" u="none" strike="noStrike" kern="1200" cap="none" spc="0" normalizeH="0" baseline="0" noProof="0" dirty="0" smtClean="0">
+                <a:ln>
+                  <a:noFill/>
+                </a:ln>
+                <a:solidFill>
+                  <a:schemeClr val="tx1"/>
+                </a:solidFill>
+                <a:effectLst/>
+                <a:uLnTx/>
+                <a:uFillTx/>
+                <a:latin typeface="+mn-lt"/>
+                <a:ea typeface="+mn-ea"/>
+                <a:cs typeface="+mn-cs"/>
+              </a:rPr>
+              <a:t>Contract</a:t>
+            </a:r>
+            <a:r>
+              <a:rPr kumimoji="0" lang="en-US" sz="3200" b="0" i="0" u="none" strike="noStrike" kern="1200" cap="none" spc="0" normalizeH="0" noProof="0" dirty="0" smtClean="0">
+                <a:ln>
+                  <a:noFill/>
+                </a:ln>
+                <a:solidFill>
+                  <a:schemeClr val="tx1"/>
+                </a:solidFill>
+                <a:effectLst/>
+                <a:uLnTx/>
+                <a:uFillTx/>
+                <a:latin typeface="+mn-lt"/>
+                <a:ea typeface="+mn-ea"/>
+                <a:cs typeface="+mn-cs"/>
+              </a:rPr>
+              <a:t> only connected vertices</a:t>
+            </a:r>
+          </a:p>
+          <a:p>
+            <a:pPr marL="438912" lvl="0" indent="-320040">
+              <a:buClr>
+                <a:schemeClr val="accent1"/>
+              </a:buClr>
+              <a:buSzPct val="80000"/>
+              <a:buFont typeface="Wingdings 2"/>
+              <a:buChar char=""/>
+            </a:pPr>
+            <a:r>
+              <a:rPr lang="en-US" sz="3200" baseline="0" dirty="0" smtClean="0"/>
+              <a:t>Ordered</a:t>
+            </a:r>
+            <a:r>
+              <a:rPr lang="en-US" sz="3200" dirty="0" smtClean="0"/>
+              <a:t> contraction</a:t>
+            </a:r>
+          </a:p>
+          <a:p>
+            <a:pPr marL="896112" lvl="1" indent="-320040">
+              <a:buClr>
+                <a:schemeClr val="accent1"/>
+              </a:buClr>
+              <a:buSzPct val="80000"/>
+              <a:buFont typeface="Wingdings 2"/>
+              <a:buChar char=""/>
+            </a:pPr>
+            <a:r>
+              <a:rPr kumimoji="0" lang="en-US" sz="3200" b="0" i="0" u="none" strike="noStrike" kern="1200" cap="none" spc="0" normalizeH="0" baseline="0" noProof="0" dirty="0" smtClean="0">
+                <a:ln>
+                  <a:noFill/>
+                </a:ln>
+                <a:solidFill>
+                  <a:schemeClr val="tx1"/>
+                </a:solidFill>
+                <a:effectLst/>
+                <a:uLnTx/>
+                <a:uFillTx/>
+                <a:latin typeface="+mn-lt"/>
+                <a:ea typeface="+mn-ea"/>
+                <a:cs typeface="+mn-cs"/>
+              </a:rPr>
+              <a:t>Cost</a:t>
+            </a:r>
+            <a:r>
+              <a:rPr kumimoji="0" lang="en-US" sz="3200" b="0" i="0" u="none" strike="noStrike" kern="1200" cap="none" spc="0" normalizeH="0" noProof="0" dirty="0" smtClean="0">
+                <a:ln>
+                  <a:noFill/>
+                </a:ln>
+                <a:solidFill>
+                  <a:schemeClr val="tx1"/>
+                </a:solidFill>
+                <a:effectLst/>
+                <a:uLnTx/>
+                <a:uFillTx/>
+                <a:latin typeface="+mn-lt"/>
+                <a:ea typeface="+mn-ea"/>
+                <a:cs typeface="+mn-cs"/>
+              </a:rPr>
+              <a:t> minimization</a:t>
+            </a:r>
+            <a:endParaRPr kumimoji="0" lang="en-US" sz="3200" b="0" i="0" u="none" strike="noStrike" kern="1200" cap="none" spc="0" normalizeH="0" baseline="0" noProof="0" dirty="0" smtClean="0">
+              <a:ln>
+                <a:noFill/>
+              </a:ln>
+              <a:solidFill>
+                <a:schemeClr val="tx1"/>
+              </a:solidFill>
+              <a:effectLst/>
+              <a:uLnTx/>
+              <a:uFillTx/>
+              <a:latin typeface="+mn-lt"/>
+              <a:ea typeface="+mn-ea"/>
+              <a:cs typeface="+mn-cs"/>
+            </a:endParaRPr>
+          </a:p>
+          <a:p>
+            <a:pPr marL="438912" marR="0" lvl="0" indent="-320040" algn="l" defTabSz="914400" rtl="0" eaLnBrk="1" fontAlgn="auto" latinLnBrk="0" hangingPunct="1">
+              <a:lnSpc>
+                <a:spcPct val="100000"/>
+              </a:lnSpc>
+              <a:spcBef>
+                <a:spcPts val="0"/>
+              </a:spcBef>
+              <a:spcAft>
+                <a:spcPts val="0"/>
+              </a:spcAft>
+              <a:buClr>
+                <a:schemeClr val="accent1"/>
+              </a:buClr>
+              <a:buSzPct val="80000"/>
+              <a:buFont typeface="Wingdings 2"/>
+              <a:buChar char=""/>
+              <a:tabLst/>
+              <a:defRPr/>
+            </a:pPr>
+            <a:endParaRPr kumimoji="0" lang="en-US" sz="3200" b="0" i="0" u="none" strike="noStrike" kern="1200" cap="none" spc="0" normalizeH="0" baseline="0" noProof="0" dirty="0" smtClean="0">
+              <a:ln>
+                <a:noFill/>
+              </a:ln>
+              <a:solidFill>
+                <a:schemeClr val="tx1"/>
+              </a:solidFill>
+              <a:effectLst/>
+              <a:uLnTx/>
+              <a:uFillTx/>
+              <a:latin typeface="+mn-lt"/>
+              <a:ea typeface="+mn-ea"/>
+              <a:cs typeface="+mn-cs"/>
+            </a:endParaRPr>
+          </a:p>
+          <a:p>
+            <a:pPr marL="438912" marR="0" lvl="0" indent="-320040" algn="l" defTabSz="914400" rtl="0" eaLnBrk="1" fontAlgn="auto" latinLnBrk="0" hangingPunct="1">
+              <a:lnSpc>
+                <a:spcPct val="100000"/>
+              </a:lnSpc>
+              <a:spcBef>
+                <a:spcPts val="0"/>
+              </a:spcBef>
+              <a:spcAft>
+                <a:spcPts val="0"/>
+              </a:spcAft>
+              <a:buClr>
+                <a:schemeClr val="accent1"/>
+              </a:buClr>
+              <a:buSzPct val="80000"/>
+              <a:buFont typeface="Wingdings 2"/>
+              <a:buChar char=""/>
+              <a:tabLst/>
+              <a:defRPr/>
+            </a:pPr>
+            <a:endParaRPr kumimoji="0" lang="en-US" sz="3200" b="0" i="0" u="none" strike="noStrike" kern="1200" cap="none" spc="0" normalizeH="0" baseline="0" noProof="0" dirty="0" smtClean="0">
+              <a:ln>
+                <a:noFill/>
+              </a:ln>
+              <a:solidFill>
+                <a:schemeClr val="tx1"/>
+              </a:solidFill>
+              <a:effectLst/>
+              <a:uLnTx/>
+              <a:uFillTx/>
+              <a:latin typeface="+mn-lt"/>
+              <a:ea typeface="+mn-ea"/>
+              <a:cs typeface="+mn-cs"/>
+            </a:endParaRPr>
+          </a:p>
+          <a:p>
+            <a:pPr marL="438912" marR="0" lvl="0" indent="-320040" algn="l" defTabSz="914400" rtl="0" eaLnBrk="1" fontAlgn="auto" latinLnBrk="0" hangingPunct="1">
+              <a:lnSpc>
+                <a:spcPct val="100000"/>
+              </a:lnSpc>
+              <a:spcBef>
+                <a:spcPts val="0"/>
+              </a:spcBef>
+              <a:spcAft>
+                <a:spcPts val="0"/>
+              </a:spcAft>
+              <a:buClr>
+                <a:schemeClr val="accent1"/>
+              </a:buClr>
+              <a:buSzPct val="80000"/>
+              <a:buFont typeface="Wingdings 2"/>
+              <a:buChar char=""/>
+              <a:tabLst/>
+              <a:defRPr/>
+            </a:pPr>
+            <a:endParaRPr kumimoji="0" lang="en-US" sz="3200" b="0" i="0" u="none" strike="noStrike" kern="1200" cap="none" spc="0" normalizeH="0" baseline="0" noProof="0" dirty="0" smtClean="0">
+              <a:ln>
+                <a:noFill/>
+              </a:ln>
+              <a:solidFill>
+                <a:schemeClr val="tx1"/>
+              </a:solidFill>
+              <a:effectLst/>
+              <a:uLnTx/>
+              <a:uFillTx/>
+              <a:latin typeface="+mn-lt"/>
+              <a:ea typeface="+mn-ea"/>
+              <a:cs typeface="+mn-cs"/>
+            </a:endParaRPr>
+          </a:p>
+          <a:p>
+            <a:pPr marL="438912" marR="0" lvl="0" indent="-320040" algn="l" defTabSz="914400" rtl="0" eaLnBrk="1" fontAlgn="auto" latinLnBrk="0" hangingPunct="1">
+              <a:lnSpc>
+                <a:spcPct val="100000"/>
+              </a:lnSpc>
+              <a:spcBef>
+                <a:spcPts val="0"/>
+              </a:spcBef>
+              <a:spcAft>
+                <a:spcPts val="0"/>
+              </a:spcAft>
+              <a:buClr>
+                <a:schemeClr val="accent1"/>
+              </a:buClr>
+              <a:buSzPct val="80000"/>
+              <a:buFont typeface="Wingdings 2"/>
+              <a:buChar char=""/>
+              <a:tabLst/>
+              <a:defRPr/>
+            </a:pPr>
+            <a:endParaRPr kumimoji="0" lang="en-US" sz="3200" b="0" i="0" u="none" strike="noStrike" kern="1200" cap="none" spc="0" normalizeH="0" baseline="0" noProof="0" dirty="0">
+              <a:ln>
+                <a:noFill/>
+              </a:ln>
+              <a:solidFill>
+                <a:schemeClr val="tx1"/>
+              </a:solidFill>
+              <a:effectLst/>
+              <a:uLnTx/>
+              <a:uFillTx/>
+              <a:latin typeface="+mn-lt"/>
+              <a:ea typeface="+mn-ea"/>
+              <a:cs typeface="+mn-cs"/>
+            </a:endParaRPr>
+          </a:p>
+        </p:txBody>
+      </p:sp>
+      <p:pic>
+        <p:nvPicPr>
+          <p:cNvPr id="6" name="Picture 1"/>
+          <p:cNvPicPr/>
+          <p:nvPr/>
+        </p:nvPicPr>
+        <p:blipFill>
+          <a:blip r:embed="rId2" cstate="print"/>
+          <a:srcRect/>
+          <a:stretch>
+            <a:fillRect/>
+          </a:stretch>
+        </p:blipFill>
+        <p:spPr bwMode="auto">
+          <a:xfrm>
+            <a:off x="576020" y="4648200"/>
+            <a:ext cx="7958380" cy="1504950"/>
+          </a:xfrm>
+          <a:prstGeom prst="rect">
+            <a:avLst/>
+          </a:prstGeom>
+          <a:noFill/>
+          <a:ln w="9525">
+            <a:noFill/>
+            <a:miter lim="800000"/>
+            <a:headEnd/>
+            <a:tailEnd/>
+          </a:ln>
+        </p:spPr>
+      </p:pic>
     </p:spTree>
   </p:cSld>
   <p:clrMapOvr>
@@ -5466,6 +6083,293 @@
           <a:chExt cx="0" cy="0"/>
         </a:xfrm>
       </p:grpSpPr>
+      <p:pic>
+        <p:nvPicPr>
+          <p:cNvPr id="1028" name="Picture 4"/>
+          <p:cNvPicPr>
+            <a:picLocks noChangeAspect="1" noChangeArrowheads="1"/>
+          </p:cNvPicPr>
+          <p:nvPr/>
+        </p:nvPicPr>
+        <p:blipFill>
+          <a:blip r:embed="rId2"/>
+          <a:srcRect/>
+          <a:stretch>
+            <a:fillRect/>
+          </a:stretch>
+        </p:blipFill>
+        <p:spPr bwMode="auto">
+          <a:xfrm>
+            <a:off x="1371600" y="4114800"/>
+            <a:ext cx="4038600" cy="1247775"/>
+          </a:xfrm>
+          <a:prstGeom prst="rect">
+            <a:avLst/>
+          </a:prstGeom>
+          <a:noFill/>
+          <a:ln w="9525">
+            <a:noFill/>
+            <a:miter lim="800000"/>
+            <a:headEnd/>
+            <a:tailEnd/>
+          </a:ln>
+          <a:effectLst/>
+        </p:spPr>
+      </p:pic>
+      <p:sp>
+        <p:nvSpPr>
+          <p:cNvPr id="10" name="Content Placeholder 2"/>
+          <p:cNvSpPr txBox="1">
+            <a:spLocks/>
+          </p:cNvSpPr>
+          <p:nvPr/>
+        </p:nvSpPr>
+        <p:spPr>
+          <a:xfrm>
+            <a:off x="609600" y="1828800"/>
+            <a:ext cx="8229600" cy="4625609"/>
+          </a:xfrm>
+          <a:prstGeom prst="rect">
+            <a:avLst/>
+          </a:prstGeom>
+        </p:spPr>
+        <p:txBody>
+          <a:bodyPr vert="horz" lIns="54864" tIns="91440" rtlCol="0">
+            <a:normAutofit/>
+          </a:bodyPr>
+          <a:lstStyle/>
+          <a:p>
+            <a:pPr marL="438912" lvl="0" indent="-320040">
+              <a:buClr>
+                <a:schemeClr val="accent1"/>
+              </a:buClr>
+              <a:buSzPct val="80000"/>
+            </a:pPr>
+            <a:r>
+              <a:rPr lang="en-US" sz="3200" dirty="0" smtClean="0"/>
+              <a:t>Shape cost</a:t>
+            </a:r>
+          </a:p>
+          <a:p>
+            <a:pPr marL="438912" lvl="0" indent="-320040">
+              <a:buClr>
+                <a:schemeClr val="accent1"/>
+              </a:buClr>
+              <a:buSzPct val="80000"/>
+              <a:buFont typeface="Wingdings 2"/>
+              <a:buChar char=""/>
+            </a:pPr>
+            <a:endParaRPr kumimoji="0" lang="en-US" sz="3200" b="0" i="0" u="none" strike="noStrike" kern="1200" cap="none" spc="0" normalizeH="0" baseline="0" noProof="0" dirty="0" smtClean="0">
+              <a:ln>
+                <a:noFill/>
+              </a:ln>
+              <a:solidFill>
+                <a:schemeClr val="tx1"/>
+              </a:solidFill>
+              <a:effectLst/>
+              <a:uLnTx/>
+              <a:uFillTx/>
+              <a:latin typeface="+mn-lt"/>
+              <a:ea typeface="+mn-ea"/>
+              <a:cs typeface="+mn-cs"/>
+            </a:endParaRPr>
+          </a:p>
+          <a:p>
+            <a:pPr marL="438912" lvl="0" indent="-320040">
+              <a:buClr>
+                <a:schemeClr val="accent1"/>
+              </a:buClr>
+              <a:buSzPct val="80000"/>
+            </a:pPr>
+            <a:r>
+              <a:rPr kumimoji="0" lang="en-US" sz="3200" b="0" i="0" u="none" strike="noStrike" kern="1200" cap="none" spc="0" normalizeH="0" noProof="0" dirty="0" smtClean="0">
+                <a:ln>
+                  <a:noFill/>
+                </a:ln>
+                <a:solidFill>
+                  <a:schemeClr val="tx1"/>
+                </a:solidFill>
+                <a:effectLst/>
+                <a:uLnTx/>
+                <a:uFillTx/>
+                <a:latin typeface="+mn-lt"/>
+                <a:ea typeface="+mn-ea"/>
+                <a:cs typeface="+mn-cs"/>
+              </a:rPr>
+              <a:t>Vertex error metric</a:t>
+            </a:r>
+          </a:p>
+          <a:p>
+            <a:pPr marL="438912" marR="0" lvl="0" indent="-320040" algn="l" defTabSz="914400" rtl="0" eaLnBrk="1" fontAlgn="auto" latinLnBrk="0" hangingPunct="1">
+              <a:lnSpc>
+                <a:spcPct val="100000"/>
+              </a:lnSpc>
+              <a:spcBef>
+                <a:spcPts val="0"/>
+              </a:spcBef>
+              <a:spcAft>
+                <a:spcPts val="0"/>
+              </a:spcAft>
+              <a:buClr>
+                <a:schemeClr val="accent1"/>
+              </a:buClr>
+              <a:buSzPct val="80000"/>
+              <a:tabLst/>
+              <a:defRPr/>
+            </a:pPr>
+            <a:endParaRPr kumimoji="0" lang="en-US" sz="3200" b="0" i="0" u="none" strike="noStrike" kern="1200" cap="none" spc="0" normalizeH="0" baseline="0" noProof="0" dirty="0" smtClean="0">
+              <a:ln>
+                <a:noFill/>
+              </a:ln>
+              <a:solidFill>
+                <a:schemeClr val="tx1"/>
+              </a:solidFill>
+              <a:effectLst/>
+              <a:uLnTx/>
+              <a:uFillTx/>
+              <a:latin typeface="+mn-lt"/>
+              <a:ea typeface="+mn-ea"/>
+              <a:cs typeface="+mn-cs"/>
+            </a:endParaRPr>
+          </a:p>
+          <a:p>
+            <a:pPr marL="438912" marR="0" lvl="0" indent="-320040" algn="l" defTabSz="914400" rtl="0" eaLnBrk="1" fontAlgn="auto" latinLnBrk="0" hangingPunct="1">
+              <a:lnSpc>
+                <a:spcPct val="100000"/>
+              </a:lnSpc>
+              <a:spcBef>
+                <a:spcPts val="0"/>
+              </a:spcBef>
+              <a:spcAft>
+                <a:spcPts val="0"/>
+              </a:spcAft>
+              <a:buClr>
+                <a:schemeClr val="accent1"/>
+              </a:buClr>
+              <a:buSzPct val="80000"/>
+              <a:buFont typeface="Wingdings 2"/>
+              <a:buChar char=""/>
+              <a:tabLst/>
+              <a:defRPr/>
+            </a:pPr>
+            <a:endParaRPr kumimoji="0" lang="en-US" sz="3200" b="0" i="0" u="none" strike="noStrike" kern="1200" cap="none" spc="0" normalizeH="0" baseline="0" noProof="0" dirty="0" smtClean="0">
+              <a:ln>
+                <a:noFill/>
+              </a:ln>
+              <a:solidFill>
+                <a:schemeClr val="tx1"/>
+              </a:solidFill>
+              <a:effectLst/>
+              <a:uLnTx/>
+              <a:uFillTx/>
+              <a:latin typeface="+mn-lt"/>
+              <a:ea typeface="+mn-ea"/>
+              <a:cs typeface="+mn-cs"/>
+            </a:endParaRPr>
+          </a:p>
+          <a:p>
+            <a:pPr marL="438912" marR="0" lvl="0" indent="-320040" algn="l" defTabSz="914400" rtl="0" eaLnBrk="1" fontAlgn="auto" latinLnBrk="0" hangingPunct="1">
+              <a:lnSpc>
+                <a:spcPct val="100000"/>
+              </a:lnSpc>
+              <a:spcBef>
+                <a:spcPts val="0"/>
+              </a:spcBef>
+              <a:spcAft>
+                <a:spcPts val="0"/>
+              </a:spcAft>
+              <a:buClr>
+                <a:schemeClr val="accent1"/>
+              </a:buClr>
+              <a:buSzPct val="80000"/>
+              <a:buFont typeface="Wingdings 2"/>
+              <a:buChar char=""/>
+              <a:tabLst/>
+              <a:defRPr/>
+            </a:pPr>
+            <a:endParaRPr kumimoji="0" lang="en-US" sz="3200" b="0" i="0" u="none" strike="noStrike" kern="1200" cap="none" spc="0" normalizeH="0" baseline="0" noProof="0" dirty="0" smtClean="0">
+              <a:ln>
+                <a:noFill/>
+              </a:ln>
+              <a:solidFill>
+                <a:schemeClr val="tx1"/>
+              </a:solidFill>
+              <a:effectLst/>
+              <a:uLnTx/>
+              <a:uFillTx/>
+              <a:latin typeface="+mn-lt"/>
+              <a:ea typeface="+mn-ea"/>
+              <a:cs typeface="+mn-cs"/>
+            </a:endParaRPr>
+          </a:p>
+          <a:p>
+            <a:pPr marL="438912" marR="0" lvl="0" indent="-320040" algn="l" defTabSz="914400" rtl="0" eaLnBrk="1" fontAlgn="auto" latinLnBrk="0" hangingPunct="1">
+              <a:lnSpc>
+                <a:spcPct val="100000"/>
+              </a:lnSpc>
+              <a:spcBef>
+                <a:spcPts val="0"/>
+              </a:spcBef>
+              <a:spcAft>
+                <a:spcPts val="0"/>
+              </a:spcAft>
+              <a:buClr>
+                <a:schemeClr val="accent1"/>
+              </a:buClr>
+              <a:buSzPct val="80000"/>
+              <a:buFont typeface="Wingdings 2"/>
+              <a:buChar char=""/>
+              <a:tabLst/>
+              <a:defRPr/>
+            </a:pPr>
+            <a:endParaRPr kumimoji="0" lang="en-US" sz="3200" b="0" i="0" u="none" strike="noStrike" kern="1200" cap="none" spc="0" normalizeH="0" baseline="0" noProof="0" dirty="0" smtClean="0">
+              <a:ln>
+                <a:noFill/>
+              </a:ln>
+              <a:solidFill>
+                <a:schemeClr val="tx1"/>
+              </a:solidFill>
+              <a:effectLst/>
+              <a:uLnTx/>
+              <a:uFillTx/>
+              <a:latin typeface="+mn-lt"/>
+              <a:ea typeface="+mn-ea"/>
+              <a:cs typeface="+mn-cs"/>
+            </a:endParaRPr>
+          </a:p>
+          <a:p>
+            <a:pPr marL="438912" marR="0" lvl="0" indent="-320040" algn="l" defTabSz="914400" rtl="0" eaLnBrk="1" fontAlgn="auto" latinLnBrk="0" hangingPunct="1">
+              <a:lnSpc>
+                <a:spcPct val="100000"/>
+              </a:lnSpc>
+              <a:spcBef>
+                <a:spcPts val="0"/>
+              </a:spcBef>
+              <a:spcAft>
+                <a:spcPts val="0"/>
+              </a:spcAft>
+              <a:buClr>
+                <a:schemeClr val="accent1"/>
+              </a:buClr>
+              <a:buSzPct val="80000"/>
+              <a:tabLst/>
+              <a:defRPr/>
+            </a:pPr>
+            <a:r>
+              <a:rPr lang="en-US" sz="3200" dirty="0" smtClean="0"/>
+              <a:t>   is the normalized edge vector of edge (</a:t>
+            </a:r>
+            <a:r>
+              <a:rPr lang="en-US" sz="3200" dirty="0" err="1" smtClean="0"/>
+              <a:t>i,j</a:t>
+            </a:r>
+            <a:r>
+              <a:rPr lang="en-US" sz="3200" dirty="0" smtClean="0"/>
+              <a:t>) and</a:t>
+            </a:r>
+          </a:p>
+        </p:txBody>
+      </p:sp>
       <p:sp>
         <p:nvSpPr>
           <p:cNvPr id="2" name="Title 1"/>
@@ -5478,12 +6382,14 @@
         </p:nvSpPr>
         <p:spPr/>
         <p:txBody>
-          <a:bodyPr/>
+          <a:bodyPr>
+            <a:normAutofit/>
+          </a:bodyPr>
           <a:lstStyle/>
           <a:p>
             <a:r>
               <a:rPr lang="en-US" dirty="0" smtClean="0"/>
-              <a:t>Results</a:t>
+              <a:t>Connectivity Surgery</a:t>
             </a:r>
             <a:endParaRPr lang="en-US" dirty="0"/>
           </a:p>
@@ -5491,38 +6397,176 @@
       </p:sp>
       <p:sp>
         <p:nvSpPr>
-          <p:cNvPr id="3" name="Content Placeholder 2"/>
-          <p:cNvSpPr>
-            <a:spLocks noGrp="1"/>
-          </p:cNvSpPr>
+          <p:cNvPr id="4098" name="Rectangle 2"/>
+          <p:cNvSpPr>
+            <a:spLocks noChangeArrowheads="1"/>
+          </p:cNvSpPr>
+          <p:nvPr/>
+        </p:nvSpPr>
+        <p:spPr bwMode="auto">
+          <a:xfrm>
+            <a:off x="0" y="0"/>
+            <a:ext cx="9144000" cy="0"/>
+          </a:xfrm>
+          <a:prstGeom prst="rect">
+            <a:avLst/>
+          </a:prstGeom>
+          <a:noFill/>
+          <a:ln w="9525">
+            <a:noFill/>
+            <a:miter lim="800000"/>
+            <a:headEnd/>
+            <a:tailEnd/>
+          </a:ln>
+          <a:effectLst/>
+        </p:spPr>
+        <p:txBody>
+          <a:bodyPr vert="horz" wrap="none" lIns="91440" tIns="45720" rIns="91440" bIns="45720" numCol="1" anchor="ctr" anchorCtr="0" compatLnSpc="1">
+            <a:prstTxWarp prst="textNoShape">
+              <a:avLst/>
+            </a:prstTxWarp>
+            <a:spAutoFit/>
+          </a:bodyPr>
+          <a:lstStyle/>
+          <a:p>
+            <a:endParaRPr lang="pt-BR"/>
+          </a:p>
+        </p:txBody>
+      </p:sp>
+      <p:pic>
+        <p:nvPicPr>
+          <p:cNvPr id="1026" name="Picture 2"/>
+          <p:cNvPicPr>
+            <a:picLocks noGrp="1" noChangeAspect="1" noChangeArrowheads="1"/>
+          </p:cNvPicPr>
           <p:nvPr>
             <p:ph idx="1"/>
           </p:nvPr>
-        </p:nvSpPr>
-        <p:spPr/>
-        <p:txBody>
-          <a:bodyPr/>
-          <a:lstStyle/>
-          <a:p>
-            <a:r>
-              <a:rPr lang="en-US" dirty="0" smtClean="0"/>
-              <a:t>=P</a:t>
-            </a:r>
-          </a:p>
-          <a:p>
-            <a:endParaRPr lang="en-US" dirty="0" smtClean="0"/>
-          </a:p>
-          <a:p>
-            <a:endParaRPr lang="en-US" dirty="0" smtClean="0"/>
-          </a:p>
-          <a:p>
-            <a:endParaRPr lang="en-US" dirty="0" smtClean="0"/>
-          </a:p>
-          <a:p>
-            <a:endParaRPr lang="en-US" dirty="0"/>
-          </a:p>
-        </p:txBody>
-      </p:sp>
+        </p:nvPicPr>
+        <p:blipFill>
+          <a:blip r:embed="rId3"/>
+          <a:srcRect/>
+          <a:stretch>
+            <a:fillRect/>
+          </a:stretch>
+        </p:blipFill>
+        <p:spPr bwMode="auto">
+          <a:xfrm>
+            <a:off x="1371600" y="2466975"/>
+            <a:ext cx="2790825" cy="504825"/>
+          </a:xfrm>
+          <a:prstGeom prst="rect">
+            <a:avLst/>
+          </a:prstGeom>
+          <a:noFill/>
+          <a:ln w="9525">
+            <a:noFill/>
+            <a:miter lim="800000"/>
+            <a:headEnd/>
+            <a:tailEnd/>
+          </a:ln>
+          <a:effectLst/>
+        </p:spPr>
+      </p:pic>
+      <p:pic>
+        <p:nvPicPr>
+          <p:cNvPr id="1027" name="Picture 3"/>
+          <p:cNvPicPr>
+            <a:picLocks noChangeAspect="1" noChangeArrowheads="1"/>
+          </p:cNvPicPr>
+          <p:nvPr/>
+        </p:nvPicPr>
+        <p:blipFill>
+          <a:blip r:embed="rId4"/>
+          <a:srcRect/>
+          <a:stretch>
+            <a:fillRect/>
+          </a:stretch>
+        </p:blipFill>
+        <p:spPr bwMode="auto">
+          <a:xfrm>
+            <a:off x="1352550" y="3524250"/>
+            <a:ext cx="4819650" cy="742950"/>
+          </a:xfrm>
+          <a:prstGeom prst="rect">
+            <a:avLst/>
+          </a:prstGeom>
+          <a:noFill/>
+          <a:ln w="9525">
+            <a:noFill/>
+            <a:miter lim="800000"/>
+            <a:headEnd/>
+            <a:tailEnd/>
+          </a:ln>
+          <a:effectLst/>
+        </p:spPr>
+      </p:pic>
+      <p:pic>
+        <p:nvPicPr>
+          <p:cNvPr id="1029" name="Picture 5"/>
+          <p:cNvPicPr>
+            <a:picLocks noChangeAspect="1" noChangeArrowheads="1"/>
+          </p:cNvPicPr>
+          <p:nvPr/>
+        </p:nvPicPr>
+        <p:blipFill>
+          <a:blip r:embed="rId5"/>
+          <a:srcRect/>
+          <a:stretch>
+            <a:fillRect/>
+          </a:stretch>
+        </p:blipFill>
+        <p:spPr bwMode="auto">
+          <a:xfrm>
+            <a:off x="762000" y="5913539"/>
+            <a:ext cx="1295400" cy="487261"/>
+          </a:xfrm>
+          <a:prstGeom prst="rect">
+            <a:avLst/>
+          </a:prstGeom>
+          <a:noFill/>
+          <a:ln w="9525">
+            <a:noFill/>
+            <a:miter lim="800000"/>
+            <a:headEnd/>
+            <a:tailEnd/>
+          </a:ln>
+          <a:effectLst/>
+        </p:spPr>
+      </p:pic>
+      <p:pic>
+        <p:nvPicPr>
+          <p:cNvPr id="1030" name="Picture 6"/>
+          <p:cNvPicPr>
+            <a:picLocks noChangeAspect="1" noChangeArrowheads="1"/>
+          </p:cNvPicPr>
+          <p:nvPr/>
+        </p:nvPicPr>
+        <p:blipFill>
+          <a:blip r:embed="rId6"/>
+          <a:srcRect/>
+          <a:stretch>
+            <a:fillRect/>
+          </a:stretch>
+        </p:blipFill>
+        <p:spPr bwMode="auto">
+          <a:xfrm>
+            <a:off x="746677" y="5471541"/>
+            <a:ext cx="243923" cy="295275"/>
+          </a:xfrm>
+          <a:prstGeom prst="rect">
+            <a:avLst/>
+          </a:prstGeom>
+          <a:noFill/>
+          <a:ln w="9525">
+            <a:noFill/>
+            <a:miter lim="800000"/>
+            <a:headEnd/>
+            <a:tailEnd/>
+          </a:ln>
+          <a:effectLst/>
+        </p:spPr>
+      </p:pic>
     </p:spTree>
   </p:cSld>
   <p:clrMapOvr>
@@ -5560,51 +6604,321 @@
         </p:nvSpPr>
         <p:spPr/>
         <p:txBody>
+          <a:bodyPr>
+            <a:normAutofit/>
+          </a:bodyPr>
+          <a:lstStyle/>
+          <a:p>
+            <a:r>
+              <a:rPr lang="en-US" dirty="0" smtClean="0"/>
+              <a:t>Connectivity Surgery</a:t>
+            </a:r>
+            <a:endParaRPr lang="en-US" dirty="0"/>
+          </a:p>
+        </p:txBody>
+      </p:sp>
+      <p:sp>
+        <p:nvSpPr>
+          <p:cNvPr id="4098" name="Rectangle 2"/>
+          <p:cNvSpPr>
+            <a:spLocks noChangeArrowheads="1"/>
+          </p:cNvSpPr>
+          <p:nvPr/>
+        </p:nvSpPr>
+        <p:spPr bwMode="auto">
+          <a:xfrm>
+            <a:off x="0" y="0"/>
+            <a:ext cx="9144000" cy="0"/>
+          </a:xfrm>
+          <a:prstGeom prst="rect">
+            <a:avLst/>
+          </a:prstGeom>
+          <a:noFill/>
+          <a:ln w="9525">
+            <a:noFill/>
+            <a:miter lim="800000"/>
+            <a:headEnd/>
+            <a:tailEnd/>
+          </a:ln>
+          <a:effectLst/>
+        </p:spPr>
+        <p:txBody>
+          <a:bodyPr vert="horz" wrap="none" lIns="91440" tIns="45720" rIns="91440" bIns="45720" numCol="1" anchor="ctr" anchorCtr="0" compatLnSpc="1">
+            <a:prstTxWarp prst="textNoShape">
+              <a:avLst/>
+            </a:prstTxWarp>
+            <a:spAutoFit/>
+          </a:bodyPr>
+          <a:lstStyle/>
+          <a:p>
+            <a:endParaRPr lang="pt-BR"/>
+          </a:p>
+        </p:txBody>
+      </p:sp>
+      <p:sp>
+        <p:nvSpPr>
+          <p:cNvPr id="11" name="Espaço Reservado para Conteúdo 10"/>
+          <p:cNvSpPr>
+            <a:spLocks noGrp="1"/>
+          </p:cNvSpPr>
+          <p:nvPr>
+            <p:ph idx="1"/>
+          </p:nvPr>
+        </p:nvSpPr>
+        <p:spPr/>
+        <p:txBody>
           <a:bodyPr/>
           <a:lstStyle/>
           <a:p>
-            <a:r>
-              <a:rPr lang="en-US" dirty="0" smtClean="0"/>
-              <a:t>Conclusion</a:t>
-            </a:r>
-            <a:endParaRPr lang="en-US" dirty="0"/>
-          </a:p>
-        </p:txBody>
-      </p:sp>
-      <p:sp>
-        <p:nvSpPr>
-          <p:cNvPr id="3" name="Content Placeholder 2"/>
-          <p:cNvSpPr>
-            <a:spLocks noGrp="1"/>
-          </p:cNvSpPr>
-          <p:nvPr>
-            <p:ph idx="1"/>
-          </p:nvPr>
-        </p:nvSpPr>
-        <p:spPr/>
-        <p:txBody>
-          <a:bodyPr/>
-          <a:lstStyle/>
-          <a:p>
-            <a:r>
-              <a:rPr lang="en-US" dirty="0" smtClean="0"/>
-              <a:t>=P</a:t>
-            </a:r>
-          </a:p>
-          <a:p>
-            <a:endParaRPr lang="en-US" dirty="0" smtClean="0"/>
-          </a:p>
-          <a:p>
-            <a:endParaRPr lang="en-US" dirty="0" smtClean="0"/>
-          </a:p>
-          <a:p>
-            <a:endParaRPr lang="en-US" dirty="0" smtClean="0"/>
-          </a:p>
-          <a:p>
-            <a:endParaRPr lang="en-US" dirty="0"/>
-          </a:p>
-        </p:txBody>
-      </p:sp>
+            <a:pPr>
+              <a:buNone/>
+            </a:pPr>
+            <a:r>
+              <a:rPr lang="pt-BR" dirty="0" err="1" smtClean="0"/>
+              <a:t>Sampling</a:t>
+            </a:r>
+            <a:r>
+              <a:rPr lang="pt-BR" dirty="0" smtClean="0"/>
+              <a:t> </a:t>
+            </a:r>
+            <a:r>
+              <a:rPr lang="pt-BR" dirty="0" err="1" smtClean="0"/>
+              <a:t>Cost</a:t>
+            </a:r>
+            <a:endParaRPr lang="pt-BR" dirty="0" smtClean="0"/>
+          </a:p>
+          <a:p>
+            <a:r>
+              <a:rPr lang="pt-BR" sz="2400" dirty="0" err="1" smtClean="0"/>
+              <a:t>Avoids</a:t>
+            </a:r>
+            <a:r>
+              <a:rPr lang="pt-BR" sz="2400" dirty="0" smtClean="0"/>
+              <a:t> </a:t>
+            </a:r>
+            <a:r>
+              <a:rPr lang="pt-BR" sz="2400" dirty="0" err="1" smtClean="0"/>
+              <a:t>over-simplification</a:t>
+            </a:r>
+            <a:r>
+              <a:rPr lang="pt-BR" sz="2400" dirty="0" smtClean="0"/>
+              <a:t> </a:t>
+            </a:r>
+            <a:r>
+              <a:rPr lang="pt-BR" sz="2400" dirty="0" err="1" smtClean="0"/>
+              <a:t>and</a:t>
+            </a:r>
+            <a:r>
+              <a:rPr lang="pt-BR" sz="2400" dirty="0" smtClean="0"/>
+              <a:t> </a:t>
+            </a:r>
+            <a:r>
+              <a:rPr lang="pt-BR" sz="2400" dirty="0" err="1" smtClean="0"/>
+              <a:t>long</a:t>
+            </a:r>
+            <a:r>
+              <a:rPr lang="pt-BR" sz="2400" dirty="0" smtClean="0"/>
+              <a:t> </a:t>
+            </a:r>
+            <a:r>
+              <a:rPr lang="pt-BR" sz="2400" dirty="0" err="1" smtClean="0"/>
+              <a:t>skeleton</a:t>
+            </a:r>
+            <a:r>
+              <a:rPr lang="pt-BR" sz="2400" dirty="0" smtClean="0"/>
+              <a:t> </a:t>
+            </a:r>
+            <a:r>
+              <a:rPr lang="pt-BR" sz="2400" dirty="0" err="1" smtClean="0"/>
+              <a:t>edges</a:t>
+            </a:r>
+            <a:r>
+              <a:rPr lang="pt-BR" sz="2400" dirty="0" smtClean="0"/>
+              <a:t> in </a:t>
+            </a:r>
+            <a:r>
+              <a:rPr lang="pt-BR" sz="2400" dirty="0" err="1" smtClean="0"/>
+              <a:t>straight</a:t>
+            </a:r>
+            <a:r>
+              <a:rPr lang="pt-BR" sz="2400" dirty="0" smtClean="0"/>
+              <a:t> </a:t>
+            </a:r>
+            <a:r>
+              <a:rPr lang="pt-BR" sz="2400" dirty="0" err="1" smtClean="0"/>
+              <a:t>regions</a:t>
+            </a:r>
+            <a:r>
+              <a:rPr lang="pt-BR" sz="2400" dirty="0" smtClean="0"/>
+              <a:t>.</a:t>
+            </a:r>
+          </a:p>
+          <a:p>
+            <a:pPr>
+              <a:buNone/>
+            </a:pPr>
+            <a:endParaRPr lang="pt-BR" dirty="0" smtClean="0"/>
+          </a:p>
+          <a:p>
+            <a:pPr>
+              <a:buNone/>
+            </a:pPr>
+            <a:endParaRPr lang="pt-BR" dirty="0" smtClean="0"/>
+          </a:p>
+          <a:p>
+            <a:pPr>
+              <a:buNone/>
+            </a:pPr>
+            <a:endParaRPr lang="pt-BR" dirty="0" smtClean="0"/>
+          </a:p>
+          <a:p>
+            <a:pPr>
+              <a:buNone/>
+            </a:pPr>
+            <a:r>
+              <a:rPr lang="pt-BR" dirty="0" smtClean="0"/>
+              <a:t>Total </a:t>
+            </a:r>
+            <a:r>
+              <a:rPr lang="pt-BR" dirty="0" err="1" smtClean="0"/>
+              <a:t>Cost</a:t>
+            </a:r>
+            <a:endParaRPr lang="pt-BR" dirty="0"/>
+          </a:p>
+        </p:txBody>
+      </p:sp>
+      <p:pic>
+        <p:nvPicPr>
+          <p:cNvPr id="2050" name="Picture 2"/>
+          <p:cNvPicPr>
+            <a:picLocks noChangeAspect="1" noChangeArrowheads="1"/>
+          </p:cNvPicPr>
+          <p:nvPr/>
+        </p:nvPicPr>
+        <p:blipFill>
+          <a:blip r:embed="rId2"/>
+          <a:srcRect/>
+          <a:stretch>
+            <a:fillRect/>
+          </a:stretch>
+        </p:blipFill>
+        <p:spPr bwMode="auto">
+          <a:xfrm>
+            <a:off x="990600" y="3276600"/>
+            <a:ext cx="3857625" cy="714375"/>
+          </a:xfrm>
+          <a:prstGeom prst="rect">
+            <a:avLst/>
+          </a:prstGeom>
+          <a:noFill/>
+          <a:ln w="9525">
+            <a:noFill/>
+            <a:miter lim="800000"/>
+            <a:headEnd/>
+            <a:tailEnd/>
+          </a:ln>
+          <a:effectLst/>
+        </p:spPr>
+      </p:pic>
+      <p:pic>
+        <p:nvPicPr>
+          <p:cNvPr id="2051" name="Picture 3"/>
+          <p:cNvPicPr>
+            <a:picLocks noChangeAspect="1" noChangeArrowheads="1"/>
+          </p:cNvPicPr>
+          <p:nvPr/>
+        </p:nvPicPr>
+        <p:blipFill>
+          <a:blip r:embed="rId3"/>
+          <a:srcRect/>
+          <a:stretch>
+            <a:fillRect/>
+          </a:stretch>
+        </p:blipFill>
+        <p:spPr bwMode="auto">
+          <a:xfrm>
+            <a:off x="1019175" y="5238750"/>
+            <a:ext cx="3629025" cy="476250"/>
+          </a:xfrm>
+          <a:prstGeom prst="rect">
+            <a:avLst/>
+          </a:prstGeom>
+          <a:noFill/>
+          <a:ln w="9525">
+            <a:noFill/>
+            <a:miter lim="800000"/>
+            <a:headEnd/>
+            <a:tailEnd/>
+          </a:ln>
+          <a:effectLst/>
+        </p:spPr>
+      </p:pic>
+      <p:pic>
+        <p:nvPicPr>
+          <p:cNvPr id="2052" name="Picture 4"/>
+          <p:cNvPicPr>
+            <a:picLocks noChangeAspect="1" noChangeArrowheads="1"/>
+          </p:cNvPicPr>
+          <p:nvPr/>
+        </p:nvPicPr>
+        <p:blipFill>
+          <a:blip r:embed="rId4"/>
+          <a:srcRect/>
+          <a:stretch>
+            <a:fillRect/>
+          </a:stretch>
+        </p:blipFill>
+        <p:spPr bwMode="auto">
+          <a:xfrm>
+            <a:off x="1066800" y="5791200"/>
+            <a:ext cx="990600" cy="342900"/>
+          </a:xfrm>
+          <a:prstGeom prst="rect">
+            <a:avLst/>
+          </a:prstGeom>
+          <a:noFill/>
+          <a:ln w="9525">
+            <a:noFill/>
+            <a:miter lim="800000"/>
+            <a:headEnd/>
+            <a:tailEnd/>
+          </a:ln>
+          <a:effectLst/>
+        </p:spPr>
+      </p:pic>
+      <p:pic>
+        <p:nvPicPr>
+          <p:cNvPr id="2053" name="Picture 5"/>
+          <p:cNvPicPr>
+            <a:picLocks noChangeAspect="1" noChangeArrowheads="1"/>
+          </p:cNvPicPr>
+          <p:nvPr/>
+        </p:nvPicPr>
+        <p:blipFill>
+          <a:blip r:embed="rId5"/>
+          <a:srcRect/>
+          <a:stretch>
+            <a:fillRect/>
+          </a:stretch>
+        </p:blipFill>
+        <p:spPr bwMode="auto">
+          <a:xfrm>
+            <a:off x="2590800" y="5791200"/>
+            <a:ext cx="990600" cy="314325"/>
+          </a:xfrm>
+          <a:prstGeom prst="rect">
+            <a:avLst/>
+          </a:prstGeom>
+          <a:noFill/>
+          <a:ln w="9525">
+            <a:noFill/>
+            <a:miter lim="800000"/>
+            <a:headEnd/>
+            <a:tailEnd/>
+          </a:ln>
+          <a:effectLst/>
+        </p:spPr>
+      </p:pic>
     </p:spTree>
   </p:cSld>
   <p:clrMapOvr>
@@ -5614,7 +6928,7 @@
 </file>
 
 <file path=ppt/slides/slide15.xml><?xml version="1.0" encoding="utf-8"?>
-<p:sld xmlns:a="http://schemas.openxmlformats.org/drawingml/2006/main" xmlns:r="http://schemas.openxmlformats.org/officeDocument/2006/relationships" xmlns:p="http://schemas.openxmlformats.org/presentationml/2006/main" showMasterSp="0">
+<p:sld xmlns:a="http://schemas.openxmlformats.org/drawingml/2006/main" xmlns:r="http://schemas.openxmlformats.org/officeDocument/2006/relationships" xmlns:p="http://schemas.openxmlformats.org/presentationml/2006/main">
   <p:cSld>
     <p:spTree>
       <p:nvGrpSpPr>
@@ -5640,25 +6954,806 @@
             <p:ph type="title"/>
           </p:nvPr>
         </p:nvSpPr>
+        <p:spPr/>
+        <p:txBody>
+          <a:bodyPr/>
+          <a:lstStyle/>
+          <a:p>
+            <a:r>
+              <a:rPr lang="en-US" dirty="0" smtClean="0"/>
+              <a:t>Embedding Refinement</a:t>
+            </a:r>
+            <a:endParaRPr lang="en-US" dirty="0"/>
+          </a:p>
+        </p:txBody>
+      </p:sp>
+      <p:sp>
+        <p:nvSpPr>
+          <p:cNvPr id="3" name="Content Placeholder 2"/>
+          <p:cNvSpPr>
+            <a:spLocks noGrp="1"/>
+          </p:cNvSpPr>
+          <p:nvPr>
+            <p:ph idx="1"/>
+          </p:nvPr>
+        </p:nvSpPr>
+        <p:spPr/>
+        <p:txBody>
+          <a:bodyPr/>
+          <a:lstStyle/>
+          <a:p>
+            <a:r>
+              <a:rPr lang="en-US" dirty="0" smtClean="0"/>
+              <a:t>Centralizes the skeleton</a:t>
+            </a:r>
+          </a:p>
+          <a:p>
+            <a:r>
+              <a:rPr lang="en-US" dirty="0" smtClean="0"/>
+              <a:t>Ensure the skeletons edges are inside their respective regions</a:t>
+            </a:r>
+          </a:p>
+          <a:p>
+            <a:endParaRPr lang="en-US" dirty="0" smtClean="0"/>
+          </a:p>
+          <a:p>
+            <a:endParaRPr lang="en-US" dirty="0" smtClean="0"/>
+          </a:p>
+          <a:p>
+            <a:endParaRPr lang="en-US" dirty="0" smtClean="0"/>
+          </a:p>
+          <a:p>
+            <a:endParaRPr lang="en-US" dirty="0"/>
+          </a:p>
+        </p:txBody>
+      </p:sp>
+      <p:pic>
+        <p:nvPicPr>
+          <p:cNvPr id="4098" name="Picture 2"/>
+          <p:cNvPicPr>
+            <a:picLocks noChangeAspect="1" noChangeArrowheads="1"/>
+          </p:cNvPicPr>
+          <p:nvPr/>
+        </p:nvPicPr>
+        <p:blipFill>
+          <a:blip r:embed="rId2"/>
+          <a:srcRect/>
+          <a:stretch>
+            <a:fillRect/>
+          </a:stretch>
+        </p:blipFill>
+        <p:spPr bwMode="auto">
+          <a:xfrm>
+            <a:off x="152399" y="3581400"/>
+            <a:ext cx="8915401" cy="1678800"/>
+          </a:xfrm>
+          <a:prstGeom prst="rect">
+            <a:avLst/>
+          </a:prstGeom>
+          <a:noFill/>
+          <a:ln w="9525">
+            <a:noFill/>
+            <a:miter lim="800000"/>
+            <a:headEnd/>
+            <a:tailEnd/>
+          </a:ln>
+          <a:effectLst/>
+        </p:spPr>
+      </p:pic>
+    </p:spTree>
+  </p:cSld>
+  <p:clrMapOvr>
+    <a:masterClrMapping/>
+  </p:clrMapOvr>
+</p:sld>
+</file>
+
+<file path=ppt/slides/slide16.xml><?xml version="1.0" encoding="utf-8"?>
+<p:sld xmlns:a="http://schemas.openxmlformats.org/drawingml/2006/main" xmlns:r="http://schemas.openxmlformats.org/officeDocument/2006/relationships" xmlns:p="http://schemas.openxmlformats.org/presentationml/2006/main">
+  <p:cSld>
+    <p:spTree>
+      <p:nvGrpSpPr>
+        <p:cNvPr id="1" name=""/>
+        <p:cNvGrpSpPr/>
+        <p:nvPr/>
+      </p:nvGrpSpPr>
+      <p:grpSpPr>
+        <a:xfrm>
+          <a:off x="0" y="0"/>
+          <a:ext cx="0" cy="0"/>
+          <a:chOff x="0" y="0"/>
+          <a:chExt cx="0" cy="0"/>
+        </a:xfrm>
+      </p:grpSpPr>
+      <p:sp>
+        <p:nvSpPr>
+          <p:cNvPr id="2" name="Title 1"/>
+          <p:cNvSpPr>
+            <a:spLocks noGrp="1"/>
+          </p:cNvSpPr>
+          <p:nvPr>
+            <p:ph type="title"/>
+          </p:nvPr>
+        </p:nvSpPr>
+        <p:spPr/>
+        <p:txBody>
+          <a:bodyPr/>
+          <a:lstStyle/>
+          <a:p>
+            <a:r>
+              <a:rPr lang="en-US" dirty="0" smtClean="0"/>
+              <a:t>Results</a:t>
+            </a:r>
+            <a:endParaRPr lang="en-US" dirty="0"/>
+          </a:p>
+        </p:txBody>
+      </p:sp>
+      <p:sp>
+        <p:nvSpPr>
+          <p:cNvPr id="3" name="Content Placeholder 2"/>
+          <p:cNvSpPr>
+            <a:spLocks noGrp="1"/>
+          </p:cNvSpPr>
+          <p:nvPr>
+            <p:ph idx="1"/>
+          </p:nvPr>
+        </p:nvSpPr>
+        <p:spPr/>
+        <p:txBody>
+          <a:bodyPr/>
+          <a:lstStyle/>
+          <a:p>
+            <a:r>
+              <a:rPr lang="en-US" dirty="0" smtClean="0"/>
+              <a:t>Implementation</a:t>
+            </a:r>
+          </a:p>
+          <a:p>
+            <a:pPr lvl="1"/>
+            <a:r>
+              <a:rPr lang="en-US" i="1" dirty="0" smtClean="0"/>
+              <a:t>C++</a:t>
+            </a:r>
+          </a:p>
+          <a:p>
+            <a:pPr lvl="1"/>
+            <a:r>
+              <a:rPr lang="en-US" i="1" dirty="0" smtClean="0"/>
+              <a:t>OpenGL</a:t>
+            </a:r>
+          </a:p>
+          <a:p>
+            <a:pPr lvl="1"/>
+            <a:r>
+              <a:rPr lang="en-US" i="1" dirty="0" smtClean="0"/>
+              <a:t>Qt</a:t>
+            </a:r>
+            <a:r>
+              <a:rPr lang="en-US" dirty="0" smtClean="0"/>
+              <a:t> for UI</a:t>
+            </a:r>
+          </a:p>
+          <a:p>
+            <a:pPr lvl="1"/>
+            <a:r>
+              <a:rPr lang="en-US" i="1" dirty="0" err="1" smtClean="0"/>
+              <a:t>OpenMesh</a:t>
+            </a:r>
+            <a:r>
+              <a:rPr lang="en-US" dirty="0" smtClean="0"/>
+              <a:t> for mesh management</a:t>
+            </a:r>
+          </a:p>
+          <a:p>
+            <a:pPr lvl="1"/>
+            <a:r>
+              <a:rPr lang="en-US" i="1" dirty="0" err="1" smtClean="0"/>
+              <a:t>Cholmod</a:t>
+            </a:r>
+            <a:r>
+              <a:rPr lang="en-US" dirty="0" smtClean="0"/>
+              <a:t> for system solving</a:t>
+            </a:r>
+          </a:p>
+          <a:p>
+            <a:endParaRPr lang="en-US" dirty="0" smtClean="0"/>
+          </a:p>
+          <a:p>
+            <a:endParaRPr lang="en-US" dirty="0" smtClean="0"/>
+          </a:p>
+          <a:p>
+            <a:endParaRPr lang="en-US" dirty="0" smtClean="0"/>
+          </a:p>
+          <a:p>
+            <a:endParaRPr lang="en-US" dirty="0"/>
+          </a:p>
+        </p:txBody>
+      </p:sp>
+    </p:spTree>
+  </p:cSld>
+  <p:clrMapOvr>
+    <a:masterClrMapping/>
+  </p:clrMapOvr>
+</p:sld>
+</file>
+
+<file path=ppt/slides/slide17.xml><?xml version="1.0" encoding="utf-8"?>
+<p:sld xmlns:a="http://schemas.openxmlformats.org/drawingml/2006/main" xmlns:r="http://schemas.openxmlformats.org/officeDocument/2006/relationships" xmlns:p="http://schemas.openxmlformats.org/presentationml/2006/main">
+  <p:cSld>
+    <p:spTree>
+      <p:nvGrpSpPr>
+        <p:cNvPr id="1" name=""/>
+        <p:cNvGrpSpPr/>
+        <p:nvPr/>
+      </p:nvGrpSpPr>
+      <p:grpSpPr>
+        <a:xfrm>
+          <a:off x="0" y="0"/>
+          <a:ext cx="0" cy="0"/>
+          <a:chOff x="0" y="0"/>
+          <a:chExt cx="0" cy="0"/>
+        </a:xfrm>
+      </p:grpSpPr>
+      <p:sp>
+        <p:nvSpPr>
+          <p:cNvPr id="2" name="Title 1"/>
+          <p:cNvSpPr>
+            <a:spLocks noGrp="1"/>
+          </p:cNvSpPr>
+          <p:nvPr>
+            <p:ph type="title"/>
+          </p:nvPr>
+        </p:nvSpPr>
+        <p:spPr/>
+        <p:txBody>
+          <a:bodyPr/>
+          <a:lstStyle/>
+          <a:p>
+            <a:r>
+              <a:rPr lang="en-US" dirty="0" smtClean="0"/>
+              <a:t>Results</a:t>
+            </a:r>
+            <a:endParaRPr lang="en-US" dirty="0"/>
+          </a:p>
+        </p:txBody>
+      </p:sp>
+      <p:sp>
+        <p:nvSpPr>
+          <p:cNvPr id="3" name="Content Placeholder 2"/>
+          <p:cNvSpPr>
+            <a:spLocks noGrp="1"/>
+          </p:cNvSpPr>
+          <p:nvPr>
+            <p:ph idx="1"/>
+          </p:nvPr>
+        </p:nvSpPr>
         <p:spPr>
           <a:xfrm>
-            <a:off x="0" y="2590800"/>
-            <a:ext cx="9144000" cy="1557528"/>
+            <a:off x="457200" y="1775191"/>
+            <a:ext cx="8229600" cy="4625609"/>
           </a:xfrm>
         </p:spPr>
         <p:txBody>
           <a:bodyPr/>
           <a:lstStyle/>
           <a:p>
-            <a:pPr algn="ctr"/>
             <a:r>
               <a:rPr lang="en-US" dirty="0" smtClean="0"/>
-              <a:t>Questions?</a:t>
-            </a:r>
+              <a:t>Torus</a:t>
+            </a:r>
+            <a:endParaRPr lang="en-US" dirty="0" smtClean="0"/>
+          </a:p>
+          <a:p>
+            <a:pPr>
+              <a:buNone/>
+            </a:pPr>
+            <a:endParaRPr lang="en-US" dirty="0" smtClean="0"/>
+          </a:p>
+          <a:p>
+            <a:endParaRPr lang="en-US" dirty="0" smtClean="0"/>
+          </a:p>
+          <a:p>
+            <a:endParaRPr lang="en-US" dirty="0" smtClean="0"/>
+          </a:p>
+          <a:p>
             <a:endParaRPr lang="en-US" dirty="0"/>
           </a:p>
         </p:txBody>
       </p:sp>
+      <p:pic>
+        <p:nvPicPr>
+          <p:cNvPr id="2050" name="Picture 2" descr="C:\Users\Guilherme\Skeleton-Extraction\Docs\pics\torus_0.png"/>
+          <p:cNvPicPr>
+            <a:picLocks noChangeAspect="1" noChangeArrowheads="1"/>
+          </p:cNvPicPr>
+          <p:nvPr/>
+        </p:nvPicPr>
+        <p:blipFill>
+          <a:blip r:embed="rId2" cstate="print"/>
+          <a:srcRect/>
+          <a:stretch>
+            <a:fillRect/>
+          </a:stretch>
+        </p:blipFill>
+        <p:spPr bwMode="auto">
+          <a:xfrm>
+            <a:off x="947420" y="2433638"/>
+            <a:ext cx="2954526" cy="2062162"/>
+          </a:xfrm>
+          <a:prstGeom prst="rect">
+            <a:avLst/>
+          </a:prstGeom>
+          <a:noFill/>
+        </p:spPr>
+      </p:pic>
+      <p:pic>
+        <p:nvPicPr>
+          <p:cNvPr id="2051" name="Picture 3" descr="C:\Users\Guilherme\Skeleton-Extraction\Docs\pics\torus_1.png"/>
+          <p:cNvPicPr>
+            <a:picLocks noChangeAspect="1" noChangeArrowheads="1"/>
+          </p:cNvPicPr>
+          <p:nvPr/>
+        </p:nvPicPr>
+        <p:blipFill>
+          <a:blip r:embed="rId3" cstate="print"/>
+          <a:srcRect/>
+          <a:stretch>
+            <a:fillRect/>
+          </a:stretch>
+        </p:blipFill>
+        <p:spPr bwMode="auto">
+          <a:xfrm>
+            <a:off x="4224020" y="2362200"/>
+            <a:ext cx="3168017" cy="2205038"/>
+          </a:xfrm>
+          <a:prstGeom prst="rect">
+            <a:avLst/>
+          </a:prstGeom>
+          <a:noFill/>
+        </p:spPr>
+      </p:pic>
+      <p:pic>
+        <p:nvPicPr>
+          <p:cNvPr id="2052" name="Picture 4" descr="C:\Users\Guilherme\Skeleton-Extraction\Docs\pics\torus_2.png"/>
+          <p:cNvPicPr>
+            <a:picLocks noChangeAspect="1" noChangeArrowheads="1"/>
+          </p:cNvPicPr>
+          <p:nvPr/>
+        </p:nvPicPr>
+        <p:blipFill>
+          <a:blip r:embed="rId4" cstate="print"/>
+          <a:srcRect/>
+          <a:stretch>
+            <a:fillRect/>
+          </a:stretch>
+        </p:blipFill>
+        <p:spPr bwMode="auto">
+          <a:xfrm>
+            <a:off x="838200" y="4472762"/>
+            <a:ext cx="3081020" cy="2149549"/>
+          </a:xfrm>
+          <a:prstGeom prst="rect">
+            <a:avLst/>
+          </a:prstGeom>
+          <a:noFill/>
+        </p:spPr>
+      </p:pic>
+      <p:pic>
+        <p:nvPicPr>
+          <p:cNvPr id="2053" name="Picture 5" descr="C:\Users\Guilherme\Skeleton-Extraction\Docs\pics\torus_3.png"/>
+          <p:cNvPicPr>
+            <a:picLocks noChangeAspect="1" noChangeArrowheads="1"/>
+          </p:cNvPicPr>
+          <p:nvPr/>
+        </p:nvPicPr>
+        <p:blipFill>
+          <a:blip r:embed="rId5" cstate="print"/>
+          <a:srcRect/>
+          <a:stretch>
+            <a:fillRect/>
+          </a:stretch>
+        </p:blipFill>
+        <p:spPr bwMode="auto">
+          <a:xfrm>
+            <a:off x="4224020" y="4396054"/>
+            <a:ext cx="3200400" cy="2238107"/>
+          </a:xfrm>
+          <a:prstGeom prst="rect">
+            <a:avLst/>
+          </a:prstGeom>
+          <a:noFill/>
+        </p:spPr>
+      </p:pic>
+    </p:spTree>
+  </p:cSld>
+  <p:clrMapOvr>
+    <a:masterClrMapping/>
+  </p:clrMapOvr>
+</p:sld>
+</file>
+
+<file path=ppt/slides/slide18.xml><?xml version="1.0" encoding="utf-8"?>
+<p:sld xmlns:a="http://schemas.openxmlformats.org/drawingml/2006/main" xmlns:r="http://schemas.openxmlformats.org/officeDocument/2006/relationships" xmlns:p="http://schemas.openxmlformats.org/presentationml/2006/main">
+  <p:cSld>
+    <p:spTree>
+      <p:nvGrpSpPr>
+        <p:cNvPr id="1" name=""/>
+        <p:cNvGrpSpPr/>
+        <p:nvPr/>
+      </p:nvGrpSpPr>
+      <p:grpSpPr>
+        <a:xfrm>
+          <a:off x="0" y="0"/>
+          <a:ext cx="0" cy="0"/>
+          <a:chOff x="0" y="0"/>
+          <a:chExt cx="0" cy="0"/>
+        </a:xfrm>
+      </p:grpSpPr>
+      <p:sp>
+        <p:nvSpPr>
+          <p:cNvPr id="2" name="Title 1"/>
+          <p:cNvSpPr>
+            <a:spLocks noGrp="1"/>
+          </p:cNvSpPr>
+          <p:nvPr>
+            <p:ph type="title"/>
+          </p:nvPr>
+        </p:nvSpPr>
+        <p:spPr/>
+        <p:txBody>
+          <a:bodyPr/>
+          <a:lstStyle/>
+          <a:p>
+            <a:r>
+              <a:rPr lang="en-US" dirty="0" smtClean="0"/>
+              <a:t>Results</a:t>
+            </a:r>
+            <a:endParaRPr lang="en-US" dirty="0"/>
+          </a:p>
+        </p:txBody>
+      </p:sp>
+      <p:sp>
+        <p:nvSpPr>
+          <p:cNvPr id="3" name="Content Placeholder 2"/>
+          <p:cNvSpPr>
+            <a:spLocks noGrp="1"/>
+          </p:cNvSpPr>
+          <p:nvPr>
+            <p:ph idx="1"/>
+          </p:nvPr>
+        </p:nvSpPr>
+        <p:spPr>
+          <a:xfrm>
+            <a:off x="457200" y="1775191"/>
+            <a:ext cx="8229600" cy="4625609"/>
+          </a:xfrm>
+        </p:spPr>
+        <p:txBody>
+          <a:bodyPr/>
+          <a:lstStyle/>
+          <a:p>
+            <a:r>
+              <a:rPr lang="en-US" dirty="0" err="1" smtClean="0"/>
+              <a:t>Bitorus</a:t>
+            </a:r>
+            <a:endParaRPr lang="en-US" dirty="0" smtClean="0"/>
+          </a:p>
+          <a:p>
+            <a:pPr>
+              <a:buNone/>
+            </a:pPr>
+            <a:endParaRPr lang="en-US" dirty="0" smtClean="0"/>
+          </a:p>
+          <a:p>
+            <a:endParaRPr lang="en-US" dirty="0" smtClean="0"/>
+          </a:p>
+          <a:p>
+            <a:endParaRPr lang="en-US" dirty="0" smtClean="0"/>
+          </a:p>
+          <a:p>
+            <a:endParaRPr lang="en-US" dirty="0"/>
+          </a:p>
+        </p:txBody>
+      </p:sp>
+      <p:pic>
+        <p:nvPicPr>
+          <p:cNvPr id="1026" name="Picture 2" descr="C:\Users\Guilherme\Skeleton-Extraction\Docs\pics\bitorus_0.png"/>
+          <p:cNvPicPr>
+            <a:picLocks noChangeAspect="1" noChangeArrowheads="1"/>
+          </p:cNvPicPr>
+          <p:nvPr/>
+        </p:nvPicPr>
+        <p:blipFill>
+          <a:blip r:embed="rId2"/>
+          <a:srcRect l="20160" t="26805" r="21259" b="26805"/>
+          <a:stretch>
+            <a:fillRect/>
+          </a:stretch>
+        </p:blipFill>
+        <p:spPr bwMode="auto">
+          <a:xfrm>
+            <a:off x="1254728" y="2667000"/>
+            <a:ext cx="2873709" cy="1586991"/>
+          </a:xfrm>
+          <a:prstGeom prst="rect">
+            <a:avLst/>
+          </a:prstGeom>
+          <a:noFill/>
+        </p:spPr>
+      </p:pic>
+      <p:pic>
+        <p:nvPicPr>
+          <p:cNvPr id="1028" name="Picture 4" descr="C:\Users\Guilherme\Skeleton-Extraction\Docs\pics\bitorus_2.png"/>
+          <p:cNvPicPr>
+            <a:picLocks noChangeAspect="1" noChangeArrowheads="1"/>
+          </p:cNvPicPr>
+          <p:nvPr/>
+        </p:nvPicPr>
+        <p:blipFill>
+          <a:blip r:embed="rId3"/>
+          <a:srcRect l="18345" t="26207" r="18345" b="26207"/>
+          <a:stretch>
+            <a:fillRect/>
+          </a:stretch>
+        </p:blipFill>
+        <p:spPr bwMode="auto">
+          <a:xfrm>
+            <a:off x="4378928" y="2590800"/>
+            <a:ext cx="3184018" cy="1675270"/>
+          </a:xfrm>
+          <a:prstGeom prst="rect">
+            <a:avLst/>
+          </a:prstGeom>
+          <a:noFill/>
+        </p:spPr>
+      </p:pic>
+      <p:pic>
+        <p:nvPicPr>
+          <p:cNvPr id="1029" name="Picture 5" descr="C:\Users\Guilherme\Skeleton-Extraction\Docs\pics\bitorus_3.png"/>
+          <p:cNvPicPr>
+            <a:picLocks noChangeAspect="1" noChangeArrowheads="1"/>
+          </p:cNvPicPr>
+          <p:nvPr/>
+        </p:nvPicPr>
+        <p:blipFill>
+          <a:blip r:embed="rId4"/>
+          <a:srcRect l="18256" t="26316" r="18256" b="26316"/>
+          <a:stretch>
+            <a:fillRect/>
+          </a:stretch>
+        </p:blipFill>
+        <p:spPr bwMode="auto">
+          <a:xfrm>
+            <a:off x="1115600" y="4343400"/>
+            <a:ext cx="3238944" cy="1676400"/>
+          </a:xfrm>
+          <a:prstGeom prst="rect">
+            <a:avLst/>
+          </a:prstGeom>
+          <a:noFill/>
+        </p:spPr>
+      </p:pic>
+      <p:pic>
+        <p:nvPicPr>
+          <p:cNvPr id="1030" name="Picture 6" descr="C:\Users\Guilherme\Skeleton-Extraction\Docs\pics\bitorus_4.png"/>
+          <p:cNvPicPr>
+            <a:picLocks noChangeAspect="1" noChangeArrowheads="1"/>
+          </p:cNvPicPr>
+          <p:nvPr/>
+        </p:nvPicPr>
+        <p:blipFill>
+          <a:blip r:embed="rId5"/>
+          <a:srcRect l="18345" t="26280" r="18345" b="26280"/>
+          <a:stretch>
+            <a:fillRect/>
+          </a:stretch>
+        </p:blipFill>
+        <p:spPr bwMode="auto">
+          <a:xfrm>
+            <a:off x="4378928" y="4328160"/>
+            <a:ext cx="3317272" cy="1735209"/>
+          </a:xfrm>
+          <a:prstGeom prst="rect">
+            <a:avLst/>
+          </a:prstGeom>
+          <a:noFill/>
+        </p:spPr>
+      </p:pic>
+    </p:spTree>
+  </p:cSld>
+  <p:clrMapOvr>
+    <a:masterClrMapping/>
+  </p:clrMapOvr>
+</p:sld>
+</file>
+
+<file path=ppt/slides/slide19.xml><?xml version="1.0" encoding="utf-8"?>
+<p:sld xmlns:a="http://schemas.openxmlformats.org/drawingml/2006/main" xmlns:r="http://schemas.openxmlformats.org/officeDocument/2006/relationships" xmlns:p="http://schemas.openxmlformats.org/presentationml/2006/main">
+  <p:cSld>
+    <p:spTree>
+      <p:nvGrpSpPr>
+        <p:cNvPr id="1" name=""/>
+        <p:cNvGrpSpPr/>
+        <p:nvPr/>
+      </p:nvGrpSpPr>
+      <p:grpSpPr>
+        <a:xfrm>
+          <a:off x="0" y="0"/>
+          <a:ext cx="0" cy="0"/>
+          <a:chOff x="0" y="0"/>
+          <a:chExt cx="0" cy="0"/>
+        </a:xfrm>
+      </p:grpSpPr>
+      <p:pic>
+        <p:nvPicPr>
+          <p:cNvPr id="3076" name="Picture 4" descr="C:\Users\Guilherme\Skeleton-Extraction\Docs\pics\fertility_2.png"/>
+          <p:cNvPicPr>
+            <a:picLocks noChangeAspect="1" noChangeArrowheads="1"/>
+          </p:cNvPicPr>
+          <p:nvPr/>
+        </p:nvPicPr>
+        <p:blipFill>
+          <a:blip r:embed="rId2" cstate="print"/>
+          <a:srcRect/>
+          <a:stretch>
+            <a:fillRect/>
+          </a:stretch>
+        </p:blipFill>
+        <p:spPr bwMode="auto">
+          <a:xfrm>
+            <a:off x="762000" y="4567238"/>
+            <a:ext cx="3060734" cy="2138362"/>
+          </a:xfrm>
+          <a:prstGeom prst="rect">
+            <a:avLst/>
+          </a:prstGeom>
+          <a:noFill/>
+        </p:spPr>
+      </p:pic>
+      <p:sp>
+        <p:nvSpPr>
+          <p:cNvPr id="2" name="Title 1"/>
+          <p:cNvSpPr>
+            <a:spLocks noGrp="1"/>
+          </p:cNvSpPr>
+          <p:nvPr>
+            <p:ph type="title"/>
+          </p:nvPr>
+        </p:nvSpPr>
+        <p:spPr/>
+        <p:txBody>
+          <a:bodyPr/>
+          <a:lstStyle/>
+          <a:p>
+            <a:r>
+              <a:rPr lang="en-US" dirty="0" smtClean="0"/>
+              <a:t>Results</a:t>
+            </a:r>
+            <a:endParaRPr lang="en-US" dirty="0"/>
+          </a:p>
+        </p:txBody>
+      </p:sp>
+      <p:sp>
+        <p:nvSpPr>
+          <p:cNvPr id="3" name="Content Placeholder 2"/>
+          <p:cNvSpPr>
+            <a:spLocks noGrp="1"/>
+          </p:cNvSpPr>
+          <p:nvPr>
+            <p:ph idx="1"/>
+          </p:nvPr>
+        </p:nvSpPr>
+        <p:spPr>
+          <a:xfrm>
+            <a:off x="457200" y="1775191"/>
+            <a:ext cx="8229600" cy="4625609"/>
+          </a:xfrm>
+        </p:spPr>
+        <p:txBody>
+          <a:bodyPr/>
+          <a:lstStyle/>
+          <a:p>
+            <a:r>
+              <a:rPr lang="en-US" dirty="0" smtClean="0"/>
+              <a:t>Fertility</a:t>
+            </a:r>
+            <a:endParaRPr lang="en-US" dirty="0" smtClean="0"/>
+          </a:p>
+          <a:p>
+            <a:pPr>
+              <a:buNone/>
+            </a:pPr>
+            <a:endParaRPr lang="en-US" dirty="0" smtClean="0"/>
+          </a:p>
+          <a:p>
+            <a:endParaRPr lang="en-US" dirty="0" smtClean="0"/>
+          </a:p>
+          <a:p>
+            <a:endParaRPr lang="en-US" dirty="0" smtClean="0"/>
+          </a:p>
+          <a:p>
+            <a:endParaRPr lang="en-US" dirty="0"/>
+          </a:p>
+        </p:txBody>
+      </p:sp>
+      <p:pic>
+        <p:nvPicPr>
+          <p:cNvPr id="3075" name="Picture 3" descr="C:\Users\Guilherme\Skeleton-Extraction\Docs\pics\fertility_1.png"/>
+          <p:cNvPicPr>
+            <a:picLocks noChangeAspect="1" noChangeArrowheads="1"/>
+          </p:cNvPicPr>
+          <p:nvPr/>
+        </p:nvPicPr>
+        <p:blipFill>
+          <a:blip r:embed="rId3" cstate="print"/>
+          <a:srcRect/>
+          <a:stretch>
+            <a:fillRect/>
+          </a:stretch>
+        </p:blipFill>
+        <p:spPr bwMode="auto">
+          <a:xfrm>
+            <a:off x="4191000" y="2514600"/>
+            <a:ext cx="2939369" cy="2047875"/>
+          </a:xfrm>
+          <a:prstGeom prst="rect">
+            <a:avLst/>
+          </a:prstGeom>
+          <a:noFill/>
+        </p:spPr>
+      </p:pic>
+      <p:pic>
+        <p:nvPicPr>
+          <p:cNvPr id="3077" name="Picture 5" descr="C:\Users\Guilherme\Skeleton-Extraction\Docs\pics\fertility_3.png"/>
+          <p:cNvPicPr>
+            <a:picLocks noChangeAspect="1" noChangeArrowheads="1"/>
+          </p:cNvPicPr>
+          <p:nvPr/>
+        </p:nvPicPr>
+        <p:blipFill>
+          <a:blip r:embed="rId4" cstate="print"/>
+          <a:srcRect/>
+          <a:stretch>
+            <a:fillRect/>
+          </a:stretch>
+        </p:blipFill>
+        <p:spPr bwMode="auto">
+          <a:xfrm>
+            <a:off x="4419599" y="4648200"/>
+            <a:ext cx="2961279" cy="2057400"/>
+          </a:xfrm>
+          <a:prstGeom prst="rect">
+            <a:avLst/>
+          </a:prstGeom>
+          <a:noFill/>
+        </p:spPr>
+      </p:pic>
+      <p:pic>
+        <p:nvPicPr>
+          <p:cNvPr id="3074" name="Picture 2" descr="C:\Users\Guilherme\Skeleton-Extraction\Docs\pics\fertility_0.png"/>
+          <p:cNvPicPr>
+            <a:picLocks noChangeAspect="1" noChangeArrowheads="1"/>
+          </p:cNvPicPr>
+          <p:nvPr/>
+        </p:nvPicPr>
+        <p:blipFill>
+          <a:blip r:embed="rId5" cstate="print"/>
+          <a:srcRect/>
+          <a:stretch>
+            <a:fillRect/>
+          </a:stretch>
+        </p:blipFill>
+        <p:spPr bwMode="auto">
+          <a:xfrm>
+            <a:off x="914400" y="2514600"/>
+            <a:ext cx="2895600" cy="2016528"/>
+          </a:xfrm>
+          <a:prstGeom prst="rect">
+            <a:avLst/>
+          </a:prstGeom>
+          <a:noFill/>
+        </p:spPr>
+      </p:pic>
     </p:spTree>
   </p:cSld>
   <p:clrMapOvr>
@@ -5773,23 +7868,7 @@
           <a:p>
             <a:r>
               <a:rPr lang="en-US" dirty="0" smtClean="0"/>
-              <a:t>Au, O. K. C., </a:t>
-            </a:r>
-            <a:r>
-              <a:rPr lang="en-US" dirty="0" err="1" smtClean="0"/>
-              <a:t>Chiew-Lan</a:t>
-            </a:r>
-            <a:r>
-              <a:rPr lang="en-US" dirty="0" smtClean="0"/>
-              <a:t> Tai, Hung-</a:t>
-            </a:r>
-            <a:r>
-              <a:rPr lang="en-US" dirty="0" err="1" smtClean="0"/>
-              <a:t>Kuo</a:t>
-            </a:r>
-            <a:r>
-              <a:rPr lang="en-US" dirty="0" smtClean="0"/>
-              <a:t> Chu, Daniel Cohen-Or, and Tong-Yee Lee.  </a:t>
+              <a:t>Au, O. K. C., Tai, C. L., Chu, H. K., Cohen-Or, D., and Lee, T. Y.  </a:t>
             </a:r>
           </a:p>
           <a:p>
@@ -5808,6 +7887,142 @@
           </a:p>
           <a:p>
             <a:endParaRPr lang="pt-BR" dirty="0"/>
+          </a:p>
+        </p:txBody>
+      </p:sp>
+    </p:spTree>
+  </p:cSld>
+  <p:clrMapOvr>
+    <a:masterClrMapping/>
+  </p:clrMapOvr>
+</p:sld>
+</file>
+
+<file path=ppt/slides/slide20.xml><?xml version="1.0" encoding="utf-8"?>
+<p:sld xmlns:a="http://schemas.openxmlformats.org/drawingml/2006/main" xmlns:r="http://schemas.openxmlformats.org/officeDocument/2006/relationships" xmlns:p="http://schemas.openxmlformats.org/presentationml/2006/main">
+  <p:cSld>
+    <p:spTree>
+      <p:nvGrpSpPr>
+        <p:cNvPr id="1" name=""/>
+        <p:cNvGrpSpPr/>
+        <p:nvPr/>
+      </p:nvGrpSpPr>
+      <p:grpSpPr>
+        <a:xfrm>
+          <a:off x="0" y="0"/>
+          <a:ext cx="0" cy="0"/>
+          <a:chOff x="0" y="0"/>
+          <a:chExt cx="0" cy="0"/>
+        </a:xfrm>
+      </p:grpSpPr>
+      <p:sp>
+        <p:nvSpPr>
+          <p:cNvPr id="2" name="Title 1"/>
+          <p:cNvSpPr>
+            <a:spLocks noGrp="1"/>
+          </p:cNvSpPr>
+          <p:nvPr>
+            <p:ph type="title"/>
+          </p:nvPr>
+        </p:nvSpPr>
+        <p:spPr/>
+        <p:txBody>
+          <a:bodyPr/>
+          <a:lstStyle/>
+          <a:p>
+            <a:r>
+              <a:rPr lang="en-US" dirty="0" smtClean="0"/>
+              <a:t>Conclusion</a:t>
+            </a:r>
+            <a:endParaRPr lang="en-US" dirty="0"/>
+          </a:p>
+        </p:txBody>
+      </p:sp>
+      <p:sp>
+        <p:nvSpPr>
+          <p:cNvPr id="3" name="Content Placeholder 2"/>
+          <p:cNvSpPr>
+            <a:spLocks noGrp="1"/>
+          </p:cNvSpPr>
+          <p:nvPr>
+            <p:ph idx="1"/>
+          </p:nvPr>
+        </p:nvSpPr>
+        <p:spPr/>
+        <p:txBody>
+          <a:bodyPr/>
+          <a:lstStyle/>
+          <a:p>
+            <a:r>
+              <a:rPr lang="en-US" dirty="0" smtClean="0"/>
+              <a:t>=P</a:t>
+            </a:r>
+          </a:p>
+          <a:p>
+            <a:endParaRPr lang="en-US" dirty="0" smtClean="0"/>
+          </a:p>
+          <a:p>
+            <a:endParaRPr lang="en-US" dirty="0" smtClean="0"/>
+          </a:p>
+          <a:p>
+            <a:endParaRPr lang="en-US" dirty="0" smtClean="0"/>
+          </a:p>
+          <a:p>
+            <a:endParaRPr lang="en-US" dirty="0"/>
+          </a:p>
+        </p:txBody>
+      </p:sp>
+    </p:spTree>
+  </p:cSld>
+  <p:clrMapOvr>
+    <a:masterClrMapping/>
+  </p:clrMapOvr>
+</p:sld>
+</file>
+
+<file path=ppt/slides/slide21.xml><?xml version="1.0" encoding="utf-8"?>
+<p:sld xmlns:a="http://schemas.openxmlformats.org/drawingml/2006/main" xmlns:r="http://schemas.openxmlformats.org/officeDocument/2006/relationships" xmlns:p="http://schemas.openxmlformats.org/presentationml/2006/main" showMasterSp="0">
+  <p:cSld>
+    <p:spTree>
+      <p:nvGrpSpPr>
+        <p:cNvPr id="1" name=""/>
+        <p:cNvGrpSpPr/>
+        <p:nvPr/>
+      </p:nvGrpSpPr>
+      <p:grpSpPr>
+        <a:xfrm>
+          <a:off x="0" y="0"/>
+          <a:ext cx="0" cy="0"/>
+          <a:chOff x="0" y="0"/>
+          <a:chExt cx="0" cy="0"/>
+        </a:xfrm>
+      </p:grpSpPr>
+      <p:sp>
+        <p:nvSpPr>
+          <p:cNvPr id="2" name="Title 1"/>
+          <p:cNvSpPr>
+            <a:spLocks noGrp="1"/>
+          </p:cNvSpPr>
+          <p:nvPr>
+            <p:ph type="title"/>
+          </p:nvPr>
+        </p:nvSpPr>
+        <p:spPr>
+          <a:xfrm>
+            <a:off x="0" y="2590800"/>
+            <a:ext cx="9144000" cy="1557528"/>
+          </a:xfrm>
+        </p:spPr>
+        <p:txBody>
+          <a:bodyPr/>
+          <a:lstStyle/>
+          <a:p>
+            <a:pPr algn="ctr"/>
+            <a:r>
+              <a:rPr lang="en-US" dirty="0" smtClean="0"/>
+              <a:t>Questions?</a:t>
+            </a:r>
+            <a:endParaRPr lang="en-US" dirty="0"/>
           </a:p>
         </p:txBody>
       </p:sp>
@@ -5853,8 +8068,8 @@
         </p:blipFill>
         <p:spPr bwMode="auto">
           <a:xfrm>
-            <a:off x="2362200" y="3200400"/>
-            <a:ext cx="6735763" cy="3571875"/>
+            <a:off x="4419599" y="3918508"/>
+            <a:ext cx="4068763" cy="2157605"/>
           </a:xfrm>
           <a:prstGeom prst="rect">
             <a:avLst/>
@@ -5906,10 +8121,19 @@
             </a:r>
           </a:p>
           <a:p>
+            <a:pPr>
+              <a:buNone/>
+            </a:pPr>
+            <a:endParaRPr lang="en-US" dirty="0" smtClean="0"/>
+          </a:p>
+          <a:p>
             <a:r>
               <a:rPr lang="en-US" dirty="0" smtClean="0"/>
               <a:t>Shape Retrieval</a:t>
             </a:r>
+          </a:p>
+          <a:p>
+            <a:endParaRPr lang="en-US" dirty="0" smtClean="0"/>
           </a:p>
           <a:p>
             <a:r>
@@ -6027,10 +8251,22 @@
             </a:r>
           </a:p>
           <a:p>
+            <a:pPr lvl="1">
+              <a:buNone/>
+            </a:pPr>
+            <a:endParaRPr lang="en-US" dirty="0" smtClean="0"/>
+          </a:p>
+          <a:p>
             <a:r>
               <a:rPr lang="en-US" dirty="0" smtClean="0"/>
               <a:t>Results</a:t>
             </a:r>
+          </a:p>
+          <a:p>
+            <a:pPr>
+              <a:buNone/>
+            </a:pPr>
+            <a:endParaRPr lang="en-US" dirty="0" smtClean="0"/>
           </a:p>
           <a:p>
             <a:r>
@@ -6100,16 +8336,76 @@
           </a:p>
         </p:txBody>
       </p:sp>
+      <p:sp>
+        <p:nvSpPr>
+          <p:cNvPr id="8" name="Content Placeholder 2"/>
+          <p:cNvSpPr>
+            <a:spLocks noGrp="1"/>
+          </p:cNvSpPr>
+          <p:nvPr>
+            <p:ph idx="1"/>
+          </p:nvPr>
+        </p:nvSpPr>
+        <p:spPr>
+          <a:xfrm>
+            <a:off x="457200" y="1775191"/>
+            <a:ext cx="8077200" cy="4625609"/>
+          </a:xfrm>
+        </p:spPr>
+        <p:txBody>
+          <a:bodyPr/>
+          <a:lstStyle/>
+          <a:p>
+            <a:r>
+              <a:rPr lang="en-US" dirty="0" smtClean="0"/>
+              <a:t>Smoothly contract the mesh</a:t>
+            </a:r>
+          </a:p>
+          <a:p>
+            <a:endParaRPr lang="en-US" dirty="0" smtClean="0"/>
+          </a:p>
+          <a:p>
+            <a:r>
+              <a:rPr lang="en-US" dirty="0" smtClean="0"/>
+              <a:t>Retain overall shape</a:t>
+            </a:r>
+          </a:p>
+          <a:p>
+            <a:pPr>
+              <a:buNone/>
+            </a:pPr>
+            <a:endParaRPr lang="en-US" dirty="0" smtClean="0"/>
+          </a:p>
+          <a:p>
+            <a:r>
+              <a:rPr lang="en-US" dirty="0" smtClean="0"/>
+              <a:t>Iterative process</a:t>
+            </a:r>
+          </a:p>
+          <a:p>
+            <a:endParaRPr lang="en-US" dirty="0" smtClean="0"/>
+          </a:p>
+          <a:p>
+            <a:endParaRPr lang="en-US" dirty="0" smtClean="0"/>
+          </a:p>
+          <a:p>
+            <a:endParaRPr lang="en-US" dirty="0" smtClean="0"/>
+          </a:p>
+          <a:p>
+            <a:endParaRPr lang="en-US" dirty="0"/>
+          </a:p>
+        </p:txBody>
+      </p:sp>
       <p:pic>
         <p:nvPicPr>
-          <p:cNvPr id="6145" name="Picture 1"/>
+          <p:cNvPr id="9" name="Picture 2"/>
           <p:cNvPicPr>
             <a:picLocks noChangeAspect="1" noChangeArrowheads="1"/>
           </p:cNvPicPr>
           <p:nvPr/>
         </p:nvPicPr>
         <p:blipFill>
-          <a:blip r:embed="rId2"/>
+          <a:blip r:embed="rId2" cstate="print"/>
           <a:srcRect/>
           <a:stretch>
             <a:fillRect/>
@@ -6117,8 +8413,8 @@
         </p:blipFill>
         <p:spPr bwMode="auto">
           <a:xfrm>
-            <a:off x="4191000" y="1524000"/>
-            <a:ext cx="4876800" cy="2555577"/>
+            <a:off x="609600" y="4953000"/>
+            <a:ext cx="8077200" cy="1152738"/>
           </a:xfrm>
           <a:prstGeom prst="rect">
             <a:avLst/>
@@ -6133,90 +8429,6 @@
           <a:effectLst/>
         </p:spPr>
       </p:pic>
-      <p:pic>
-        <p:nvPicPr>
-          <p:cNvPr id="6146" name="Picture 2"/>
-          <p:cNvPicPr>
-            <a:picLocks noChangeAspect="1" noChangeArrowheads="1"/>
-          </p:cNvPicPr>
-          <p:nvPr/>
-        </p:nvPicPr>
-        <p:blipFill>
-          <a:blip r:embed="rId3"/>
-          <a:srcRect/>
-          <a:stretch>
-            <a:fillRect/>
-          </a:stretch>
-        </p:blipFill>
-        <p:spPr bwMode="auto">
-          <a:xfrm>
-            <a:off x="4495800" y="4001777"/>
-            <a:ext cx="4343400" cy="2608573"/>
-          </a:xfrm>
-          <a:prstGeom prst="rect">
-            <a:avLst/>
-          </a:prstGeom>
-          <a:noFill/>
-          <a:ln w="9525">
-            <a:noFill/>
-            <a:miter lim="800000"/>
-            <a:headEnd/>
-            <a:tailEnd/>
-          </a:ln>
-          <a:effectLst/>
-        </p:spPr>
-      </p:pic>
-      <p:sp>
-        <p:nvSpPr>
-          <p:cNvPr id="8" name="Content Placeholder 2"/>
-          <p:cNvSpPr>
-            <a:spLocks noGrp="1"/>
-          </p:cNvSpPr>
-          <p:nvPr>
-            <p:ph idx="1"/>
-          </p:nvPr>
-        </p:nvSpPr>
-        <p:spPr>
-          <a:xfrm>
-            <a:off x="457200" y="1775191"/>
-            <a:ext cx="3733800" cy="4625609"/>
-          </a:xfrm>
-        </p:spPr>
-        <p:txBody>
-          <a:bodyPr/>
-          <a:lstStyle/>
-          <a:p>
-            <a:r>
-              <a:rPr lang="en-US" dirty="0" smtClean="0"/>
-              <a:t>Smoothly contract the mesh.</a:t>
-            </a:r>
-          </a:p>
-          <a:p>
-            <a:r>
-              <a:rPr lang="en-US" dirty="0" smtClean="0"/>
-              <a:t>Retain overall shape.</a:t>
-            </a:r>
-          </a:p>
-          <a:p>
-            <a:r>
-              <a:rPr lang="en-US" dirty="0" smtClean="0"/>
-              <a:t>Iterative process</a:t>
-            </a:r>
-          </a:p>
-          <a:p>
-            <a:endParaRPr lang="en-US" dirty="0" smtClean="0"/>
-          </a:p>
-          <a:p>
-            <a:endParaRPr lang="en-US" dirty="0" smtClean="0"/>
-          </a:p>
-          <a:p>
-            <a:endParaRPr lang="en-US" dirty="0" smtClean="0"/>
-          </a:p>
-          <a:p>
-            <a:endParaRPr lang="en-US" dirty="0"/>
-          </a:p>
-        </p:txBody>
-      </p:sp>
     </p:spTree>
   </p:cSld>
   <p:clrMapOvr>
@@ -6255,13 +8467,13 @@
         <p:spPr/>
         <p:txBody>
           <a:bodyPr>
-            <a:normAutofit fontScale="90000"/>
+            <a:normAutofit/>
           </a:bodyPr>
           <a:lstStyle/>
           <a:p>
             <a:r>
               <a:rPr lang="en-US" dirty="0" smtClean="0"/>
-              <a:t>Geometry Contraction - Algorithm</a:t>
+              <a:t>Geometry Contraction</a:t>
             </a:r>
             <a:endParaRPr lang="en-US" dirty="0"/>
           </a:p>
@@ -6335,30 +8547,6 @@
             </a:r>
           </a:p>
           <a:p>
-            <a:pPr lvl="2"/>
-            <a:r>
-              <a:rPr lang="en-US" dirty="0" smtClean="0"/>
-              <a:t>V</a:t>
-            </a:r>
-            <a:r>
-              <a:rPr lang="en-US" baseline="-25000" dirty="0" smtClean="0"/>
-              <a:t>i</a:t>
-            </a:r>
-            <a:r>
-              <a:rPr lang="en-US" baseline="30000" dirty="0" smtClean="0"/>
-              <a:t>T  </a:t>
-            </a:r>
-            <a:r>
-              <a:rPr lang="en-US" dirty="0" smtClean="0"/>
-              <a:t>are the coordinates of vertex </a:t>
-            </a:r>
-            <a:r>
-              <a:rPr lang="en-US" dirty="0" err="1" smtClean="0"/>
-              <a:t>i</a:t>
-            </a:r>
-            <a:endParaRPr lang="en-US" dirty="0" smtClean="0"/>
-          </a:p>
-          <a:p>
             <a:pPr lvl="1"/>
             <a:r>
               <a:rPr lang="en-US" dirty="0" smtClean="0"/>
@@ -6366,9 +8554,13 @@
             </a:r>
           </a:p>
           <a:p>
+            <a:pPr lvl="1"/>
+            <a:endParaRPr lang="en-US" dirty="0" smtClean="0"/>
+          </a:p>
+          <a:p>
             <a:r>
               <a:rPr lang="en-US" dirty="0" smtClean="0"/>
-              <a:t>Find new vertices coordinates V’ such that the mesh G’=(V’,E) is a contracted version of G</a:t>
+              <a:t>Find new vertices V’ such that the mesh G’=(V’,E) is a contracted version of G</a:t>
             </a:r>
           </a:p>
           <a:p>
@@ -6420,13 +8612,13 @@
         <p:spPr/>
         <p:txBody>
           <a:bodyPr>
-            <a:normAutofit fontScale="90000"/>
+            <a:normAutofit/>
           </a:bodyPr>
           <a:lstStyle/>
           <a:p>
             <a:r>
               <a:rPr lang="en-US" dirty="0" smtClean="0"/>
-              <a:t>Geometry Contraction - Algorithm</a:t>
+              <a:t>Geometry Contraction</a:t>
             </a:r>
             <a:endParaRPr lang="en-US" dirty="0"/>
           </a:p>
@@ -6449,38 +8641,15 @@
           </a:xfrm>
         </p:spPr>
         <p:txBody>
-          <a:bodyPr/>
+          <a:bodyPr>
+            <a:normAutofit fontScale="92500" lnSpcReduction="10000"/>
+          </a:bodyPr>
           <a:lstStyle/>
           <a:p>
             <a:r>
               <a:rPr lang="en-US" dirty="0" smtClean="0"/>
               <a:t>Find V’ by solving LV’ = 0</a:t>
             </a:r>
-          </a:p>
-          <a:p>
-            <a:r>
-              <a:rPr lang="en-US" dirty="0" smtClean="0"/>
-              <a:t>L</a:t>
-            </a:r>
-            <a:r>
-              <a:rPr lang="en-US" baseline="-25000" dirty="0" smtClean="0"/>
-              <a:t>nxn</a:t>
-            </a:r>
-            <a:r>
-              <a:rPr lang="en-US" dirty="0" smtClean="0"/>
-              <a:t> is the curvature-flow </a:t>
-            </a:r>
-            <a:r>
-              <a:rPr lang="en-US" dirty="0" err="1" smtClean="0"/>
-              <a:t>laplacian</a:t>
-            </a:r>
-            <a:r>
-              <a:rPr lang="en-US" dirty="0" smtClean="0"/>
-              <a:t> operator:</a:t>
-            </a:r>
-          </a:p>
-          <a:p>
-            <a:endParaRPr lang="en-US" dirty="0" smtClean="0"/>
           </a:p>
           <a:p>
             <a:pPr>
@@ -6489,43 +8658,93 @@
             <a:endParaRPr lang="en-US" dirty="0" smtClean="0"/>
           </a:p>
           <a:p>
-            <a:pPr>
+            <a:r>
+              <a:rPr lang="en-US" dirty="0" smtClean="0"/>
+              <a:t>L</a:t>
+            </a:r>
+            <a:r>
+              <a:rPr lang="en-US" baseline="-25000" dirty="0" smtClean="0"/>
+              <a:t>nxn</a:t>
+            </a:r>
+            <a:r>
+              <a:rPr lang="en-US" dirty="0" smtClean="0"/>
+              <a:t> is the curvature-flow </a:t>
+            </a:r>
+            <a:r>
+              <a:rPr lang="en-US" dirty="0" err="1" smtClean="0"/>
+              <a:t>Laplacian</a:t>
+            </a:r>
+            <a:r>
+              <a:rPr lang="en-US" dirty="0" smtClean="0"/>
+              <a:t> operator:</a:t>
+            </a:r>
+          </a:p>
+          <a:p>
+            <a:pPr lvl="2">
               <a:buNone/>
             </a:pPr>
             <a:endParaRPr lang="en-US" dirty="0" smtClean="0"/>
           </a:p>
           <a:p>
-            <a:pPr>
+            <a:pPr lvl="2">
               <a:buNone/>
             </a:pPr>
-            <a:r>
-              <a:rPr lang="en-US" sz="2400" dirty="0" smtClean="0"/>
-              <a:t>   with </a:t>
-            </a:r>
-            <a:r>
-              <a:rPr lang="el-GR" sz="2400" dirty="0" smtClean="0"/>
+            <a:endParaRPr lang="en-US" dirty="0" smtClean="0"/>
+          </a:p>
+          <a:p>
+            <a:pPr lvl="2">
+              <a:buNone/>
+            </a:pPr>
+            <a:endParaRPr lang="en-US" dirty="0" smtClean="0"/>
+          </a:p>
+          <a:p>
+            <a:pPr lvl="2">
+              <a:buNone/>
+            </a:pPr>
+            <a:endParaRPr lang="en-US" dirty="0" smtClean="0"/>
+          </a:p>
+          <a:p>
+            <a:pPr lvl="2">
+              <a:buNone/>
+            </a:pPr>
+            <a:r>
+              <a:rPr lang="en-US" dirty="0" smtClean="0"/>
+              <a:t>with </a:t>
+            </a:r>
+            <a:r>
+              <a:rPr lang="el-GR" dirty="0" smtClean="0"/>
               <a:t>α</a:t>
             </a:r>
             <a:r>
-              <a:rPr lang="pt-BR" sz="2400" dirty="0" smtClean="0"/>
+              <a:rPr lang="pt-BR" dirty="0" smtClean="0"/>
               <a:t> and </a:t>
             </a:r>
             <a:r>
-              <a:rPr lang="el-GR" sz="2400" dirty="0" smtClean="0"/>
+              <a:rPr lang="el-GR" dirty="0" smtClean="0"/>
               <a:t>β</a:t>
             </a:r>
             <a:r>
-              <a:rPr lang="pt-BR" sz="2400" dirty="0" smtClean="0"/>
+              <a:rPr lang="pt-BR" dirty="0" smtClean="0"/>
               <a:t> being the oposite angles of edge (i,j)</a:t>
             </a:r>
           </a:p>
           <a:p>
-            <a:r>
-              <a:rPr lang="pt-BR" sz="2400" dirty="0" smtClean="0"/>
-              <a:t>The rows of L are the </a:t>
-            </a:r>
-            <a:r>
-              <a:rPr lang="pt-BR" sz="2400" i="1" dirty="0" smtClean="0">
+            <a:pPr lvl="2">
+              <a:buNone/>
+            </a:pPr>
+            <a:endParaRPr lang="en-US" dirty="0" smtClean="0"/>
+          </a:p>
+          <a:p>
+            <a:r>
+              <a:rPr lang="en-US" dirty="0" smtClean="0"/>
+              <a:t>The rows </a:t>
+            </a:r>
+            <a:r>
+              <a:rPr lang="pt-BR" dirty="0" smtClean="0"/>
+              <a:t>of L are the </a:t>
+            </a:r>
+            <a:r>
+              <a:rPr lang="pt-BR" i="1" dirty="0" smtClean="0">
                 <a:solidFill>
                   <a:schemeClr val="accent1">
                     <a:lumMod val="75000"/>
@@ -6534,11 +8753,7 @@
               </a:rPr>
               <a:t>contraction constraints</a:t>
             </a:r>
-            <a:r>
-              <a:rPr lang="pt-BR" sz="2400" dirty="0" smtClean="0"/>
-              <a:t>.</a:t>
-            </a:r>
-            <a:endParaRPr lang="en-US" sz="2400" i="1" dirty="0" smtClean="0"/>
+            <a:endParaRPr lang="en-US" dirty="0" smtClean="0"/>
           </a:p>
         </p:txBody>
       </p:sp>
@@ -6646,7 +8861,7 @@
         </p:blipFill>
         <p:spPr bwMode="auto">
           <a:xfrm>
-            <a:off x="762000" y="3200400"/>
+            <a:off x="762000" y="3352800"/>
             <a:ext cx="7162800" cy="1107649"/>
           </a:xfrm>
           <a:prstGeom prst="rect">
@@ -6693,13 +8908,13 @@
         <p:spPr/>
         <p:txBody>
           <a:bodyPr>
-            <a:normAutofit fontScale="90000"/>
+            <a:normAutofit/>
           </a:bodyPr>
           <a:lstStyle/>
           <a:p>
             <a:r>
               <a:rPr lang="en-US" dirty="0" smtClean="0"/>
-              <a:t>Geometry Contraction - Algorithm</a:t>
+              <a:t>Geometry Contraction</a:t>
             </a:r>
             <a:endParaRPr lang="en-US" dirty="0"/>
           </a:p>
@@ -6940,85 +9155,6 @@
           <a:noFill/>
         </p:spPr>
       </p:pic>
-      <p:sp>
-        <p:nvSpPr>
-          <p:cNvPr id="27651" name="Rectangle 3"/>
-          <p:cNvSpPr>
-            <a:spLocks noChangeArrowheads="1"/>
-          </p:cNvSpPr>
-          <p:nvPr/>
-        </p:nvSpPr>
-        <p:spPr bwMode="auto">
-          <a:xfrm>
-            <a:off x="0" y="876300"/>
-            <a:ext cx="9144000" cy="457200"/>
-          </a:xfrm>
-          <a:prstGeom prst="rect">
-            <a:avLst/>
-          </a:prstGeom>
-          <a:noFill/>
-          <a:ln w="9525">
-            <a:noFill/>
-            <a:miter lim="800000"/>
-            <a:headEnd/>
-            <a:tailEnd/>
-          </a:ln>
-          <a:effectLst/>
-        </p:spPr>
-        <p:txBody>
-          <a:bodyPr vert="horz" wrap="none" lIns="91440" tIns="45720" rIns="91440" bIns="45720" numCol="1" anchor="ctr" anchorCtr="0" compatLnSpc="1">
-            <a:prstTxWarp prst="textNoShape">
-              <a:avLst/>
-            </a:prstTxWarp>
-            <a:spAutoFit/>
-          </a:bodyPr>
-          <a:lstStyle/>
-          <a:p>
-            <a:pPr marL="0" marR="0" lvl="0" indent="0" algn="ctr" defTabSz="914400" rtl="0" eaLnBrk="1" fontAlgn="base" latinLnBrk="0" hangingPunct="1">
-              <a:lnSpc>
-                <a:spcPct val="100000"/>
-              </a:lnSpc>
-              <a:spcBef>
-                <a:spcPct val="0"/>
-              </a:spcBef>
-              <a:spcAft>
-                <a:spcPct val="0"/>
-              </a:spcAft>
-              <a:buClrTx/>
-              <a:buSzTx/>
-              <a:buFontTx/>
-              <a:buNone/>
-              <a:tabLst/>
-            </a:pPr>
-            <a:r>
-              <a:rPr kumimoji="0" lang="en-US" sz="1400" b="1" i="0" u="none" strike="noStrike" cap="none" normalizeH="0" baseline="0" smtClean="0">
-                <a:ln>
-                  <a:noFill/>
-                </a:ln>
-                <a:solidFill>
-                  <a:schemeClr val="tx1"/>
-                </a:solidFill>
-                <a:effectLst/>
-                <a:latin typeface="Calibri" pitchFamily="34" charset="0"/>
-                <a:ea typeface="Times New Roman" pitchFamily="18" charset="0"/>
-                <a:cs typeface="Times New Roman" pitchFamily="18" charset="0"/>
-              </a:rPr>
-              <a:t>         (3)</a:t>
-            </a:r>
-            <a:endParaRPr kumimoji="0" lang="en-US" sz="1800" b="0" i="0" u="none" strike="noStrike" cap="none" normalizeH="0" baseline="0" smtClean="0">
-              <a:ln>
-                <a:noFill/>
-              </a:ln>
-              <a:solidFill>
-                <a:schemeClr val="tx1"/>
-              </a:solidFill>
-              <a:effectLst/>
-              <a:latin typeface="Arial" pitchFamily="34" charset="0"/>
-              <a:cs typeface="Arial" pitchFamily="34" charset="0"/>
-            </a:endParaRPr>
-          </a:p>
-        </p:txBody>
-      </p:sp>
     </p:spTree>
   </p:cSld>
   <p:clrMapOvr>
@@ -7057,13 +9193,13 @@
         <p:spPr/>
         <p:txBody>
           <a:bodyPr>
-            <a:normAutofit fontScale="90000"/>
+            <a:normAutofit/>
           </a:bodyPr>
           <a:lstStyle/>
           <a:p>
             <a:r>
               <a:rPr lang="en-US" dirty="0" smtClean="0"/>
-              <a:t>Geometry Contraction - Algorithm</a:t>
+              <a:t>Geometry Contraction</a:t>
             </a:r>
             <a:endParaRPr lang="en-US" dirty="0"/>
           </a:p>

</xml_diff>